<commit_message>
update mvc slides from Emily
</commit_message>
<xml_diff>
--- a/1phase/ruby-mvc-single-res/HT-MVC.pptx
+++ b/1phase/ruby-mvc-single-res/HT-MVC.pptx
@@ -2213,46 +2213,15 @@
                   <a:schemeClr val="accent3"/>
                 </a:solidFill>
               </a:rPr>
-              <a:t>Author:  Torey Hickman</a:t>
-            </a:r>
-            <a:endParaRPr lang="en-US" dirty="0">
-              <a:solidFill>
-                <a:schemeClr val="accent3"/>
-              </a:solidFill>
-            </a:endParaRPr>
-          </a:p>
-        </p:txBody>
-      </p:sp>
-      <p:sp>
-        <p:nvSpPr>
-          <p:cNvPr id="6" name="TextBox 5"/>
-          <p:cNvSpPr txBox="1"/>
-          <p:nvPr/>
-        </p:nvSpPr>
-        <p:spPr>
-          <a:xfrm>
-            <a:off x="5740410" y="6324603"/>
-            <a:ext cx="2878667" cy="369332"/>
-          </a:xfrm>
-          <a:prstGeom prst="rect">
-            <a:avLst/>
-          </a:prstGeom>
-          <a:noFill/>
-        </p:spPr>
-        <p:txBody>
-          <a:bodyPr wrap="square" rtlCol="0">
-            <a:spAutoFit/>
-          </a:bodyPr>
-          <a:lstStyle/>
-          <a:p>
-            <a:pPr algn="r"/>
+              <a:t>Author:  </a:t>
+            </a:r>
             <a:r>
               <a:rPr lang="en-US" dirty="0" smtClean="0">
                 <a:solidFill>
                   <a:schemeClr val="accent3"/>
                 </a:solidFill>
               </a:rPr>
-              <a:t>Phase 1:  Day 10</a:t>
+              <a:t>Hunter Chapman</a:t>
             </a:r>
             <a:endParaRPr lang="en-US" dirty="0">
               <a:solidFill>
@@ -12580,7 +12549,12 @@
             <p:ph idx="1"/>
           </p:nvPr>
         </p:nvSpPr>
-        <p:spPr/>
+        <p:spPr>
+          <a:xfrm>
+            <a:off x="175179" y="1424690"/>
+            <a:ext cx="8968821" cy="3877733"/>
+          </a:xfrm>
+        </p:spPr>
         <p:txBody>
           <a:bodyPr>
             <a:noAutofit/>
@@ -12634,8 +12608,9 @@
           <a:p>
             <a:r>
               <a:rPr lang="en-US" sz="2300" dirty="0" smtClean="0"/>
-              <a:t>It </a:t>
-            </a:r>
+              <a:t>It interacts with a DB or data store of some kind, crunches the numbers and does the ‘heavy lifting’ in your application.</a:t>
+            </a:r>
+            <a:endParaRPr lang="en-US" sz="2300" dirty="0" smtClean="0"/>
           </a:p>
           <a:p>
             <a:endParaRPr lang="en-US" sz="2300" dirty="0"/>
@@ -12655,8 +12630,37 @@
             </a:r>
             <a:r>
               <a:rPr lang="en-US" sz="2300" dirty="0" smtClean="0"/>
-              <a:t> manages communication between the model and the view</a:t>
-            </a:r>
+              <a:t> manages communication between </a:t>
+            </a:r>
+            <a:r>
+              <a:rPr lang="en-US" sz="2300" dirty="0" smtClean="0">
+                <a:solidFill>
+                  <a:srgbClr val="FF0000"/>
+                </a:solidFill>
+              </a:rPr>
+              <a:t>model</a:t>
+            </a:r>
+            <a:r>
+              <a:rPr lang="en-US" sz="2300" dirty="0" smtClean="0"/>
+              <a:t> </a:t>
+            </a:r>
+            <a:r>
+              <a:rPr lang="en-US" sz="2300" dirty="0" smtClean="0"/>
+              <a:t>and </a:t>
+            </a:r>
+            <a:r>
+              <a:rPr lang="en-US" sz="2300" dirty="0" smtClean="0">
+                <a:solidFill>
+                  <a:srgbClr val="FF0000"/>
+                </a:solidFill>
+              </a:rPr>
+              <a:t>view</a:t>
+            </a:r>
+            <a:endParaRPr lang="en-US" sz="2300" dirty="0" smtClean="0">
+              <a:solidFill>
+                <a:srgbClr val="FF0000"/>
+              </a:solidFill>
+            </a:endParaRPr>
           </a:p>
           <a:p>
             <a:r>
@@ -12750,19 +12754,32 @@
           <a:p>
             <a:r>
               <a:rPr lang="en-US" sz="2500" dirty="0" smtClean="0"/>
-              <a:t>These are all just classes!</a:t>
-            </a:r>
-          </a:p>
-          <a:p>
+              <a:t>MVC is not much different than th</a:t>
+            </a:r>
             <a:r>
               <a:rPr lang="en-US" sz="2500" dirty="0" smtClean="0"/>
-              <a:t>They’re not much different from what you’ve been doing</a:t>
-            </a:r>
+              <a:t>e code you are already writing. </a:t>
+            </a:r>
+            <a:endParaRPr lang="en-US" sz="2500" dirty="0" smtClean="0"/>
           </a:p>
           <a:p>
             <a:r>
               <a:rPr lang="en-US" sz="2500" dirty="0" smtClean="0"/>
-              <a:t>They’re just organized in a different way</a:t>
+              <a:t>These </a:t>
+            </a:r>
+            <a:r>
+              <a:rPr lang="en-US" sz="2500" dirty="0" smtClean="0"/>
+              <a:t>are all just classes!</a:t>
+            </a:r>
+          </a:p>
+          <a:p>
+            <a:r>
+              <a:rPr lang="en-US" sz="2500" smtClean="0"/>
+              <a:t>They’re </a:t>
+            </a:r>
+            <a:r>
+              <a:rPr lang="en-US" sz="2500" dirty="0" smtClean="0"/>
+              <a:t>just organized in a different way</a:t>
             </a:r>
           </a:p>
           <a:p>

</xml_diff>

<commit_message>
add mvc image slide
</commit_message>
<xml_diff>
--- a/1phase/ruby-mvc-single-res/HT-MVC.pptx
+++ b/1phase/ruby-mvc-single-res/HT-MVC.pptx
@@ -5,10 +5,10 @@
     <p:sldMasterId id="2147483660" r:id="rId1"/>
   </p:sldMasterIdLst>
   <p:notesMasterIdLst>
-    <p:notesMasterId r:id="rId30"/>
+    <p:notesMasterId r:id="rId31"/>
   </p:notesMasterIdLst>
   <p:handoutMasterIdLst>
-    <p:handoutMasterId r:id="rId31"/>
+    <p:handoutMasterId r:id="rId32"/>
   </p:handoutMasterIdLst>
   <p:sldIdLst>
     <p:sldId id="256" r:id="rId2"/>
@@ -20,25 +20,26 @@
     <p:sldId id="257" r:id="rId8"/>
     <p:sldId id="258" r:id="rId9"/>
     <p:sldId id="259" r:id="rId10"/>
-    <p:sldId id="260" r:id="rId11"/>
-    <p:sldId id="264" r:id="rId12"/>
-    <p:sldId id="261" r:id="rId13"/>
-    <p:sldId id="262" r:id="rId14"/>
-    <p:sldId id="263" r:id="rId15"/>
-    <p:sldId id="265" r:id="rId16"/>
-    <p:sldId id="266" r:id="rId17"/>
-    <p:sldId id="267" r:id="rId18"/>
-    <p:sldId id="279" r:id="rId19"/>
-    <p:sldId id="281" r:id="rId20"/>
-    <p:sldId id="282" r:id="rId21"/>
-    <p:sldId id="280" r:id="rId22"/>
-    <p:sldId id="270" r:id="rId23"/>
-    <p:sldId id="272" r:id="rId24"/>
-    <p:sldId id="273" r:id="rId25"/>
-    <p:sldId id="275" r:id="rId26"/>
-    <p:sldId id="276" r:id="rId27"/>
-    <p:sldId id="277" r:id="rId28"/>
-    <p:sldId id="278" r:id="rId29"/>
+    <p:sldId id="289" r:id="rId11"/>
+    <p:sldId id="260" r:id="rId12"/>
+    <p:sldId id="264" r:id="rId13"/>
+    <p:sldId id="261" r:id="rId14"/>
+    <p:sldId id="262" r:id="rId15"/>
+    <p:sldId id="263" r:id="rId16"/>
+    <p:sldId id="265" r:id="rId17"/>
+    <p:sldId id="266" r:id="rId18"/>
+    <p:sldId id="267" r:id="rId19"/>
+    <p:sldId id="279" r:id="rId20"/>
+    <p:sldId id="281" r:id="rId21"/>
+    <p:sldId id="282" r:id="rId22"/>
+    <p:sldId id="280" r:id="rId23"/>
+    <p:sldId id="270" r:id="rId24"/>
+    <p:sldId id="272" r:id="rId25"/>
+    <p:sldId id="273" r:id="rId26"/>
+    <p:sldId id="275" r:id="rId27"/>
+    <p:sldId id="276" r:id="rId28"/>
+    <p:sldId id="277" r:id="rId29"/>
+    <p:sldId id="278" r:id="rId30"/>
   </p:sldIdLst>
   <p:sldSz cx="9144000" cy="6858000" type="screen4x3"/>
   <p:notesSz cx="6858000" cy="9144000"/>
@@ -726,7 +727,7 @@
           <a:p>
             <a:fld id="{B8E85131-72B0-344C-846D-7A83BD8CA0B2}" type="slidenum">
               <a:rPr lang="en-US" smtClean="0"/>
-              <a:t>17</a:t>
+              <a:t>18</a:t>
             </a:fld>
             <a:endParaRPr lang="en-US"/>
           </a:p>
@@ -2254,6 +2255,19 @@
 <file path=ppt/slides/slide10.xml><?xml version="1.0" encoding="utf-8"?>
 <p:sld xmlns:a="http://schemas.openxmlformats.org/drawingml/2006/main" xmlns:r="http://schemas.openxmlformats.org/officeDocument/2006/relationships" xmlns:p="http://schemas.openxmlformats.org/presentationml/2006/main">
   <p:cSld>
+    <p:bg>
+      <p:bgPr>
+        <a:pattFill prst="pct70">
+          <a:fgClr>
+            <a:schemeClr val="bg1"/>
+          </a:fgClr>
+          <a:bgClr>
+            <a:prstClr val="white"/>
+          </a:bgClr>
+        </a:pattFill>
+        <a:effectLst/>
+      </p:bgPr>
+    </p:bg>
     <p:spTree>
       <p:nvGrpSpPr>
         <p:cNvPr id="1" name=""/>
@@ -2270,7 +2284,7 @@
       </p:grpSpPr>
       <p:sp>
         <p:nvSpPr>
-          <p:cNvPr id="2" name="Title 1"/>
+          <p:cNvPr id="5" name="Title 4"/>
           <p:cNvSpPr>
             <a:spLocks noGrp="1"/>
           </p:cNvSpPr>
@@ -2285,7 +2299,7 @@
           <a:p>
             <a:r>
               <a:rPr lang="en-US" dirty="0" smtClean="0"/>
-              <a:t>M-V-C Design Pattern</a:t>
+              <a:t>Model – View – Controller</a:t>
             </a:r>
             <a:endParaRPr lang="en-US" dirty="0"/>
           </a:p>
@@ -2293,7 +2307,7 @@
       </p:sp>
       <p:sp>
         <p:nvSpPr>
-          <p:cNvPr id="3" name="Footer Placeholder 2"/>
+          <p:cNvPr id="4" name="Footer Placeholder 3"/>
           <p:cNvSpPr>
             <a:spLocks noGrp="1"/>
           </p:cNvSpPr>
@@ -2307,269 +2321,41 @@
           <a:lstStyle/>
           <a:p>
             <a:r>
-              <a:rPr lang="en-US" smtClean="0"/>
+              <a:rPr lang="en-US" dirty="0" smtClean="0"/>
               <a:t>Model – View – Controller: A Design Pattern</a:t>
             </a:r>
             <a:endParaRPr lang="en-US" dirty="0"/>
           </a:p>
         </p:txBody>
       </p:sp>
-      <p:sp>
-        <p:nvSpPr>
-          <p:cNvPr id="4" name="Rectangle 3"/>
-          <p:cNvSpPr/>
-          <p:nvPr/>
-        </p:nvSpPr>
-        <p:spPr>
-          <a:xfrm>
-            <a:off x="512064" y="2723877"/>
-            <a:ext cx="2150017" cy="3058909"/>
-          </a:xfrm>
-          <a:prstGeom prst="rect">
-            <a:avLst/>
-          </a:prstGeom>
-          <a:solidFill>
-            <a:srgbClr val="00A9B9"/>
-          </a:solidFill>
-          <a:ln>
-            <a:noFill/>
-          </a:ln>
-          <a:effectLst/>
-        </p:spPr>
-        <p:style>
-          <a:lnRef idx="1">
-            <a:schemeClr val="accent1"/>
-          </a:lnRef>
-          <a:fillRef idx="3">
-            <a:schemeClr val="accent1"/>
-          </a:fillRef>
-          <a:effectRef idx="2">
-            <a:schemeClr val="accent1"/>
-          </a:effectRef>
-          <a:fontRef idx="minor">
-            <a:schemeClr val="lt1"/>
-          </a:fontRef>
-        </p:style>
-        <p:txBody>
-          <a:bodyPr rtlCol="0" anchor="t"/>
-          <a:lstStyle/>
-          <a:p>
-            <a:r>
-              <a:rPr lang="en-US" sz="2200" dirty="0" smtClean="0">
-                <a:solidFill>
-                  <a:srgbClr val="F8F8F8"/>
-                </a:solidFill>
-              </a:rPr>
-              <a:t>  </a:t>
-            </a:r>
-          </a:p>
-          <a:p>
-            <a:r>
-              <a:rPr lang="en-US" sz="2200" dirty="0">
-                <a:solidFill>
-                  <a:srgbClr val="F8F8F8"/>
-                </a:solidFill>
-              </a:rPr>
-              <a:t> </a:t>
-            </a:r>
-          </a:p>
-        </p:txBody>
-      </p:sp>
-      <p:sp>
-        <p:nvSpPr>
-          <p:cNvPr id="5" name="Rectangle 4"/>
-          <p:cNvSpPr/>
-          <p:nvPr/>
-        </p:nvSpPr>
-        <p:spPr>
-          <a:xfrm>
-            <a:off x="3493911" y="2668662"/>
-            <a:ext cx="2150017" cy="3058909"/>
-          </a:xfrm>
-          <a:prstGeom prst="rect">
-            <a:avLst/>
-          </a:prstGeom>
-          <a:solidFill>
-            <a:srgbClr val="EA4A3C"/>
-          </a:solidFill>
-          <a:ln>
-            <a:noFill/>
-          </a:ln>
-          <a:effectLst/>
-        </p:spPr>
-        <p:style>
-          <a:lnRef idx="1">
-            <a:schemeClr val="accent1"/>
-          </a:lnRef>
-          <a:fillRef idx="3">
-            <a:schemeClr val="accent1"/>
-          </a:fillRef>
-          <a:effectRef idx="2">
-            <a:schemeClr val="accent1"/>
-          </a:effectRef>
-          <a:fontRef idx="minor">
-            <a:schemeClr val="lt1"/>
-          </a:fontRef>
-        </p:style>
-        <p:txBody>
-          <a:bodyPr rtlCol="0" anchor="ctr"/>
-          <a:lstStyle/>
-          <a:p>
-            <a:pPr algn="ctr"/>
-            <a:endParaRPr lang="en-US" sz="2200" dirty="0">
-              <a:solidFill>
-                <a:srgbClr val="F8F8F8"/>
-              </a:solidFill>
-            </a:endParaRPr>
-          </a:p>
-        </p:txBody>
-      </p:sp>
-      <p:sp>
-        <p:nvSpPr>
-          <p:cNvPr id="6" name="Rectangle 5"/>
-          <p:cNvSpPr/>
-          <p:nvPr/>
-        </p:nvSpPr>
-        <p:spPr>
-          <a:xfrm>
-            <a:off x="6536783" y="2723877"/>
-            <a:ext cx="2150017" cy="3058909"/>
-          </a:xfrm>
-          <a:prstGeom prst="rect">
-            <a:avLst/>
-          </a:prstGeom>
-          <a:solidFill>
-            <a:schemeClr val="accent6"/>
-          </a:solidFill>
-          <a:ln>
-            <a:noFill/>
-          </a:ln>
-          <a:effectLst/>
-        </p:spPr>
-        <p:style>
-          <a:lnRef idx="1">
-            <a:schemeClr val="accent1"/>
-          </a:lnRef>
-          <a:fillRef idx="3">
-            <a:schemeClr val="accent1"/>
-          </a:fillRef>
-          <a:effectRef idx="2">
-            <a:schemeClr val="accent1"/>
-          </a:effectRef>
-          <a:fontRef idx="minor">
-            <a:schemeClr val="lt1"/>
-          </a:fontRef>
-        </p:style>
-        <p:txBody>
-          <a:bodyPr rtlCol="0" anchor="ctr"/>
-          <a:lstStyle/>
-          <a:p>
-            <a:pPr algn="ctr"/>
-            <a:endParaRPr lang="en-US" sz="2200">
-              <a:solidFill>
-                <a:srgbClr val="F8F8F8"/>
-              </a:solidFill>
-            </a:endParaRPr>
-          </a:p>
-        </p:txBody>
-      </p:sp>
-      <p:sp>
-        <p:nvSpPr>
-          <p:cNvPr id="8" name="TextBox 7"/>
-          <p:cNvSpPr txBox="1"/>
-          <p:nvPr/>
-        </p:nvSpPr>
-        <p:spPr>
-          <a:xfrm>
-            <a:off x="457200" y="1865376"/>
-            <a:ext cx="2204881" cy="584776"/>
-          </a:xfrm>
-          <a:prstGeom prst="rect">
-            <a:avLst/>
-          </a:prstGeom>
-          <a:noFill/>
-        </p:spPr>
-        <p:txBody>
-          <a:bodyPr wrap="square" rtlCol="0">
-            <a:spAutoFit/>
-          </a:bodyPr>
-          <a:lstStyle/>
-          <a:p>
-            <a:pPr algn="ctr"/>
-            <a:r>
-              <a:rPr lang="en-US" sz="3200" dirty="0" smtClean="0"/>
-              <a:t>Model</a:t>
-            </a:r>
-            <a:endParaRPr lang="en-US" sz="3200" dirty="0"/>
-          </a:p>
-        </p:txBody>
-      </p:sp>
-      <p:sp>
-        <p:nvSpPr>
-          <p:cNvPr id="10" name="TextBox 9"/>
-          <p:cNvSpPr txBox="1"/>
-          <p:nvPr/>
-        </p:nvSpPr>
-        <p:spPr>
-          <a:xfrm>
-            <a:off x="3493911" y="1865376"/>
-            <a:ext cx="2204881" cy="584776"/>
-          </a:xfrm>
-          <a:prstGeom prst="rect">
-            <a:avLst/>
-          </a:prstGeom>
-          <a:noFill/>
-        </p:spPr>
-        <p:txBody>
-          <a:bodyPr wrap="square" rtlCol="0">
-            <a:spAutoFit/>
-          </a:bodyPr>
-          <a:lstStyle/>
-          <a:p>
-            <a:pPr algn="ctr"/>
-            <a:r>
-              <a:rPr lang="en-US" sz="3200" dirty="0" smtClean="0"/>
-              <a:t>Controller</a:t>
-            </a:r>
-            <a:endParaRPr lang="en-US" sz="3200" dirty="0"/>
-          </a:p>
-        </p:txBody>
-      </p:sp>
-      <p:sp>
-        <p:nvSpPr>
-          <p:cNvPr id="11" name="TextBox 10"/>
-          <p:cNvSpPr txBox="1"/>
-          <p:nvPr/>
-        </p:nvSpPr>
-        <p:spPr>
-          <a:xfrm>
-            <a:off x="6536783" y="1865376"/>
-            <a:ext cx="2204881" cy="584776"/>
-          </a:xfrm>
-          <a:prstGeom prst="rect">
-            <a:avLst/>
-          </a:prstGeom>
-          <a:noFill/>
-        </p:spPr>
-        <p:txBody>
-          <a:bodyPr wrap="square" rtlCol="0">
-            <a:spAutoFit/>
-          </a:bodyPr>
-          <a:lstStyle/>
-          <a:p>
-            <a:pPr algn="ctr"/>
-            <a:r>
-              <a:rPr lang="en-US" sz="3200" dirty="0" smtClean="0"/>
-              <a:t>View</a:t>
-            </a:r>
-            <a:endParaRPr lang="en-US" sz="3200" dirty="0"/>
-          </a:p>
-        </p:txBody>
-      </p:sp>
+      <p:pic>
+        <p:nvPicPr>
+          <p:cNvPr id="7" name="Picture 6"/>
+          <p:cNvPicPr>
+            <a:picLocks noChangeAspect="1"/>
+          </p:cNvPicPr>
+          <p:nvPr/>
+        </p:nvPicPr>
+        <p:blipFill>
+          <a:blip r:embed="rId2"/>
+          <a:stretch>
+            <a:fillRect/>
+          </a:stretch>
+        </p:blipFill>
+        <p:spPr>
+          <a:xfrm>
+            <a:off x="402016" y="1926482"/>
+            <a:ext cx="8286542" cy="3825620"/>
+          </a:xfrm>
+          <a:prstGeom prst="rect">
+            <a:avLst/>
+          </a:prstGeom>
+        </p:spPr>
+      </p:pic>
     </p:spTree>
     <p:extLst>
       <p:ext uri="{BB962C8B-B14F-4D97-AF65-F5344CB8AC3E}">
-        <p14:creationId xmlns:p14="http://schemas.microsoft.com/office/powerpoint/2010/main" val="4010566210"/>
+        <p14:creationId xmlns:p14="http://schemas.microsoft.com/office/powerpoint/2010/main" val="1107917812"/>
       </p:ext>
     </p:extLst>
   </p:cSld>
@@ -2651,6 +2437,67 @@
       </p:sp>
       <p:sp>
         <p:nvSpPr>
+          <p:cNvPr id="4" name="Rectangle 3"/>
+          <p:cNvSpPr/>
+          <p:nvPr/>
+        </p:nvSpPr>
+        <p:spPr>
+          <a:xfrm>
+            <a:off x="512064" y="2723877"/>
+            <a:ext cx="2150017" cy="3058909"/>
+          </a:xfrm>
+          <a:prstGeom prst="rect">
+            <a:avLst/>
+          </a:prstGeom>
+          <a:solidFill>
+            <a:srgbClr val="00A9B9"/>
+          </a:solidFill>
+          <a:ln>
+            <a:noFill/>
+          </a:ln>
+          <a:effectLst/>
+        </p:spPr>
+        <p:style>
+          <a:lnRef idx="1">
+            <a:schemeClr val="accent1"/>
+          </a:lnRef>
+          <a:fillRef idx="3">
+            <a:schemeClr val="accent1"/>
+          </a:fillRef>
+          <a:effectRef idx="2">
+            <a:schemeClr val="accent1"/>
+          </a:effectRef>
+          <a:fontRef idx="minor">
+            <a:schemeClr val="lt1"/>
+          </a:fontRef>
+        </p:style>
+        <p:txBody>
+          <a:bodyPr rtlCol="0" anchor="t"/>
+          <a:lstStyle/>
+          <a:p>
+            <a:r>
+              <a:rPr lang="en-US" sz="2200" dirty="0" smtClean="0">
+                <a:solidFill>
+                  <a:srgbClr val="F8F8F8"/>
+                </a:solidFill>
+              </a:rPr>
+              <a:t>  </a:t>
+            </a:r>
+          </a:p>
+          <a:p>
+            <a:r>
+              <a:rPr lang="en-US" sz="2200" dirty="0">
+                <a:solidFill>
+                  <a:srgbClr val="F8F8F8"/>
+                </a:solidFill>
+              </a:rPr>
+              <a:t> </a:t>
+            </a:r>
+          </a:p>
+        </p:txBody>
+      </p:sp>
+      <p:sp>
+        <p:nvSpPr>
           <p:cNvPr id="5" name="Rectangle 4"/>
           <p:cNvSpPr/>
           <p:nvPr/>
@@ -2690,7 +2537,11 @@
           <a:lstStyle/>
           <a:p>
             <a:pPr algn="ctr"/>
-            <a:endParaRPr lang="en-US" dirty="0"/>
+            <a:endParaRPr lang="en-US" sz="2200" dirty="0">
+              <a:solidFill>
+                <a:srgbClr val="F8F8F8"/>
+              </a:solidFill>
+            </a:endParaRPr>
           </a:p>
         </p:txBody>
       </p:sp>
@@ -2735,7 +2586,11 @@
           <a:lstStyle/>
           <a:p>
             <a:pPr algn="ctr"/>
-            <a:endParaRPr lang="en-US" sz="2200" dirty="0"/>
+            <a:endParaRPr lang="en-US" sz="2200">
+              <a:solidFill>
+                <a:srgbClr val="F8F8F8"/>
+              </a:solidFill>
+            </a:endParaRPr>
           </a:p>
         </p:txBody>
       </p:sp>
@@ -2832,88 +2687,10 @@
           </a:p>
         </p:txBody>
       </p:sp>
-      <p:sp>
-        <p:nvSpPr>
-          <p:cNvPr id="12" name="Rectangle 11"/>
-          <p:cNvSpPr/>
-          <p:nvPr/>
-        </p:nvSpPr>
-        <p:spPr>
-          <a:xfrm>
-            <a:off x="512064" y="2723877"/>
-            <a:ext cx="2150017" cy="3058909"/>
-          </a:xfrm>
-          <a:prstGeom prst="rect">
-            <a:avLst/>
-          </a:prstGeom>
-          <a:solidFill>
-            <a:srgbClr val="00A9B9"/>
-          </a:solidFill>
-          <a:ln>
-            <a:noFill/>
-          </a:ln>
-          <a:effectLst/>
-        </p:spPr>
-        <p:style>
-          <a:lnRef idx="1">
-            <a:schemeClr val="accent1"/>
-          </a:lnRef>
-          <a:fillRef idx="3">
-            <a:schemeClr val="accent1"/>
-          </a:fillRef>
-          <a:effectRef idx="2">
-            <a:schemeClr val="accent1"/>
-          </a:effectRef>
-          <a:fontRef idx="minor">
-            <a:schemeClr val="lt1"/>
-          </a:fontRef>
-        </p:style>
-        <p:txBody>
-          <a:bodyPr rtlCol="0" anchor="t"/>
-          <a:lstStyle/>
-          <a:p>
-            <a:r>
-              <a:rPr lang="en-US" sz="2200" dirty="0" smtClean="0">
-                <a:solidFill>
-                  <a:schemeClr val="accent1"/>
-                </a:solidFill>
-              </a:rPr>
-              <a:t> </a:t>
-            </a:r>
-            <a:endParaRPr lang="en-US" sz="2200" dirty="0">
-              <a:solidFill>
-                <a:schemeClr val="accent1"/>
-              </a:solidFill>
-            </a:endParaRPr>
-          </a:p>
-          <a:p>
-            <a:pPr marL="111125"/>
-            <a:r>
-              <a:rPr lang="en-US" sz="2200" dirty="0" smtClean="0">
-                <a:solidFill>
-                  <a:schemeClr val="accent1"/>
-                </a:solidFill>
-              </a:rPr>
-              <a:t>Data &amp;</a:t>
-            </a:r>
-          </a:p>
-          <a:p>
-            <a:pPr marL="111125"/>
-            <a:r>
-              <a:rPr lang="en-US" sz="2200" dirty="0" smtClean="0">
-                <a:solidFill>
-                  <a:schemeClr val="accent1"/>
-                </a:solidFill>
-              </a:rPr>
-              <a:t>Business logic</a:t>
-            </a:r>
-          </a:p>
-        </p:txBody>
-      </p:sp>
     </p:spTree>
     <p:extLst>
       <p:ext uri="{BB962C8B-B14F-4D97-AF65-F5344CB8AC3E}">
-        <p14:creationId xmlns:p14="http://schemas.microsoft.com/office/powerpoint/2010/main" val="2582257191"/>
+        <p14:creationId xmlns:p14="http://schemas.microsoft.com/office/powerpoint/2010/main" val="4010566210"/>
       </p:ext>
     </p:extLst>
   </p:cSld>
@@ -3252,62 +3029,12 @@
               <a:t>Business logic</a:t>
             </a:r>
           </a:p>
-          <a:p>
-            <a:pPr marL="111125"/>
-            <a:endParaRPr lang="en-US" sz="2200" dirty="0">
-              <a:solidFill>
-                <a:schemeClr val="accent1"/>
-              </a:solidFill>
-            </a:endParaRPr>
-          </a:p>
-          <a:p>
-            <a:pPr marL="342900" indent="-231775" defTabSz="349250">
-              <a:buFont typeface="Arial"/>
-              <a:buChar char="•"/>
-            </a:pPr>
-            <a:r>
-              <a:rPr lang="en-US" sz="2200" dirty="0" smtClean="0">
-                <a:solidFill>
-                  <a:schemeClr val="accent1"/>
-                </a:solidFill>
-              </a:rPr>
-              <a:t>classes</a:t>
-            </a:r>
-          </a:p>
-          <a:p>
-            <a:pPr marL="342900" indent="-231775" defTabSz="349250">
-              <a:buFont typeface="Arial"/>
-              <a:buChar char="•"/>
-            </a:pPr>
-            <a:r>
-              <a:rPr lang="en-US" sz="2200" dirty="0" smtClean="0">
-                <a:solidFill>
-                  <a:schemeClr val="accent1"/>
-                </a:solidFill>
-              </a:rPr>
-              <a:t>modules</a:t>
-            </a:r>
-          </a:p>
-          <a:p>
-            <a:pPr marL="342900" indent="-231775" defTabSz="349250">
-              <a:buFont typeface="Arial"/>
-              <a:buChar char="•"/>
-            </a:pPr>
-            <a:r>
-              <a:rPr lang="en-US" sz="2200" dirty="0" smtClean="0">
-                <a:solidFill>
-                  <a:schemeClr val="accent1"/>
-                </a:solidFill>
-              </a:rPr>
-              <a:t>databases</a:t>
-            </a:r>
-          </a:p>
         </p:txBody>
       </p:sp>
     </p:spTree>
     <p:extLst>
       <p:ext uri="{BB962C8B-B14F-4D97-AF65-F5344CB8AC3E}">
-        <p14:creationId xmlns:p14="http://schemas.microsoft.com/office/powerpoint/2010/main" val="1826671997"/>
+        <p14:creationId xmlns:p14="http://schemas.microsoft.com/office/powerpoint/2010/main" val="2582257191"/>
       </p:ext>
     </p:extLst>
   </p:cSld>
@@ -3424,14 +3151,11 @@
           </a:fontRef>
         </p:style>
         <p:txBody>
-          <a:bodyPr rtlCol="0" anchor="t"/>
-          <a:lstStyle/>
-          <a:p>
-            <a:endParaRPr lang="en-US" sz="2200" dirty="0">
-              <a:solidFill>
-                <a:srgbClr val="F8F8F8"/>
-              </a:solidFill>
-            </a:endParaRPr>
+          <a:bodyPr rtlCol="0" anchor="ctr"/>
+          <a:lstStyle/>
+          <a:p>
+            <a:pPr algn="ctr"/>
+            <a:endParaRPr lang="en-US" dirty="0"/>
           </a:p>
         </p:txBody>
       </p:sp>
@@ -3472,40 +3196,11 @@
           </a:fontRef>
         </p:style>
         <p:txBody>
-          <a:bodyPr rtlCol="0" anchor="t"/>
-          <a:lstStyle/>
-          <a:p>
-            <a:r>
-              <a:rPr lang="en-US" sz="2200" dirty="0" smtClean="0">
-                <a:solidFill>
-                  <a:srgbClr val="F8F8F8"/>
-                </a:solidFill>
-              </a:rPr>
-              <a:t>  </a:t>
-            </a:r>
-          </a:p>
-          <a:p>
-            <a:r>
-              <a:rPr lang="en-US" sz="2200" dirty="0">
-                <a:solidFill>
-                  <a:srgbClr val="F8F8F8"/>
-                </a:solidFill>
-              </a:rPr>
-              <a:t> </a:t>
-            </a:r>
-            <a:r>
-              <a:rPr lang="en-US" sz="2200" dirty="0" smtClean="0">
-                <a:solidFill>
-                  <a:srgbClr val="F8F8F8"/>
-                </a:solidFill>
-              </a:rPr>
-              <a:t> User interface</a:t>
-            </a:r>
-            <a:endParaRPr lang="en-US" sz="2200" dirty="0">
-              <a:solidFill>
-                <a:srgbClr val="F8F8F8"/>
-              </a:solidFill>
-            </a:endParaRPr>
+          <a:bodyPr rtlCol="0" anchor="ctr"/>
+          <a:lstStyle/>
+          <a:p>
+            <a:pPr algn="ctr"/>
+            <a:endParaRPr lang="en-US" sz="2200" dirty="0"/>
           </a:p>
         </p:txBody>
       </p:sp>
@@ -3604,7 +3299,7 @@
       </p:sp>
       <p:sp>
         <p:nvSpPr>
-          <p:cNvPr id="14" name="Rectangle 13"/>
+          <p:cNvPr id="12" name="Rectangle 11"/>
           <p:cNvSpPr/>
           <p:nvPr/>
         </p:nvSpPr>
@@ -3733,7 +3428,7 @@
     </p:spTree>
     <p:extLst>
       <p:ext uri="{BB962C8B-B14F-4D97-AF65-F5344CB8AC3E}">
-        <p14:creationId xmlns:p14="http://schemas.microsoft.com/office/powerpoint/2010/main" val="410750837"/>
+        <p14:creationId xmlns:p14="http://schemas.microsoft.com/office/powerpoint/2010/main" val="1826671997"/>
       </p:ext>
     </p:extLst>
   </p:cSld>
@@ -3853,7 +3548,7 @@
           <a:bodyPr rtlCol="0" anchor="t"/>
           <a:lstStyle/>
           <a:p>
-            <a:endParaRPr lang="en-US" sz="2200" dirty="0" smtClean="0">
+            <a:endParaRPr lang="en-US" sz="2200" dirty="0">
               <a:solidFill>
                 <a:srgbClr val="F8F8F8"/>
               </a:solidFill>
@@ -3901,73 +3596,38 @@
           <a:bodyPr rtlCol="0" anchor="t"/>
           <a:lstStyle/>
           <a:p>
-            <a:pPr marL="111125"/>
-            <a:endParaRPr lang="en-US" sz="2200" dirty="0" smtClean="0">
-              <a:solidFill>
-                <a:srgbClr val="F8F8F8"/>
-              </a:solidFill>
-            </a:endParaRPr>
-          </a:p>
-          <a:p>
-            <a:pPr marL="111125"/>
             <a:r>
               <a:rPr lang="en-US" sz="2200" dirty="0" smtClean="0">
                 <a:solidFill>
                   <a:srgbClr val="F8F8F8"/>
                 </a:solidFill>
               </a:rPr>
-              <a:t>User interface</a:t>
-            </a:r>
-          </a:p>
-          <a:p>
-            <a:pPr marL="111125"/>
+              <a:t>  </a:t>
+            </a:r>
+          </a:p>
+          <a:p>
+            <a:r>
+              <a:rPr lang="en-US" sz="2200" dirty="0">
+                <a:solidFill>
+                  <a:srgbClr val="F8F8F8"/>
+                </a:solidFill>
+              </a:rPr>
+              <a:t> </a:t>
+            </a:r>
+            <a:r>
+              <a:rPr lang="en-US" sz="2200" dirty="0" smtClean="0">
+                <a:solidFill>
+                  <a:srgbClr val="F8F8F8"/>
+                </a:solidFill>
+              </a:rPr>
+              <a:t> User interface</a:t>
+            </a:r>
             <a:endParaRPr lang="en-US" sz="2200" dirty="0">
               <a:solidFill>
                 <a:srgbClr val="F8F8F8"/>
               </a:solidFill>
             </a:endParaRPr>
           </a:p>
-          <a:p>
-            <a:pPr marL="111125"/>
-            <a:endParaRPr lang="en-US" sz="2200" dirty="0" smtClean="0">
-              <a:solidFill>
-                <a:srgbClr val="F8F8F8"/>
-              </a:solidFill>
-            </a:endParaRPr>
-          </a:p>
-          <a:p>
-            <a:pPr marL="454025" indent="-342900">
-              <a:buFont typeface="Arial"/>
-              <a:buChar char="•"/>
-            </a:pPr>
-            <a:r>
-              <a:rPr lang="en-US" sz="2200" dirty="0" smtClean="0">
-                <a:solidFill>
-                  <a:srgbClr val="F8F8F8"/>
-                </a:solidFill>
-              </a:rPr>
-              <a:t>get input</a:t>
-            </a:r>
-          </a:p>
-          <a:p>
-            <a:pPr marL="454025" indent="-342900">
-              <a:buFont typeface="Arial"/>
-              <a:buChar char="•"/>
-            </a:pPr>
-            <a:r>
-              <a:rPr lang="en-US" sz="2200" dirty="0" smtClean="0">
-                <a:solidFill>
-                  <a:srgbClr val="F8F8F8"/>
-                </a:solidFill>
-              </a:rPr>
-              <a:t>display data from model</a:t>
-            </a:r>
-            <a:endParaRPr lang="en-US" sz="2200" dirty="0">
-              <a:solidFill>
-                <a:srgbClr val="F8F8F8"/>
-              </a:solidFill>
-            </a:endParaRPr>
-          </a:p>
         </p:txBody>
       </p:sp>
       <p:sp>
@@ -4065,7 +3725,7 @@
       </p:sp>
       <p:sp>
         <p:nvSpPr>
-          <p:cNvPr id="12" name="Rectangle 11"/>
+          <p:cNvPr id="14" name="Rectangle 13"/>
           <p:cNvSpPr/>
           <p:nvPr/>
         </p:nvSpPr>
@@ -4194,7 +3854,7 @@
     </p:spTree>
     <p:extLst>
       <p:ext uri="{BB962C8B-B14F-4D97-AF65-F5344CB8AC3E}">
-        <p14:creationId xmlns:p14="http://schemas.microsoft.com/office/powerpoint/2010/main" val="507295854"/>
+        <p14:creationId xmlns:p14="http://schemas.microsoft.com/office/powerpoint/2010/main" val="410750837"/>
       </p:ext>
     </p:extLst>
   </p:cSld>
@@ -4314,23 +3974,11 @@
           <a:bodyPr rtlCol="0" anchor="t"/>
           <a:lstStyle/>
           <a:p>
-            <a:pPr marL="111125"/>
             <a:endParaRPr lang="en-US" sz="2200" dirty="0" smtClean="0">
               <a:solidFill>
                 <a:srgbClr val="F8F8F8"/>
               </a:solidFill>
             </a:endParaRPr>
-          </a:p>
-          <a:p>
-            <a:pPr marL="111125"/>
-            <a:r>
-              <a:rPr lang="en-US" sz="2200" dirty="0" smtClean="0">
-                <a:solidFill>
-                  <a:srgbClr val="F8F8F8"/>
-                </a:solidFill>
-              </a:rPr>
-              <a:t>Communicate</a:t>
-            </a:r>
           </a:p>
         </p:txBody>
       </p:sp>
@@ -4667,7 +4315,7 @@
     </p:spTree>
     <p:extLst>
       <p:ext uri="{BB962C8B-B14F-4D97-AF65-F5344CB8AC3E}">
-        <p14:creationId xmlns:p14="http://schemas.microsoft.com/office/powerpoint/2010/main" val="1876545635"/>
+        <p14:creationId xmlns:p14="http://schemas.microsoft.com/office/powerpoint/2010/main" val="507295854"/>
       </p:ext>
     </p:extLst>
   </p:cSld>
@@ -4805,64 +4453,6 @@
               <a:t>Communicate</a:t>
             </a:r>
           </a:p>
-          <a:p>
-            <a:pPr marL="111125"/>
-            <a:endParaRPr lang="en-US" sz="2200" dirty="0" smtClean="0">
-              <a:solidFill>
-                <a:srgbClr val="F8F8F8"/>
-              </a:solidFill>
-            </a:endParaRPr>
-          </a:p>
-          <a:p>
-            <a:pPr marL="111125"/>
-            <a:endParaRPr lang="en-US" sz="2200" dirty="0">
-              <a:solidFill>
-                <a:srgbClr val="F8F8F8"/>
-              </a:solidFill>
-            </a:endParaRPr>
-          </a:p>
-          <a:p>
-            <a:pPr marL="295275" indent="-184150" defTabSz="349250">
-              <a:buFont typeface="Arial"/>
-              <a:buChar char="•"/>
-            </a:pPr>
-            <a:r>
-              <a:rPr lang="en-US" sz="2200" dirty="0" smtClean="0">
-                <a:solidFill>
-                  <a:srgbClr val="F8F8F8"/>
-                </a:solidFill>
-              </a:rPr>
-              <a:t>handle input</a:t>
-            </a:r>
-          </a:p>
-          <a:p>
-            <a:pPr marL="295275" indent="-184150">
-              <a:buFont typeface="Arial"/>
-              <a:buChar char="•"/>
-            </a:pPr>
-            <a:r>
-              <a:rPr lang="en-US" sz="2200" dirty="0" smtClean="0">
-                <a:solidFill>
-                  <a:srgbClr val="F8F8F8"/>
-                </a:solidFill>
-              </a:rPr>
-              <a:t>update model</a:t>
-            </a:r>
-          </a:p>
-          <a:p>
-            <a:pPr marL="295275" indent="-184150">
-              <a:buFont typeface="Arial"/>
-              <a:buChar char="•"/>
-            </a:pPr>
-            <a:r>
-              <a:rPr lang="en-US" sz="2200" dirty="0" smtClean="0">
-                <a:solidFill>
-                  <a:srgbClr val="F8F8F8"/>
-                </a:solidFill>
-              </a:rPr>
-              <a:t>send data to view</a:t>
-            </a:r>
-          </a:p>
         </p:txBody>
       </p:sp>
       <p:sp>
@@ -5198,7 +4788,7 @@
     </p:spTree>
     <p:extLst>
       <p:ext uri="{BB962C8B-B14F-4D97-AF65-F5344CB8AC3E}">
-        <p14:creationId xmlns:p14="http://schemas.microsoft.com/office/powerpoint/2010/main" val="1909170375"/>
+        <p14:creationId xmlns:p14="http://schemas.microsoft.com/office/powerpoint/2010/main" val="1876545635"/>
       </p:ext>
     </p:extLst>
   </p:cSld>
@@ -5249,30 +4839,7 @@
           <a:p>
             <a:r>
               <a:rPr lang="en-US" dirty="0" smtClean="0"/>
-              <a:t>M-V-C Bernie’s Bistro</a:t>
-            </a:r>
-            <a:endParaRPr lang="en-US" dirty="0"/>
-          </a:p>
-        </p:txBody>
-      </p:sp>
-      <p:sp>
-        <p:nvSpPr>
-          <p:cNvPr id="4" name="Content Placeholder 3"/>
-          <p:cNvSpPr>
-            <a:spLocks noGrp="1"/>
-          </p:cNvSpPr>
-          <p:nvPr>
-            <p:ph idx="1"/>
-          </p:nvPr>
-        </p:nvSpPr>
-        <p:spPr/>
-        <p:txBody>
-          <a:bodyPr/>
-          <a:lstStyle/>
-          <a:p>
-            <a:r>
-              <a:rPr lang="en-US" dirty="0" smtClean="0"/>
-              <a:t>How would Bernie’s Bistro look following the M-V-C pattern?</a:t>
+              <a:t>M-V-C Design Pattern</a:t>
             </a:r>
             <a:endParaRPr lang="en-US" dirty="0"/>
           </a:p>
@@ -5301,10 +4868,458 @@
           </a:p>
         </p:txBody>
       </p:sp>
+      <p:sp>
+        <p:nvSpPr>
+          <p:cNvPr id="5" name="Rectangle 4"/>
+          <p:cNvSpPr/>
+          <p:nvPr/>
+        </p:nvSpPr>
+        <p:spPr>
+          <a:xfrm>
+            <a:off x="3493911" y="2668662"/>
+            <a:ext cx="2150017" cy="3058909"/>
+          </a:xfrm>
+          <a:prstGeom prst="rect">
+            <a:avLst/>
+          </a:prstGeom>
+          <a:solidFill>
+            <a:srgbClr val="EA4A3C"/>
+          </a:solidFill>
+          <a:ln>
+            <a:noFill/>
+          </a:ln>
+          <a:effectLst/>
+        </p:spPr>
+        <p:style>
+          <a:lnRef idx="1">
+            <a:schemeClr val="accent1"/>
+          </a:lnRef>
+          <a:fillRef idx="3">
+            <a:schemeClr val="accent1"/>
+          </a:fillRef>
+          <a:effectRef idx="2">
+            <a:schemeClr val="accent1"/>
+          </a:effectRef>
+          <a:fontRef idx="minor">
+            <a:schemeClr val="lt1"/>
+          </a:fontRef>
+        </p:style>
+        <p:txBody>
+          <a:bodyPr rtlCol="0" anchor="t"/>
+          <a:lstStyle/>
+          <a:p>
+            <a:pPr marL="111125"/>
+            <a:endParaRPr lang="en-US" sz="2200" dirty="0" smtClean="0">
+              <a:solidFill>
+                <a:srgbClr val="F8F8F8"/>
+              </a:solidFill>
+            </a:endParaRPr>
+          </a:p>
+          <a:p>
+            <a:pPr marL="111125"/>
+            <a:r>
+              <a:rPr lang="en-US" sz="2200" dirty="0" smtClean="0">
+                <a:solidFill>
+                  <a:srgbClr val="F8F8F8"/>
+                </a:solidFill>
+              </a:rPr>
+              <a:t>Communicate</a:t>
+            </a:r>
+          </a:p>
+          <a:p>
+            <a:pPr marL="111125"/>
+            <a:endParaRPr lang="en-US" sz="2200" dirty="0" smtClean="0">
+              <a:solidFill>
+                <a:srgbClr val="F8F8F8"/>
+              </a:solidFill>
+            </a:endParaRPr>
+          </a:p>
+          <a:p>
+            <a:pPr marL="111125"/>
+            <a:endParaRPr lang="en-US" sz="2200" dirty="0">
+              <a:solidFill>
+                <a:srgbClr val="F8F8F8"/>
+              </a:solidFill>
+            </a:endParaRPr>
+          </a:p>
+          <a:p>
+            <a:pPr marL="295275" indent="-184150" defTabSz="349250">
+              <a:buFont typeface="Arial"/>
+              <a:buChar char="•"/>
+            </a:pPr>
+            <a:r>
+              <a:rPr lang="en-US" sz="2200" dirty="0" smtClean="0">
+                <a:solidFill>
+                  <a:srgbClr val="F8F8F8"/>
+                </a:solidFill>
+              </a:rPr>
+              <a:t>handle input</a:t>
+            </a:r>
+          </a:p>
+          <a:p>
+            <a:pPr marL="295275" indent="-184150">
+              <a:buFont typeface="Arial"/>
+              <a:buChar char="•"/>
+            </a:pPr>
+            <a:r>
+              <a:rPr lang="en-US" sz="2200" dirty="0" smtClean="0">
+                <a:solidFill>
+                  <a:srgbClr val="F8F8F8"/>
+                </a:solidFill>
+              </a:rPr>
+              <a:t>update model</a:t>
+            </a:r>
+          </a:p>
+          <a:p>
+            <a:pPr marL="295275" indent="-184150">
+              <a:buFont typeface="Arial"/>
+              <a:buChar char="•"/>
+            </a:pPr>
+            <a:r>
+              <a:rPr lang="en-US" sz="2200" dirty="0" smtClean="0">
+                <a:solidFill>
+                  <a:srgbClr val="F8F8F8"/>
+                </a:solidFill>
+              </a:rPr>
+              <a:t>send data to view</a:t>
+            </a:r>
+          </a:p>
+        </p:txBody>
+      </p:sp>
+      <p:sp>
+        <p:nvSpPr>
+          <p:cNvPr id="6" name="Rectangle 5"/>
+          <p:cNvSpPr/>
+          <p:nvPr/>
+        </p:nvSpPr>
+        <p:spPr>
+          <a:xfrm>
+            <a:off x="6536783" y="2723877"/>
+            <a:ext cx="2150017" cy="3058909"/>
+          </a:xfrm>
+          <a:prstGeom prst="rect">
+            <a:avLst/>
+          </a:prstGeom>
+          <a:solidFill>
+            <a:schemeClr val="accent6"/>
+          </a:solidFill>
+          <a:ln>
+            <a:noFill/>
+          </a:ln>
+          <a:effectLst/>
+        </p:spPr>
+        <p:style>
+          <a:lnRef idx="1">
+            <a:schemeClr val="accent1"/>
+          </a:lnRef>
+          <a:fillRef idx="3">
+            <a:schemeClr val="accent1"/>
+          </a:fillRef>
+          <a:effectRef idx="2">
+            <a:schemeClr val="accent1"/>
+          </a:effectRef>
+          <a:fontRef idx="minor">
+            <a:schemeClr val="lt1"/>
+          </a:fontRef>
+        </p:style>
+        <p:txBody>
+          <a:bodyPr rtlCol="0" anchor="t"/>
+          <a:lstStyle/>
+          <a:p>
+            <a:pPr marL="111125"/>
+            <a:endParaRPr lang="en-US" sz="2200" dirty="0" smtClean="0">
+              <a:solidFill>
+                <a:srgbClr val="F8F8F8"/>
+              </a:solidFill>
+            </a:endParaRPr>
+          </a:p>
+          <a:p>
+            <a:pPr marL="111125"/>
+            <a:r>
+              <a:rPr lang="en-US" sz="2200" dirty="0" smtClean="0">
+                <a:solidFill>
+                  <a:srgbClr val="F8F8F8"/>
+                </a:solidFill>
+              </a:rPr>
+              <a:t>User interface</a:t>
+            </a:r>
+          </a:p>
+          <a:p>
+            <a:pPr marL="111125"/>
+            <a:endParaRPr lang="en-US" sz="2200" dirty="0">
+              <a:solidFill>
+                <a:srgbClr val="F8F8F8"/>
+              </a:solidFill>
+            </a:endParaRPr>
+          </a:p>
+          <a:p>
+            <a:pPr marL="111125"/>
+            <a:endParaRPr lang="en-US" sz="2200" dirty="0" smtClean="0">
+              <a:solidFill>
+                <a:srgbClr val="F8F8F8"/>
+              </a:solidFill>
+            </a:endParaRPr>
+          </a:p>
+          <a:p>
+            <a:pPr marL="454025" indent="-342900">
+              <a:buFont typeface="Arial"/>
+              <a:buChar char="•"/>
+            </a:pPr>
+            <a:r>
+              <a:rPr lang="en-US" sz="2200" dirty="0" smtClean="0">
+                <a:solidFill>
+                  <a:srgbClr val="F8F8F8"/>
+                </a:solidFill>
+              </a:rPr>
+              <a:t>get input</a:t>
+            </a:r>
+          </a:p>
+          <a:p>
+            <a:pPr marL="454025" indent="-342900">
+              <a:buFont typeface="Arial"/>
+              <a:buChar char="•"/>
+            </a:pPr>
+            <a:r>
+              <a:rPr lang="en-US" sz="2200" dirty="0" smtClean="0">
+                <a:solidFill>
+                  <a:srgbClr val="F8F8F8"/>
+                </a:solidFill>
+              </a:rPr>
+              <a:t>display data from model</a:t>
+            </a:r>
+            <a:endParaRPr lang="en-US" sz="2200" dirty="0">
+              <a:solidFill>
+                <a:srgbClr val="F8F8F8"/>
+              </a:solidFill>
+            </a:endParaRPr>
+          </a:p>
+        </p:txBody>
+      </p:sp>
+      <p:sp>
+        <p:nvSpPr>
+          <p:cNvPr id="8" name="TextBox 7"/>
+          <p:cNvSpPr txBox="1"/>
+          <p:nvPr/>
+        </p:nvSpPr>
+        <p:spPr>
+          <a:xfrm>
+            <a:off x="457200" y="1865376"/>
+            <a:ext cx="2204881" cy="584776"/>
+          </a:xfrm>
+          <a:prstGeom prst="rect">
+            <a:avLst/>
+          </a:prstGeom>
+          <a:noFill/>
+        </p:spPr>
+        <p:txBody>
+          <a:bodyPr wrap="square" rtlCol="0">
+            <a:spAutoFit/>
+          </a:bodyPr>
+          <a:lstStyle/>
+          <a:p>
+            <a:pPr algn="ctr"/>
+            <a:r>
+              <a:rPr lang="en-US" sz="3200" dirty="0" smtClean="0"/>
+              <a:t>Model</a:t>
+            </a:r>
+            <a:endParaRPr lang="en-US" sz="3200" dirty="0"/>
+          </a:p>
+        </p:txBody>
+      </p:sp>
+      <p:sp>
+        <p:nvSpPr>
+          <p:cNvPr id="10" name="TextBox 9"/>
+          <p:cNvSpPr txBox="1"/>
+          <p:nvPr/>
+        </p:nvSpPr>
+        <p:spPr>
+          <a:xfrm>
+            <a:off x="3493911" y="1865376"/>
+            <a:ext cx="2204881" cy="584776"/>
+          </a:xfrm>
+          <a:prstGeom prst="rect">
+            <a:avLst/>
+          </a:prstGeom>
+          <a:noFill/>
+        </p:spPr>
+        <p:txBody>
+          <a:bodyPr wrap="square" rtlCol="0">
+            <a:spAutoFit/>
+          </a:bodyPr>
+          <a:lstStyle/>
+          <a:p>
+            <a:pPr algn="ctr"/>
+            <a:r>
+              <a:rPr lang="en-US" sz="3200" dirty="0" smtClean="0"/>
+              <a:t>Controller</a:t>
+            </a:r>
+            <a:endParaRPr lang="en-US" sz="3200" dirty="0"/>
+          </a:p>
+        </p:txBody>
+      </p:sp>
+      <p:sp>
+        <p:nvSpPr>
+          <p:cNvPr id="11" name="TextBox 10"/>
+          <p:cNvSpPr txBox="1"/>
+          <p:nvPr/>
+        </p:nvSpPr>
+        <p:spPr>
+          <a:xfrm>
+            <a:off x="6536783" y="1865376"/>
+            <a:ext cx="2204881" cy="584776"/>
+          </a:xfrm>
+          <a:prstGeom prst="rect">
+            <a:avLst/>
+          </a:prstGeom>
+          <a:noFill/>
+        </p:spPr>
+        <p:txBody>
+          <a:bodyPr wrap="square" rtlCol="0">
+            <a:spAutoFit/>
+          </a:bodyPr>
+          <a:lstStyle/>
+          <a:p>
+            <a:pPr algn="ctr"/>
+            <a:r>
+              <a:rPr lang="en-US" sz="3200" dirty="0" smtClean="0"/>
+              <a:t>View</a:t>
+            </a:r>
+            <a:endParaRPr lang="en-US" sz="3200" dirty="0"/>
+          </a:p>
+        </p:txBody>
+      </p:sp>
+      <p:sp>
+        <p:nvSpPr>
+          <p:cNvPr id="12" name="Rectangle 11"/>
+          <p:cNvSpPr/>
+          <p:nvPr/>
+        </p:nvSpPr>
+        <p:spPr>
+          <a:xfrm>
+            <a:off x="512064" y="2723877"/>
+            <a:ext cx="2150017" cy="3058909"/>
+          </a:xfrm>
+          <a:prstGeom prst="rect">
+            <a:avLst/>
+          </a:prstGeom>
+          <a:solidFill>
+            <a:srgbClr val="00A9B9"/>
+          </a:solidFill>
+          <a:ln>
+            <a:noFill/>
+          </a:ln>
+          <a:effectLst/>
+        </p:spPr>
+        <p:style>
+          <a:lnRef idx="1">
+            <a:schemeClr val="accent1"/>
+          </a:lnRef>
+          <a:fillRef idx="3">
+            <a:schemeClr val="accent1"/>
+          </a:fillRef>
+          <a:effectRef idx="2">
+            <a:schemeClr val="accent1"/>
+          </a:effectRef>
+          <a:fontRef idx="minor">
+            <a:schemeClr val="lt1"/>
+          </a:fontRef>
+        </p:style>
+        <p:txBody>
+          <a:bodyPr rtlCol="0" anchor="t"/>
+          <a:lstStyle/>
+          <a:p>
+            <a:r>
+              <a:rPr lang="en-US" sz="2200" dirty="0" smtClean="0">
+                <a:solidFill>
+                  <a:schemeClr val="accent1"/>
+                </a:solidFill>
+              </a:rPr>
+              <a:t> </a:t>
+            </a:r>
+            <a:endParaRPr lang="en-US" sz="2200" dirty="0">
+              <a:solidFill>
+                <a:schemeClr val="accent1"/>
+              </a:solidFill>
+            </a:endParaRPr>
+          </a:p>
+          <a:p>
+            <a:pPr marL="111125"/>
+            <a:r>
+              <a:rPr lang="en-US" sz="2200" dirty="0" smtClean="0">
+                <a:solidFill>
+                  <a:schemeClr val="accent1"/>
+                </a:solidFill>
+              </a:rPr>
+              <a:t>Data &amp;</a:t>
+            </a:r>
+          </a:p>
+          <a:p>
+            <a:pPr marL="111125"/>
+            <a:r>
+              <a:rPr lang="en-US" sz="2200" dirty="0" smtClean="0">
+                <a:solidFill>
+                  <a:schemeClr val="accent1"/>
+                </a:solidFill>
+              </a:rPr>
+              <a:t>Business logic</a:t>
+            </a:r>
+          </a:p>
+          <a:p>
+            <a:pPr marL="111125"/>
+            <a:endParaRPr lang="en-US" sz="2200" dirty="0">
+              <a:solidFill>
+                <a:schemeClr val="accent1"/>
+              </a:solidFill>
+            </a:endParaRPr>
+          </a:p>
+          <a:p>
+            <a:pPr marL="342900" indent="-231775" defTabSz="349250">
+              <a:buFont typeface="Arial"/>
+              <a:buChar char="•"/>
+            </a:pPr>
+            <a:r>
+              <a:rPr lang="en-US" sz="2200" dirty="0" smtClean="0">
+                <a:solidFill>
+                  <a:schemeClr val="accent1"/>
+                </a:solidFill>
+              </a:rPr>
+              <a:t>classes</a:t>
+            </a:r>
+          </a:p>
+          <a:p>
+            <a:pPr marL="342900" indent="-231775" defTabSz="349250">
+              <a:buFont typeface="Arial"/>
+              <a:buChar char="•"/>
+            </a:pPr>
+            <a:r>
+              <a:rPr lang="en-US" sz="2200" dirty="0" smtClean="0">
+                <a:solidFill>
+                  <a:schemeClr val="accent1"/>
+                </a:solidFill>
+              </a:rPr>
+              <a:t>modules</a:t>
+            </a:r>
+          </a:p>
+          <a:p>
+            <a:pPr marL="342900" indent="-231775" defTabSz="349250">
+              <a:buFont typeface="Arial"/>
+              <a:buChar char="•"/>
+            </a:pPr>
+            <a:r>
+              <a:rPr lang="en-US" sz="2200" dirty="0" smtClean="0">
+                <a:solidFill>
+                  <a:schemeClr val="accent1"/>
+                </a:solidFill>
+              </a:rPr>
+              <a:t>databases</a:t>
+            </a:r>
+          </a:p>
+        </p:txBody>
+      </p:sp>
     </p:spTree>
     <p:extLst>
       <p:ext uri="{BB962C8B-B14F-4D97-AF65-F5344CB8AC3E}">
-        <p14:creationId xmlns:p14="http://schemas.microsoft.com/office/powerpoint/2010/main" val="1729405643"/>
+        <p14:creationId xmlns:p14="http://schemas.microsoft.com/office/powerpoint/2010/main" val="1909170375"/>
       </p:ext>
     </p:extLst>
   </p:cSld>
@@ -5354,9 +5369,33 @@
           <a:lstStyle/>
           <a:p>
             <a:r>
-              <a:rPr lang="en-US" dirty="0"/>
+              <a:rPr lang="en-US" dirty="0" smtClean="0"/>
               <a:t>M-V-C Bernie’s Bistro</a:t>
             </a:r>
+            <a:endParaRPr lang="en-US" dirty="0"/>
+          </a:p>
+        </p:txBody>
+      </p:sp>
+      <p:sp>
+        <p:nvSpPr>
+          <p:cNvPr id="4" name="Content Placeholder 3"/>
+          <p:cNvSpPr>
+            <a:spLocks noGrp="1"/>
+          </p:cNvSpPr>
+          <p:nvPr>
+            <p:ph idx="1"/>
+          </p:nvPr>
+        </p:nvSpPr>
+        <p:spPr/>
+        <p:txBody>
+          <a:bodyPr/>
+          <a:lstStyle/>
+          <a:p>
+            <a:r>
+              <a:rPr lang="en-US" dirty="0" smtClean="0"/>
+              <a:t>How would Bernie’s Bistro look following the M-V-C pattern?</a:t>
+            </a:r>
+            <a:endParaRPr lang="en-US" dirty="0"/>
           </a:p>
         </p:txBody>
       </p:sp>
@@ -5383,341 +5422,10 @@
           </a:p>
         </p:txBody>
       </p:sp>
-      <p:sp>
-        <p:nvSpPr>
-          <p:cNvPr id="4" name="Rectangle 3"/>
-          <p:cNvSpPr/>
-          <p:nvPr/>
-        </p:nvSpPr>
-        <p:spPr>
-          <a:xfrm>
-            <a:off x="512064" y="2723877"/>
-            <a:ext cx="2150017" cy="3058909"/>
-          </a:xfrm>
-          <a:prstGeom prst="rect">
-            <a:avLst/>
-          </a:prstGeom>
-          <a:solidFill>
-            <a:srgbClr val="00A9B9"/>
-          </a:solidFill>
-          <a:ln>
-            <a:noFill/>
-          </a:ln>
-          <a:effectLst/>
-        </p:spPr>
-        <p:style>
-          <a:lnRef idx="1">
-            <a:schemeClr val="accent1"/>
-          </a:lnRef>
-          <a:fillRef idx="3">
-            <a:schemeClr val="accent1"/>
-          </a:fillRef>
-          <a:effectRef idx="2">
-            <a:schemeClr val="accent1"/>
-          </a:effectRef>
-          <a:fontRef idx="minor">
-            <a:schemeClr val="lt1"/>
-          </a:fontRef>
-        </p:style>
-        <p:txBody>
-          <a:bodyPr rtlCol="0" anchor="t"/>
-          <a:lstStyle/>
-          <a:p>
-            <a:r>
-              <a:rPr lang="en-US" sz="2200" dirty="0" smtClean="0">
-                <a:solidFill>
-                  <a:schemeClr val="accent1"/>
-                </a:solidFill>
-              </a:rPr>
-              <a:t> </a:t>
-            </a:r>
-            <a:endParaRPr lang="en-US" sz="2200" dirty="0">
-              <a:solidFill>
-                <a:schemeClr val="accent1"/>
-              </a:solidFill>
-            </a:endParaRPr>
-          </a:p>
-          <a:p>
-            <a:pPr marL="111125"/>
-            <a:r>
-              <a:rPr lang="en-US" sz="2200" dirty="0" smtClean="0">
-                <a:solidFill>
-                  <a:schemeClr val="accent1"/>
-                </a:solidFill>
-              </a:rPr>
-              <a:t>Data &amp;</a:t>
-            </a:r>
-          </a:p>
-          <a:p>
-            <a:pPr marL="111125"/>
-            <a:r>
-              <a:rPr lang="en-US" sz="2200" dirty="0" smtClean="0">
-                <a:solidFill>
-                  <a:schemeClr val="accent1"/>
-                </a:solidFill>
-              </a:rPr>
-              <a:t>Business logic</a:t>
-            </a:r>
-          </a:p>
-          <a:p>
-            <a:pPr marL="111125"/>
-            <a:endParaRPr lang="en-US" sz="2200" dirty="0">
-              <a:solidFill>
-                <a:schemeClr val="accent1"/>
-              </a:solidFill>
-            </a:endParaRPr>
-          </a:p>
-        </p:txBody>
-      </p:sp>
-      <p:sp>
-        <p:nvSpPr>
-          <p:cNvPr id="5" name="Rectangle 4"/>
-          <p:cNvSpPr/>
-          <p:nvPr/>
-        </p:nvSpPr>
-        <p:spPr>
-          <a:xfrm>
-            <a:off x="3493911" y="2668662"/>
-            <a:ext cx="2150017" cy="3058909"/>
-          </a:xfrm>
-          <a:prstGeom prst="rect">
-            <a:avLst/>
-          </a:prstGeom>
-          <a:solidFill>
-            <a:srgbClr val="EA4A3C"/>
-          </a:solidFill>
-          <a:ln>
-            <a:noFill/>
-          </a:ln>
-          <a:effectLst/>
-        </p:spPr>
-        <p:style>
-          <a:lnRef idx="1">
-            <a:schemeClr val="accent1"/>
-          </a:lnRef>
-          <a:fillRef idx="3">
-            <a:schemeClr val="accent1"/>
-          </a:fillRef>
-          <a:effectRef idx="2">
-            <a:schemeClr val="accent1"/>
-          </a:effectRef>
-          <a:fontRef idx="minor">
-            <a:schemeClr val="lt1"/>
-          </a:fontRef>
-        </p:style>
-        <p:txBody>
-          <a:bodyPr rtlCol="0" anchor="t"/>
-          <a:lstStyle/>
-          <a:p>
-            <a:pPr marL="111125"/>
-            <a:endParaRPr lang="en-US" sz="2200" dirty="0" smtClean="0">
-              <a:solidFill>
-                <a:srgbClr val="F8F8F8"/>
-              </a:solidFill>
-            </a:endParaRPr>
-          </a:p>
-          <a:p>
-            <a:pPr marL="111125"/>
-            <a:r>
-              <a:rPr lang="en-US" sz="2200" dirty="0" smtClean="0">
-                <a:solidFill>
-                  <a:srgbClr val="F8F8F8"/>
-                </a:solidFill>
-              </a:rPr>
-              <a:t>Communicate</a:t>
-            </a:r>
-          </a:p>
-          <a:p>
-            <a:pPr marL="111125"/>
-            <a:endParaRPr lang="en-US" sz="2200" dirty="0" smtClean="0">
-              <a:solidFill>
-                <a:srgbClr val="F8F8F8"/>
-              </a:solidFill>
-            </a:endParaRPr>
-          </a:p>
-          <a:p>
-            <a:pPr marL="111125"/>
-            <a:endParaRPr lang="en-US" sz="2200" dirty="0">
-              <a:solidFill>
-                <a:srgbClr val="F8F8F8"/>
-              </a:solidFill>
-            </a:endParaRPr>
-          </a:p>
-        </p:txBody>
-      </p:sp>
-      <p:sp>
-        <p:nvSpPr>
-          <p:cNvPr id="6" name="Rectangle 5"/>
-          <p:cNvSpPr/>
-          <p:nvPr/>
-        </p:nvSpPr>
-        <p:spPr>
-          <a:xfrm>
-            <a:off x="6536783" y="2723877"/>
-            <a:ext cx="2150017" cy="3058909"/>
-          </a:xfrm>
-          <a:prstGeom prst="rect">
-            <a:avLst/>
-          </a:prstGeom>
-          <a:solidFill>
-            <a:schemeClr val="accent6"/>
-          </a:solidFill>
-          <a:ln>
-            <a:noFill/>
-          </a:ln>
-          <a:effectLst/>
-        </p:spPr>
-        <p:style>
-          <a:lnRef idx="1">
-            <a:schemeClr val="accent1"/>
-          </a:lnRef>
-          <a:fillRef idx="3">
-            <a:schemeClr val="accent1"/>
-          </a:fillRef>
-          <a:effectRef idx="2">
-            <a:schemeClr val="accent1"/>
-          </a:effectRef>
-          <a:fontRef idx="minor">
-            <a:schemeClr val="lt1"/>
-          </a:fontRef>
-        </p:style>
-        <p:txBody>
-          <a:bodyPr rtlCol="0" anchor="t"/>
-          <a:lstStyle/>
-          <a:p>
-            <a:pPr marL="111125"/>
-            <a:endParaRPr lang="en-US" sz="2200" dirty="0" smtClean="0">
-              <a:solidFill>
-                <a:srgbClr val="F8F8F8"/>
-              </a:solidFill>
-            </a:endParaRPr>
-          </a:p>
-          <a:p>
-            <a:pPr marL="111125"/>
-            <a:r>
-              <a:rPr lang="en-US" sz="2200" dirty="0" smtClean="0">
-                <a:solidFill>
-                  <a:srgbClr val="F8F8F8"/>
-                </a:solidFill>
-              </a:rPr>
-              <a:t>User interface</a:t>
-            </a:r>
-          </a:p>
-          <a:p>
-            <a:pPr marL="111125"/>
-            <a:endParaRPr lang="en-US" sz="2200" dirty="0">
-              <a:solidFill>
-                <a:srgbClr val="F8F8F8"/>
-              </a:solidFill>
-            </a:endParaRPr>
-          </a:p>
-          <a:p>
-            <a:pPr marL="111125"/>
-            <a:endParaRPr lang="en-US" sz="2200" dirty="0" smtClean="0">
-              <a:solidFill>
-                <a:srgbClr val="F8F8F8"/>
-              </a:solidFill>
-            </a:endParaRPr>
-          </a:p>
-        </p:txBody>
-      </p:sp>
-      <p:sp>
-        <p:nvSpPr>
-          <p:cNvPr id="8" name="TextBox 7"/>
-          <p:cNvSpPr txBox="1"/>
-          <p:nvPr/>
-        </p:nvSpPr>
-        <p:spPr>
-          <a:xfrm>
-            <a:off x="457200" y="1865376"/>
-            <a:ext cx="2204881" cy="584776"/>
-          </a:xfrm>
-          <a:prstGeom prst="rect">
-            <a:avLst/>
-          </a:prstGeom>
-          <a:noFill/>
-        </p:spPr>
-        <p:txBody>
-          <a:bodyPr wrap="square" rtlCol="0">
-            <a:spAutoFit/>
-          </a:bodyPr>
-          <a:lstStyle/>
-          <a:p>
-            <a:pPr algn="ctr"/>
-            <a:r>
-              <a:rPr lang="en-US" sz="3200" dirty="0" smtClean="0"/>
-              <a:t>Model</a:t>
-            </a:r>
-            <a:endParaRPr lang="en-US" sz="3200" dirty="0"/>
-          </a:p>
-        </p:txBody>
-      </p:sp>
-      <p:sp>
-        <p:nvSpPr>
-          <p:cNvPr id="10" name="TextBox 9"/>
-          <p:cNvSpPr txBox="1"/>
-          <p:nvPr/>
-        </p:nvSpPr>
-        <p:spPr>
-          <a:xfrm>
-            <a:off x="3493911" y="1865376"/>
-            <a:ext cx="2204881" cy="584776"/>
-          </a:xfrm>
-          <a:prstGeom prst="rect">
-            <a:avLst/>
-          </a:prstGeom>
-          <a:noFill/>
-        </p:spPr>
-        <p:txBody>
-          <a:bodyPr wrap="square" rtlCol="0">
-            <a:spAutoFit/>
-          </a:bodyPr>
-          <a:lstStyle/>
-          <a:p>
-            <a:pPr algn="ctr"/>
-            <a:r>
-              <a:rPr lang="en-US" sz="3200" dirty="0" smtClean="0"/>
-              <a:t>Controller</a:t>
-            </a:r>
-            <a:endParaRPr lang="en-US" sz="3200" dirty="0"/>
-          </a:p>
-        </p:txBody>
-      </p:sp>
-      <p:sp>
-        <p:nvSpPr>
-          <p:cNvPr id="11" name="TextBox 10"/>
-          <p:cNvSpPr txBox="1"/>
-          <p:nvPr/>
-        </p:nvSpPr>
-        <p:spPr>
-          <a:xfrm>
-            <a:off x="6536783" y="1865376"/>
-            <a:ext cx="2204881" cy="584776"/>
-          </a:xfrm>
-          <a:prstGeom prst="rect">
-            <a:avLst/>
-          </a:prstGeom>
-          <a:noFill/>
-        </p:spPr>
-        <p:txBody>
-          <a:bodyPr wrap="square" rtlCol="0">
-            <a:spAutoFit/>
-          </a:bodyPr>
-          <a:lstStyle/>
-          <a:p>
-            <a:pPr algn="ctr"/>
-            <a:r>
-              <a:rPr lang="en-US" sz="3200" dirty="0" smtClean="0"/>
-              <a:t>View</a:t>
-            </a:r>
-            <a:endParaRPr lang="en-US" sz="3200" dirty="0"/>
-          </a:p>
-        </p:txBody>
-      </p:sp>
     </p:spTree>
     <p:extLst>
       <p:ext uri="{BB962C8B-B14F-4D97-AF65-F5344CB8AC3E}">
-        <p14:creationId xmlns:p14="http://schemas.microsoft.com/office/powerpoint/2010/main" val="1504888521"/>
+        <p14:creationId xmlns:p14="http://schemas.microsoft.com/office/powerpoint/2010/main" val="1729405643"/>
       </p:ext>
     </p:extLst>
   </p:cSld>
@@ -5874,53 +5582,6 @@
           </a:p>
           <a:p>
             <a:pPr marL="111125"/>
-            <a:endParaRPr lang="en-US" sz="2200" dirty="0" smtClean="0">
-              <a:solidFill>
-                <a:schemeClr val="accent1"/>
-              </a:solidFill>
-            </a:endParaRPr>
-          </a:p>
-          <a:p>
-            <a:pPr marL="349250" indent="-238125">
-              <a:buFont typeface="Arial"/>
-              <a:buChar char="•"/>
-            </a:pPr>
-            <a:r>
-              <a:rPr lang="en-US" sz="2200" dirty="0" smtClean="0">
-                <a:solidFill>
-                  <a:schemeClr val="accent1"/>
-                </a:solidFill>
-              </a:rPr>
-              <a:t>Bistro</a:t>
-            </a:r>
-          </a:p>
-          <a:p>
-            <a:pPr marL="349250" indent="-238125">
-              <a:buFont typeface="Arial"/>
-              <a:buChar char="•"/>
-            </a:pPr>
-            <a:r>
-              <a:rPr lang="en-US" sz="2200" dirty="0" smtClean="0">
-                <a:solidFill>
-                  <a:schemeClr val="accent1"/>
-                </a:solidFill>
-              </a:rPr>
-              <a:t>Recipe</a:t>
-            </a:r>
-          </a:p>
-          <a:p>
-            <a:pPr marL="349250" indent="-238125">
-              <a:buFont typeface="Arial"/>
-              <a:buChar char="•"/>
-            </a:pPr>
-            <a:r>
-              <a:rPr lang="en-US" sz="2200" dirty="0" err="1" smtClean="0">
-                <a:solidFill>
-                  <a:schemeClr val="accent1"/>
-                </a:solidFill>
-              </a:rPr>
-              <a:t>CSVParsing</a:t>
-            </a:r>
             <a:endParaRPr lang="en-US" sz="2200" dirty="0">
               <a:solidFill>
                 <a:schemeClr val="accent1"/>
@@ -6177,7 +5838,7 @@
     </p:spTree>
     <p:extLst>
       <p:ext uri="{BB962C8B-B14F-4D97-AF65-F5344CB8AC3E}">
-        <p14:creationId xmlns:p14="http://schemas.microsoft.com/office/powerpoint/2010/main" val="3671947589"/>
+        <p14:creationId xmlns:p14="http://schemas.microsoft.com/office/powerpoint/2010/main" val="1504888521"/>
       </p:ext>
     </p:extLst>
   </p:cSld>
@@ -6228,58 +5889,71 @@
           </a:bodyPr>
           <a:lstStyle/>
           <a:p>
-            <a:r>
-              <a:rPr lang="en-US" sz="2500" dirty="0" smtClean="0"/>
-              <a:t>Where do you put it?</a:t>
-            </a:r>
-          </a:p>
-          <a:p>
-            <a:r>
-              <a:rPr lang="en-US" sz="2500" dirty="0" smtClean="0"/>
-              <a:t>Testing methods that end in puts is </a:t>
-            </a:r>
-            <a:r>
-              <a:rPr lang="en-US" sz="2500" dirty="0" err="1" smtClean="0"/>
-              <a:t>nooo</a:t>
-            </a:r>
-            <a:r>
-              <a:rPr lang="en-US" sz="2500" dirty="0" smtClean="0"/>
-              <a:t> good.</a:t>
-            </a:r>
-          </a:p>
-          <a:p>
-            <a:r>
-              <a:rPr lang="en-US" sz="2500" dirty="0" smtClean="0"/>
-              <a:t>Whose business is it talking to users?</a:t>
-            </a:r>
-          </a:p>
-          <a:p>
-            <a:r>
-              <a:rPr lang="en-US" sz="2500" dirty="0" smtClean="0"/>
-              <a:t>What about displaying?</a:t>
-            </a:r>
-          </a:p>
-          <a:p>
-            <a:r>
-              <a:rPr lang="en-US" sz="2500" dirty="0" smtClean="0"/>
-              <a:t>Should your classes all know how to parse user input?</a:t>
-            </a:r>
-          </a:p>
-          <a:p>
-            <a:pPr marL="45720" indent="0">
+            <a:pPr marL="0" indent="0">
               <a:buNone/>
             </a:pPr>
-            <a:endParaRPr lang="en-US" sz="2500" dirty="0"/>
-          </a:p>
-          <a:p>
-            <a:pPr marL="45720" indent="0" algn="ctr">
+            <a:r>
+              <a:rPr lang="en-US" sz="2500" dirty="0" smtClean="0"/>
+              <a:t>Sure, you can write all the codes… But where do you put it?</a:t>
+            </a:r>
+          </a:p>
+          <a:p>
+            <a:pPr marL="0" indent="0">
               <a:buNone/>
             </a:pPr>
+            <a:endParaRPr lang="en-US" sz="2500" dirty="0" smtClean="0"/>
+          </a:p>
+          <a:p>
             <a:r>
               <a:rPr lang="en-US" sz="2500" dirty="0" smtClean="0"/>
-              <a:t>I DON’T THINK SO.</a:t>
-            </a:r>
-            <a:endParaRPr lang="en-US" sz="2500" dirty="0"/>
+              <a:t>Whose </a:t>
+            </a:r>
+            <a:r>
+              <a:rPr lang="en-US" sz="2500" dirty="0" smtClean="0"/>
+              <a:t>business is it </a:t>
+            </a:r>
+            <a:r>
+              <a:rPr lang="en-US" sz="2500" dirty="0" smtClean="0"/>
+              <a:t>to talk </a:t>
+            </a:r>
+            <a:r>
+              <a:rPr lang="en-US" sz="2500" dirty="0" smtClean="0"/>
+              <a:t>to users?</a:t>
+            </a:r>
+          </a:p>
+          <a:p>
+            <a:r>
+              <a:rPr lang="en-US" sz="2500" dirty="0" smtClean="0"/>
+              <a:t>What about </a:t>
+            </a:r>
+            <a:r>
+              <a:rPr lang="en-US" sz="2500" dirty="0" smtClean="0"/>
+              <a:t>displaying output?</a:t>
+            </a:r>
+            <a:endParaRPr lang="en-US" sz="2500" dirty="0" smtClean="0"/>
+          </a:p>
+          <a:p>
+            <a:r>
+              <a:rPr lang="en-US" sz="2500" dirty="0" smtClean="0"/>
+              <a:t>Should your classes all know how to parse user input</a:t>
+            </a:r>
+            <a:r>
+              <a:rPr lang="en-US" sz="2500" dirty="0" smtClean="0"/>
+              <a:t>?</a:t>
+            </a:r>
+          </a:p>
+          <a:p>
+            <a:r>
+              <a:rPr lang="en-US" sz="2500" dirty="0" smtClean="0"/>
+              <a:t>Where do heavy algorithms run?</a:t>
+            </a:r>
+          </a:p>
+          <a:p>
+            <a:r>
+              <a:rPr lang="en-US" sz="2500" dirty="0" smtClean="0"/>
+              <a:t>How do you separate 10,000 lines of code into a manageable structure?</a:t>
+            </a:r>
+            <a:endParaRPr lang="en-US" sz="2500" dirty="0" smtClean="0"/>
           </a:p>
         </p:txBody>
       </p:sp>
@@ -6595,28 +6269,6 @@
               </a:solidFill>
             </a:endParaRPr>
           </a:p>
-          <a:p>
-            <a:pPr marL="349250" indent="-238125">
-              <a:buFont typeface="Arial"/>
-              <a:buChar char="•"/>
-            </a:pPr>
-            <a:r>
-              <a:rPr lang="en-US" sz="2200" dirty="0" smtClean="0">
-                <a:solidFill>
-                  <a:srgbClr val="F8F8F8"/>
-                </a:solidFill>
-              </a:rPr>
-              <a:t>Bistro-Controller</a:t>
-            </a:r>
-          </a:p>
-          <a:p>
-            <a:pPr marL="111125"/>
-            <a:endParaRPr lang="en-US" sz="2200" dirty="0">
-              <a:solidFill>
-                <a:srgbClr val="F8F8F8"/>
-              </a:solidFill>
-            </a:endParaRPr>
-          </a:p>
         </p:txBody>
       </p:sp>
       <p:sp>
@@ -6677,6 +6329,22 @@
               <a:t>User interface</a:t>
             </a:r>
           </a:p>
+          <a:p>
+            <a:pPr marL="111125"/>
+            <a:endParaRPr lang="en-US" sz="2200" dirty="0">
+              <a:solidFill>
+                <a:srgbClr val="F8F8F8"/>
+              </a:solidFill>
+            </a:endParaRPr>
+          </a:p>
+          <a:p>
+            <a:pPr marL="111125"/>
+            <a:endParaRPr lang="en-US" sz="2200" dirty="0" smtClean="0">
+              <a:solidFill>
+                <a:srgbClr val="F8F8F8"/>
+              </a:solidFill>
+            </a:endParaRPr>
+          </a:p>
         </p:txBody>
       </p:sp>
       <p:sp>
@@ -6775,7 +6443,7 @@
     </p:spTree>
     <p:extLst>
       <p:ext uri="{BB962C8B-B14F-4D97-AF65-F5344CB8AC3E}">
-        <p14:creationId xmlns:p14="http://schemas.microsoft.com/office/powerpoint/2010/main" val="2399005532"/>
+        <p14:creationId xmlns:p14="http://schemas.microsoft.com/office/powerpoint/2010/main" val="3671947589"/>
       </p:ext>
     </p:extLst>
   </p:cSld>
@@ -7143,83 +6811,6 @@
               <a:t>User interface</a:t>
             </a:r>
           </a:p>
-          <a:p>
-            <a:pPr marL="111125"/>
-            <a:endParaRPr lang="en-US" sz="2200" dirty="0" smtClean="0">
-              <a:solidFill>
-                <a:srgbClr val="F8F8F8"/>
-              </a:solidFill>
-            </a:endParaRPr>
-          </a:p>
-          <a:p>
-            <a:pPr marL="111125"/>
-            <a:endParaRPr lang="en-US" sz="2200" dirty="0">
-              <a:solidFill>
-                <a:srgbClr val="F8F8F8"/>
-              </a:solidFill>
-            </a:endParaRPr>
-          </a:p>
-          <a:p>
-            <a:pPr marL="349250" indent="-238125">
-              <a:buFont typeface="Arial"/>
-              <a:buChar char="•"/>
-            </a:pPr>
-            <a:r>
-              <a:rPr lang="en-US" sz="2200" dirty="0" smtClean="0">
-                <a:solidFill>
-                  <a:srgbClr val="F8F8F8"/>
-                </a:solidFill>
-              </a:rPr>
-              <a:t>Views</a:t>
-            </a:r>
-          </a:p>
-          <a:p>
-            <a:pPr marL="681038" lvl="1" indent="-331788">
-              <a:buFont typeface="Arial"/>
-              <a:buChar char="•"/>
-            </a:pPr>
-            <a:r>
-              <a:rPr lang="en-US" sz="2200" dirty="0" smtClean="0">
-                <a:solidFill>
-                  <a:srgbClr val="F8F8F8"/>
-                </a:solidFill>
-              </a:rPr>
-              <a:t>Options</a:t>
-            </a:r>
-          </a:p>
-          <a:p>
-            <a:pPr marL="681038" lvl="1" indent="-331788">
-              <a:buFont typeface="Arial"/>
-              <a:buChar char="•"/>
-            </a:pPr>
-            <a:r>
-              <a:rPr lang="en-US" sz="2200" dirty="0" smtClean="0">
-                <a:solidFill>
-                  <a:srgbClr val="F8F8F8"/>
-                </a:solidFill>
-              </a:rPr>
-              <a:t>Recipe</a:t>
-            </a:r>
-          </a:p>
-          <a:p>
-            <a:pPr marL="681038" lvl="1" indent="-331788">
-              <a:buFont typeface="Arial"/>
-              <a:buChar char="•"/>
-            </a:pPr>
-            <a:r>
-              <a:rPr lang="en-US" sz="2200" dirty="0" err="1" smtClean="0">
-                <a:solidFill>
-                  <a:srgbClr val="F8F8F8"/>
-                </a:solidFill>
-              </a:rPr>
-              <a:t>RecipeList</a:t>
-            </a:r>
-            <a:endParaRPr lang="en-US" sz="2200" dirty="0">
-              <a:solidFill>
-                <a:srgbClr val="F8F8F8"/>
-              </a:solidFill>
-            </a:endParaRPr>
-          </a:p>
         </p:txBody>
       </p:sp>
       <p:sp>
@@ -7318,7 +6909,7 @@
     </p:spTree>
     <p:extLst>
       <p:ext uri="{BB962C8B-B14F-4D97-AF65-F5344CB8AC3E}">
-        <p14:creationId xmlns:p14="http://schemas.microsoft.com/office/powerpoint/2010/main" val="127540449"/>
+        <p14:creationId xmlns:p14="http://schemas.microsoft.com/office/powerpoint/2010/main" val="2399005532"/>
       </p:ext>
     </p:extLst>
   </p:cSld>
@@ -7368,10 +6959,9 @@
           <a:lstStyle/>
           <a:p>
             <a:r>
-              <a:rPr lang="en-US" dirty="0" smtClean="0"/>
-              <a:t>Bernie’s Bistro: List</a:t>
-            </a:r>
-            <a:endParaRPr lang="en-US" dirty="0"/>
+              <a:rPr lang="en-US" dirty="0"/>
+              <a:t>M-V-C Bernie’s Bistro</a:t>
+            </a:r>
           </a:p>
         </p:txBody>
       </p:sp>
@@ -7438,6 +7028,14 @@
           <a:bodyPr rtlCol="0" anchor="t"/>
           <a:lstStyle/>
           <a:p>
+            <a:r>
+              <a:rPr lang="en-US" sz="2200" dirty="0" smtClean="0">
+                <a:solidFill>
+                  <a:schemeClr val="accent1"/>
+                </a:solidFill>
+              </a:rPr>
+              <a:t> </a:t>
+            </a:r>
             <a:endParaRPr lang="en-US" sz="2200" dirty="0">
               <a:solidFill>
                 <a:schemeClr val="accent1"/>
@@ -7446,7 +7044,76 @@
           </a:p>
           <a:p>
             <a:pPr marL="111125"/>
+            <a:r>
+              <a:rPr lang="en-US" sz="2200" dirty="0" smtClean="0">
+                <a:solidFill>
+                  <a:schemeClr val="accent1"/>
+                </a:solidFill>
+              </a:rPr>
+              <a:t>Data &amp;</a:t>
+            </a:r>
+          </a:p>
+          <a:p>
+            <a:pPr marL="111125"/>
+            <a:r>
+              <a:rPr lang="en-US" sz="2200" dirty="0" smtClean="0">
+                <a:solidFill>
+                  <a:schemeClr val="accent1"/>
+                </a:solidFill>
+              </a:rPr>
+              <a:t>Business logic</a:t>
+            </a:r>
+          </a:p>
+          <a:p>
+            <a:pPr marL="111125"/>
             <a:endParaRPr lang="en-US" sz="2200" dirty="0" smtClean="0">
+              <a:solidFill>
+                <a:schemeClr val="accent1"/>
+              </a:solidFill>
+            </a:endParaRPr>
+          </a:p>
+          <a:p>
+            <a:pPr marL="349250" indent="-238125">
+              <a:buFont typeface="Arial"/>
+              <a:buChar char="•"/>
+            </a:pPr>
+            <a:r>
+              <a:rPr lang="en-US" sz="2200" dirty="0" smtClean="0">
+                <a:solidFill>
+                  <a:schemeClr val="accent1"/>
+                </a:solidFill>
+              </a:rPr>
+              <a:t>Bistro</a:t>
+            </a:r>
+          </a:p>
+          <a:p>
+            <a:pPr marL="349250" indent="-238125">
+              <a:buFont typeface="Arial"/>
+              <a:buChar char="•"/>
+            </a:pPr>
+            <a:r>
+              <a:rPr lang="en-US" sz="2200" dirty="0" smtClean="0">
+                <a:solidFill>
+                  <a:schemeClr val="accent1"/>
+                </a:solidFill>
+              </a:rPr>
+              <a:t>Recipe</a:t>
+            </a:r>
+          </a:p>
+          <a:p>
+            <a:pPr marL="349250" indent="-238125">
+              <a:buFont typeface="Arial"/>
+              <a:buChar char="•"/>
+            </a:pPr>
+            <a:r>
+              <a:rPr lang="en-US" sz="2200" dirty="0" err="1" smtClean="0">
+                <a:solidFill>
+                  <a:schemeClr val="accent1"/>
+                </a:solidFill>
+              </a:rPr>
+              <a:t>CSVParsing</a:t>
+            </a:r>
+            <a:endParaRPr lang="en-US" sz="2200" dirty="0">
               <a:solidFill>
                 <a:schemeClr val="accent1"/>
               </a:solidFill>
@@ -7503,7 +7170,48 @@
           </a:p>
           <a:p>
             <a:pPr marL="111125"/>
+            <a:r>
+              <a:rPr lang="en-US" sz="2200" dirty="0" smtClean="0">
+                <a:solidFill>
+                  <a:srgbClr val="F8F8F8"/>
+                </a:solidFill>
+              </a:rPr>
+              <a:t>Communicate</a:t>
+            </a:r>
+          </a:p>
+          <a:p>
+            <a:pPr marL="111125"/>
             <a:endParaRPr lang="en-US" sz="2200" dirty="0" smtClean="0">
+              <a:solidFill>
+                <a:srgbClr val="F8F8F8"/>
+              </a:solidFill>
+            </a:endParaRPr>
+          </a:p>
+          <a:p>
+            <a:pPr marL="111125"/>
+            <a:endParaRPr lang="en-US" sz="2200" dirty="0">
+              <a:solidFill>
+                <a:srgbClr val="F8F8F8"/>
+              </a:solidFill>
+            </a:endParaRPr>
+          </a:p>
+          <a:p>
+            <a:pPr marL="349250" indent="-238125">
+              <a:buFont typeface="Arial"/>
+              <a:buChar char="•"/>
+            </a:pPr>
+            <a:r>
+              <a:rPr lang="en-US" sz="2200" dirty="0" smtClean="0">
+                <a:solidFill>
+                  <a:srgbClr val="F8F8F8"/>
+                </a:solidFill>
+              </a:rPr>
+              <a:t>Bistro-Controller</a:t>
+            </a:r>
+          </a:p>
+          <a:p>
+            <a:pPr marL="111125"/>
+            <a:endParaRPr lang="en-US" sz="2200" dirty="0">
               <a:solidFill>
                 <a:srgbClr val="F8F8F8"/>
               </a:solidFill>
@@ -7560,159 +7268,87 @@
           </a:p>
           <a:p>
             <a:pPr marL="111125"/>
+            <a:r>
+              <a:rPr lang="en-US" sz="2200" dirty="0" smtClean="0">
+                <a:solidFill>
+                  <a:srgbClr val="F8F8F8"/>
+                </a:solidFill>
+              </a:rPr>
+              <a:t>User interface</a:t>
+            </a:r>
+          </a:p>
+          <a:p>
+            <a:pPr marL="111125"/>
             <a:endParaRPr lang="en-US" sz="2200" dirty="0" smtClean="0">
               <a:solidFill>
                 <a:srgbClr val="F8F8F8"/>
               </a:solidFill>
             </a:endParaRPr>
           </a:p>
-        </p:txBody>
-      </p:sp>
-      <p:sp>
-        <p:nvSpPr>
-          <p:cNvPr id="8" name="TextBox 7"/>
-          <p:cNvSpPr txBox="1"/>
-          <p:nvPr/>
-        </p:nvSpPr>
-        <p:spPr>
-          <a:xfrm>
-            <a:off x="457200" y="1865376"/>
-            <a:ext cx="2204881" cy="584776"/>
-          </a:xfrm>
-          <a:prstGeom prst="rect">
-            <a:avLst/>
-          </a:prstGeom>
-          <a:noFill/>
-        </p:spPr>
-        <p:txBody>
-          <a:bodyPr wrap="square" rtlCol="0">
-            <a:spAutoFit/>
-          </a:bodyPr>
-          <a:lstStyle/>
-          <a:p>
-            <a:pPr algn="ctr"/>
-            <a:r>
-              <a:rPr lang="en-US" sz="3200" dirty="0" smtClean="0"/>
-              <a:t>Model</a:t>
-            </a:r>
-            <a:endParaRPr lang="en-US" sz="3200" dirty="0"/>
-          </a:p>
-        </p:txBody>
-      </p:sp>
-      <p:sp>
-        <p:nvSpPr>
-          <p:cNvPr id="10" name="TextBox 9"/>
-          <p:cNvSpPr txBox="1"/>
-          <p:nvPr/>
-        </p:nvSpPr>
-        <p:spPr>
-          <a:xfrm>
-            <a:off x="3493911" y="1865376"/>
-            <a:ext cx="2204881" cy="584776"/>
-          </a:xfrm>
-          <a:prstGeom prst="rect">
-            <a:avLst/>
-          </a:prstGeom>
-          <a:noFill/>
-        </p:spPr>
-        <p:txBody>
-          <a:bodyPr wrap="square" rtlCol="0">
-            <a:spAutoFit/>
-          </a:bodyPr>
-          <a:lstStyle/>
-          <a:p>
-            <a:pPr algn="ctr"/>
-            <a:r>
-              <a:rPr lang="en-US" sz="3200" dirty="0" smtClean="0"/>
-              <a:t>Controller</a:t>
-            </a:r>
-            <a:endParaRPr lang="en-US" sz="3200" dirty="0"/>
-          </a:p>
-        </p:txBody>
-      </p:sp>
-      <p:sp>
-        <p:nvSpPr>
-          <p:cNvPr id="11" name="TextBox 10"/>
-          <p:cNvSpPr txBox="1"/>
-          <p:nvPr/>
-        </p:nvSpPr>
-        <p:spPr>
-          <a:xfrm>
-            <a:off x="6536783" y="1865376"/>
-            <a:ext cx="2204881" cy="584776"/>
-          </a:xfrm>
-          <a:prstGeom prst="rect">
-            <a:avLst/>
-          </a:prstGeom>
-          <a:noFill/>
-        </p:spPr>
-        <p:txBody>
-          <a:bodyPr wrap="square" rtlCol="0">
-            <a:spAutoFit/>
-          </a:bodyPr>
-          <a:lstStyle/>
-          <a:p>
-            <a:pPr algn="ctr"/>
-            <a:r>
-              <a:rPr lang="en-US" sz="3200" dirty="0" smtClean="0"/>
-              <a:t>View</a:t>
-            </a:r>
-            <a:endParaRPr lang="en-US" sz="3200" dirty="0"/>
-          </a:p>
-        </p:txBody>
-      </p:sp>
-      <p:sp>
-        <p:nvSpPr>
-          <p:cNvPr id="7" name="Rectangle 6"/>
-          <p:cNvSpPr/>
-          <p:nvPr/>
-        </p:nvSpPr>
-        <p:spPr>
-          <a:xfrm>
-            <a:off x="6755607" y="2934560"/>
-            <a:ext cx="1730320" cy="396667"/>
-          </a:xfrm>
-          <a:prstGeom prst="rect">
-            <a:avLst/>
-          </a:prstGeom>
-          <a:solidFill>
-            <a:schemeClr val="accent6"/>
-          </a:solidFill>
-          <a:ln w="28575" cmpd="sng">
-            <a:solidFill>
-              <a:schemeClr val="accent1"/>
-            </a:solidFill>
-          </a:ln>
-          <a:effectLst/>
-        </p:spPr>
-        <p:style>
-          <a:lnRef idx="1">
-            <a:schemeClr val="accent1"/>
-          </a:lnRef>
-          <a:fillRef idx="3">
-            <a:schemeClr val="accent1"/>
-          </a:fillRef>
-          <a:effectRef idx="2">
-            <a:schemeClr val="accent1"/>
-          </a:effectRef>
-          <a:fontRef idx="minor">
-            <a:schemeClr val="lt1"/>
-          </a:fontRef>
-        </p:style>
-        <p:txBody>
-          <a:bodyPr rtlCol="0" anchor="ctr"/>
-          <a:lstStyle/>
-          <a:p>
-            <a:pPr algn="ctr"/>
-            <a:r>
-              <a:rPr lang="en-US" dirty="0" smtClean="0">
+          <a:p>
+            <a:pPr marL="111125"/>
+            <a:endParaRPr lang="en-US" sz="2200" dirty="0">
+              <a:solidFill>
+                <a:srgbClr val="F8F8F8"/>
+              </a:solidFill>
+            </a:endParaRPr>
+          </a:p>
+          <a:p>
+            <a:pPr marL="349250" indent="-238125">
+              <a:buFont typeface="Arial"/>
+              <a:buChar char="•"/>
+            </a:pPr>
+            <a:r>
+              <a:rPr lang="en-US" sz="2200" dirty="0" smtClean="0">
                 <a:solidFill>
                   <a:srgbClr val="F8F8F8"/>
                 </a:solidFill>
               </a:rPr>
-              <a:t>send input</a:t>
-            </a:r>
-            <a:endParaRPr lang="en-US" dirty="0">
+              <a:t>Views</a:t>
+            </a:r>
+          </a:p>
+          <a:p>
+            <a:pPr marL="681038" lvl="1" indent="-331788">
+              <a:buFont typeface="Arial"/>
+              <a:buChar char="•"/>
+            </a:pPr>
+            <a:r>
+              <a:rPr lang="en-US" sz="2200" dirty="0" smtClean="0">
+                <a:solidFill>
+                  <a:srgbClr val="F8F8F8"/>
+                </a:solidFill>
+              </a:rPr>
+              <a:t>Options</a:t>
+            </a:r>
+          </a:p>
+          <a:p>
+            <a:pPr marL="681038" lvl="1" indent="-331788">
+              <a:buFont typeface="Arial"/>
+              <a:buChar char="•"/>
+            </a:pPr>
+            <a:r>
+              <a:rPr lang="en-US" sz="2200" dirty="0" smtClean="0">
+                <a:solidFill>
+                  <a:srgbClr val="F8F8F8"/>
+                </a:solidFill>
+              </a:rPr>
+              <a:t>Recipe</a:t>
+            </a:r>
+          </a:p>
+          <a:p>
+            <a:pPr marL="681038" lvl="1" indent="-331788">
+              <a:buFont typeface="Arial"/>
+              <a:buChar char="•"/>
+            </a:pPr>
+            <a:r>
+              <a:rPr lang="en-US" sz="2200" dirty="0" err="1" smtClean="0">
+                <a:solidFill>
+                  <a:srgbClr val="F8F8F8"/>
+                </a:solidFill>
+              </a:rPr>
+              <a:t>RecipeList</a:t>
+            </a:r>
+            <a:endParaRPr lang="en-US" sz="2200" dirty="0">
               <a:solidFill>
                 <a:srgbClr val="F8F8F8"/>
               </a:solidFill>
@@ -7720,10 +7356,103 @@
           </a:p>
         </p:txBody>
       </p:sp>
+      <p:sp>
+        <p:nvSpPr>
+          <p:cNvPr id="8" name="TextBox 7"/>
+          <p:cNvSpPr txBox="1"/>
+          <p:nvPr/>
+        </p:nvSpPr>
+        <p:spPr>
+          <a:xfrm>
+            <a:off x="457200" y="1865376"/>
+            <a:ext cx="2204881" cy="584776"/>
+          </a:xfrm>
+          <a:prstGeom prst="rect">
+            <a:avLst/>
+          </a:prstGeom>
+          <a:noFill/>
+        </p:spPr>
+        <p:txBody>
+          <a:bodyPr wrap="square" rtlCol="0">
+            <a:spAutoFit/>
+          </a:bodyPr>
+          <a:lstStyle/>
+          <a:p>
+            <a:pPr algn="ctr"/>
+            <a:r>
+              <a:rPr lang="en-US" sz="3200" dirty="0" smtClean="0"/>
+              <a:t>Model</a:t>
+            </a:r>
+            <a:endParaRPr lang="en-US" sz="3200" dirty="0"/>
+          </a:p>
+        </p:txBody>
+      </p:sp>
+      <p:sp>
+        <p:nvSpPr>
+          <p:cNvPr id="10" name="TextBox 9"/>
+          <p:cNvSpPr txBox="1"/>
+          <p:nvPr/>
+        </p:nvSpPr>
+        <p:spPr>
+          <a:xfrm>
+            <a:off x="3493911" y="1865376"/>
+            <a:ext cx="2204881" cy="584776"/>
+          </a:xfrm>
+          <a:prstGeom prst="rect">
+            <a:avLst/>
+          </a:prstGeom>
+          <a:noFill/>
+        </p:spPr>
+        <p:txBody>
+          <a:bodyPr wrap="square" rtlCol="0">
+            <a:spAutoFit/>
+          </a:bodyPr>
+          <a:lstStyle/>
+          <a:p>
+            <a:pPr algn="ctr"/>
+            <a:r>
+              <a:rPr lang="en-US" sz="3200" dirty="0" smtClean="0"/>
+              <a:t>Controller</a:t>
+            </a:r>
+            <a:endParaRPr lang="en-US" sz="3200" dirty="0"/>
+          </a:p>
+        </p:txBody>
+      </p:sp>
+      <p:sp>
+        <p:nvSpPr>
+          <p:cNvPr id="11" name="TextBox 10"/>
+          <p:cNvSpPr txBox="1"/>
+          <p:nvPr/>
+        </p:nvSpPr>
+        <p:spPr>
+          <a:xfrm>
+            <a:off x="6536783" y="1865376"/>
+            <a:ext cx="2204881" cy="584776"/>
+          </a:xfrm>
+          <a:prstGeom prst="rect">
+            <a:avLst/>
+          </a:prstGeom>
+          <a:noFill/>
+        </p:spPr>
+        <p:txBody>
+          <a:bodyPr wrap="square" rtlCol="0">
+            <a:spAutoFit/>
+          </a:bodyPr>
+          <a:lstStyle/>
+          <a:p>
+            <a:pPr algn="ctr"/>
+            <a:r>
+              <a:rPr lang="en-US" sz="3200" dirty="0" smtClean="0"/>
+              <a:t>View</a:t>
+            </a:r>
+            <a:endParaRPr lang="en-US" sz="3200" dirty="0"/>
+          </a:p>
+        </p:txBody>
+      </p:sp>
     </p:spTree>
     <p:extLst>
       <p:ext uri="{BB962C8B-B14F-4D97-AF65-F5344CB8AC3E}">
-        <p14:creationId xmlns:p14="http://schemas.microsoft.com/office/powerpoint/2010/main" val="2744471277"/>
+        <p14:creationId xmlns:p14="http://schemas.microsoft.com/office/powerpoint/2010/main" val="127540449"/>
       </p:ext>
     </p:extLst>
   </p:cSld>
@@ -8068,103 +7797,6 @@
       </p:sp>
       <p:sp>
         <p:nvSpPr>
-          <p:cNvPr id="15" name="Rectangle 14"/>
-          <p:cNvSpPr/>
-          <p:nvPr/>
-        </p:nvSpPr>
-        <p:spPr>
-          <a:xfrm>
-            <a:off x="3699937" y="2934560"/>
-            <a:ext cx="1730320" cy="396667"/>
-          </a:xfrm>
-          <a:prstGeom prst="rect">
-            <a:avLst/>
-          </a:prstGeom>
-          <a:solidFill>
-            <a:schemeClr val="accent4"/>
-          </a:solidFill>
-          <a:ln w="28575" cmpd="sng">
-            <a:solidFill>
-              <a:schemeClr val="accent1"/>
-            </a:solidFill>
-          </a:ln>
-          <a:effectLst/>
-        </p:spPr>
-        <p:style>
-          <a:lnRef idx="1">
-            <a:schemeClr val="accent1"/>
-          </a:lnRef>
-          <a:fillRef idx="3">
-            <a:schemeClr val="accent1"/>
-          </a:fillRef>
-          <a:effectRef idx="2">
-            <a:schemeClr val="accent1"/>
-          </a:effectRef>
-          <a:fontRef idx="minor">
-            <a:schemeClr val="lt1"/>
-          </a:fontRef>
-        </p:style>
-        <p:txBody>
-          <a:bodyPr rtlCol="0" anchor="ctr"/>
-          <a:lstStyle/>
-          <a:p>
-            <a:pPr algn="ctr"/>
-            <a:r>
-              <a:rPr lang="en-US" dirty="0" smtClean="0">
-                <a:solidFill>
-                  <a:srgbClr val="F8F8F8"/>
-                </a:solidFill>
-              </a:rPr>
-              <a:t>interpret input</a:t>
-            </a:r>
-            <a:endParaRPr lang="en-US" dirty="0">
-              <a:solidFill>
-                <a:srgbClr val="F8F8F8"/>
-              </a:solidFill>
-            </a:endParaRPr>
-          </a:p>
-        </p:txBody>
-      </p:sp>
-      <p:cxnSp>
-        <p:nvCxnSpPr>
-          <p:cNvPr id="16" name="Straight Arrow Connector 15"/>
-          <p:cNvCxnSpPr/>
-          <p:nvPr/>
-        </p:nvCxnSpPr>
-        <p:spPr>
-          <a:xfrm flipH="1">
-            <a:off x="5537200" y="3132894"/>
-            <a:ext cx="1218407" cy="0"/>
-          </a:xfrm>
-          <a:prstGeom prst="straightConnector1">
-            <a:avLst/>
-          </a:prstGeom>
-          <a:ln w="57150" cmpd="sng">
-            <a:solidFill>
-              <a:schemeClr val="accent2"/>
-            </a:solidFill>
-            <a:headEnd type="none"/>
-            <a:tailEnd type="triangle"/>
-          </a:ln>
-          <a:effectLst/>
-        </p:spPr>
-        <p:style>
-          <a:lnRef idx="2">
-            <a:schemeClr val="accent1"/>
-          </a:lnRef>
-          <a:fillRef idx="0">
-            <a:schemeClr val="accent1"/>
-          </a:fillRef>
-          <a:effectRef idx="1">
-            <a:schemeClr val="accent1"/>
-          </a:effectRef>
-          <a:fontRef idx="minor">
-            <a:schemeClr val="tx1"/>
-          </a:fontRef>
-        </p:style>
-      </p:cxnSp>
-      <p:sp>
-        <p:nvSpPr>
           <p:cNvPr id="7" name="Rectangle 6"/>
           <p:cNvSpPr/>
           <p:nvPr/>
@@ -8225,7 +7857,7 @@
     </p:spTree>
     <p:extLst>
       <p:ext uri="{BB962C8B-B14F-4D97-AF65-F5344CB8AC3E}">
-        <p14:creationId xmlns:p14="http://schemas.microsoft.com/office/powerpoint/2010/main" val="2992209754"/>
+        <p14:creationId xmlns:p14="http://schemas.microsoft.com/office/powerpoint/2010/main" val="2744471277"/>
       </p:ext>
     </p:extLst>
   </p:cSld>
@@ -8568,12 +8200,69 @@
           </a:p>
         </p:txBody>
       </p:sp>
+      <p:sp>
+        <p:nvSpPr>
+          <p:cNvPr id="15" name="Rectangle 14"/>
+          <p:cNvSpPr/>
+          <p:nvPr/>
+        </p:nvSpPr>
+        <p:spPr>
+          <a:xfrm>
+            <a:off x="3699937" y="2934560"/>
+            <a:ext cx="1730320" cy="396667"/>
+          </a:xfrm>
+          <a:prstGeom prst="rect">
+            <a:avLst/>
+          </a:prstGeom>
+          <a:solidFill>
+            <a:schemeClr val="accent4"/>
+          </a:solidFill>
+          <a:ln w="28575" cmpd="sng">
+            <a:solidFill>
+              <a:schemeClr val="accent1"/>
+            </a:solidFill>
+          </a:ln>
+          <a:effectLst/>
+        </p:spPr>
+        <p:style>
+          <a:lnRef idx="1">
+            <a:schemeClr val="accent1"/>
+          </a:lnRef>
+          <a:fillRef idx="3">
+            <a:schemeClr val="accent1"/>
+          </a:fillRef>
+          <a:effectRef idx="2">
+            <a:schemeClr val="accent1"/>
+          </a:effectRef>
+          <a:fontRef idx="minor">
+            <a:schemeClr val="lt1"/>
+          </a:fontRef>
+        </p:style>
+        <p:txBody>
+          <a:bodyPr rtlCol="0" anchor="ctr"/>
+          <a:lstStyle/>
+          <a:p>
+            <a:pPr algn="ctr"/>
+            <a:r>
+              <a:rPr lang="en-US" dirty="0" smtClean="0">
+                <a:solidFill>
+                  <a:srgbClr val="F8F8F8"/>
+                </a:solidFill>
+              </a:rPr>
+              <a:t>interpret input</a:t>
+            </a:r>
+            <a:endParaRPr lang="en-US" dirty="0">
+              <a:solidFill>
+                <a:srgbClr val="F8F8F8"/>
+              </a:solidFill>
+            </a:endParaRPr>
+          </a:p>
+        </p:txBody>
+      </p:sp>
       <p:cxnSp>
         <p:nvCxnSpPr>
-          <p:cNvPr id="12" name="Straight Arrow Connector 11"/>
-          <p:cNvCxnSpPr>
-            <a:stCxn id="7" idx="1"/>
-          </p:cNvCxnSpPr>
+          <p:cNvPr id="16" name="Straight Arrow Connector 15"/>
+          <p:cNvCxnSpPr/>
           <p:nvPr/>
         </p:nvCxnSpPr>
         <p:spPr>
@@ -8667,168 +8356,10 @@
           </a:p>
         </p:txBody>
       </p:sp>
-      <p:sp>
-        <p:nvSpPr>
-          <p:cNvPr id="14" name="Rectangle 13"/>
-          <p:cNvSpPr/>
-          <p:nvPr/>
-        </p:nvSpPr>
-        <p:spPr>
-          <a:xfrm>
-            <a:off x="3699937" y="4014227"/>
-            <a:ext cx="1730320" cy="396667"/>
-          </a:xfrm>
-          <a:prstGeom prst="rect">
-            <a:avLst/>
-          </a:prstGeom>
-          <a:solidFill>
-            <a:schemeClr val="accent4"/>
-          </a:solidFill>
-          <a:ln w="28575" cmpd="sng">
-            <a:solidFill>
-              <a:schemeClr val="accent1"/>
-            </a:solidFill>
-          </a:ln>
-          <a:effectLst/>
-        </p:spPr>
-        <p:style>
-          <a:lnRef idx="1">
-            <a:schemeClr val="accent1"/>
-          </a:lnRef>
-          <a:fillRef idx="3">
-            <a:schemeClr val="accent1"/>
-          </a:fillRef>
-          <a:effectRef idx="2">
-            <a:schemeClr val="accent1"/>
-          </a:effectRef>
-          <a:fontRef idx="minor">
-            <a:schemeClr val="lt1"/>
-          </a:fontRef>
-        </p:style>
-        <p:txBody>
-          <a:bodyPr rtlCol="0" anchor="ctr"/>
-          <a:lstStyle/>
-          <a:p>
-            <a:pPr algn="ctr"/>
-            <a:r>
-              <a:rPr lang="en-US" dirty="0" smtClean="0">
-                <a:solidFill>
-                  <a:srgbClr val="F8F8F8"/>
-                </a:solidFill>
-              </a:rPr>
-              <a:t>request data</a:t>
-            </a:r>
-            <a:endParaRPr lang="en-US" dirty="0">
-              <a:solidFill>
-                <a:srgbClr val="F8F8F8"/>
-              </a:solidFill>
-            </a:endParaRPr>
-          </a:p>
-        </p:txBody>
-      </p:sp>
-      <p:cxnSp>
-        <p:nvCxnSpPr>
-          <p:cNvPr id="15" name="Straight Arrow Connector 14"/>
-          <p:cNvCxnSpPr>
-            <a:stCxn id="13" idx="2"/>
-          </p:cNvCxnSpPr>
-          <p:nvPr/>
-        </p:nvCxnSpPr>
-        <p:spPr>
-          <a:xfrm>
-            <a:off x="4565097" y="3331227"/>
-            <a:ext cx="0" cy="614240"/>
-          </a:xfrm>
-          <a:prstGeom prst="straightConnector1">
-            <a:avLst/>
-          </a:prstGeom>
-          <a:ln w="57150" cmpd="sng">
-            <a:solidFill>
-              <a:schemeClr val="accent2"/>
-            </a:solidFill>
-            <a:headEnd type="none"/>
-            <a:tailEnd type="triangle"/>
-          </a:ln>
-          <a:effectLst/>
-        </p:spPr>
-        <p:style>
-          <a:lnRef idx="2">
-            <a:schemeClr val="accent1"/>
-          </a:lnRef>
-          <a:fillRef idx="0">
-            <a:schemeClr val="accent1"/>
-          </a:fillRef>
-          <a:effectRef idx="1">
-            <a:schemeClr val="accent1"/>
-          </a:effectRef>
-          <a:fontRef idx="minor">
-            <a:schemeClr val="tx1"/>
-          </a:fontRef>
-        </p:style>
-      </p:cxnSp>
-      <p:sp>
-        <p:nvSpPr>
-          <p:cNvPr id="13" name="Rectangle 12"/>
-          <p:cNvSpPr/>
-          <p:nvPr/>
-        </p:nvSpPr>
-        <p:spPr>
-          <a:xfrm>
-            <a:off x="3699937" y="2934560"/>
-            <a:ext cx="1730320" cy="396667"/>
-          </a:xfrm>
-          <a:prstGeom prst="rect">
-            <a:avLst/>
-          </a:prstGeom>
-          <a:solidFill>
-            <a:schemeClr val="accent4"/>
-          </a:solidFill>
-          <a:ln w="28575" cmpd="sng">
-            <a:solidFill>
-              <a:schemeClr val="accent1"/>
-            </a:solidFill>
-          </a:ln>
-          <a:effectLst/>
-        </p:spPr>
-        <p:style>
-          <a:lnRef idx="1">
-            <a:schemeClr val="accent1"/>
-          </a:lnRef>
-          <a:fillRef idx="3">
-            <a:schemeClr val="accent1"/>
-          </a:fillRef>
-          <a:effectRef idx="2">
-            <a:schemeClr val="accent1"/>
-          </a:effectRef>
-          <a:fontRef idx="minor">
-            <a:schemeClr val="lt1"/>
-          </a:fontRef>
-        </p:style>
-        <p:txBody>
-          <a:bodyPr rtlCol="0" anchor="ctr"/>
-          <a:lstStyle/>
-          <a:p>
-            <a:pPr algn="ctr"/>
-            <a:r>
-              <a:rPr lang="en-US" dirty="0" smtClean="0">
-                <a:solidFill>
-                  <a:srgbClr val="F8F8F8"/>
-                </a:solidFill>
-              </a:rPr>
-              <a:t>interpret input</a:t>
-            </a:r>
-            <a:endParaRPr lang="en-US" dirty="0">
-              <a:solidFill>
-                <a:srgbClr val="F8F8F8"/>
-              </a:solidFill>
-            </a:endParaRPr>
-          </a:p>
-        </p:txBody>
-      </p:sp>
     </p:spTree>
     <p:extLst>
       <p:ext uri="{BB962C8B-B14F-4D97-AF65-F5344CB8AC3E}">
-        <p14:creationId xmlns:p14="http://schemas.microsoft.com/office/powerpoint/2010/main" val="2922615046"/>
+        <p14:creationId xmlns:p14="http://schemas.microsoft.com/office/powerpoint/2010/main" val="2992209754"/>
       </p:ext>
     </p:extLst>
   </p:cSld>
@@ -9270,55 +8801,15 @@
           </a:p>
         </p:txBody>
       </p:sp>
-      <p:cxnSp>
-        <p:nvCxnSpPr>
-          <p:cNvPr id="15" name="Straight Arrow Connector 14"/>
-          <p:cNvCxnSpPr>
-            <a:stCxn id="13" idx="2"/>
-          </p:cNvCxnSpPr>
-          <p:nvPr/>
-        </p:nvCxnSpPr>
-        <p:spPr>
-          <a:xfrm>
-            <a:off x="4565097" y="3331227"/>
-            <a:ext cx="0" cy="614240"/>
-          </a:xfrm>
-          <a:prstGeom prst="straightConnector1">
-            <a:avLst/>
-          </a:prstGeom>
-          <a:ln w="57150" cmpd="sng">
-            <a:solidFill>
-              <a:schemeClr val="accent2"/>
-            </a:solidFill>
-            <a:headEnd type="none"/>
-            <a:tailEnd type="triangle"/>
-          </a:ln>
-          <a:effectLst/>
-        </p:spPr>
-        <p:style>
-          <a:lnRef idx="2">
-            <a:schemeClr val="accent1"/>
-          </a:lnRef>
-          <a:fillRef idx="0">
-            <a:schemeClr val="accent1"/>
-          </a:fillRef>
-          <a:effectRef idx="1">
-            <a:schemeClr val="accent1"/>
-          </a:effectRef>
-          <a:fontRef idx="minor">
-            <a:schemeClr val="tx1"/>
-          </a:fontRef>
-        </p:style>
-      </p:cxnSp>
-      <p:sp>
-        <p:nvSpPr>
-          <p:cNvPr id="13" name="Rectangle 12"/>
+      <p:sp>
+        <p:nvSpPr>
+          <p:cNvPr id="14" name="Rectangle 13"/>
           <p:cNvSpPr/>
           <p:nvPr/>
         </p:nvSpPr>
         <p:spPr>
           <a:xfrm>
-            <a:off x="3699937" y="2934560"/>
+            <a:off x="3699937" y="4014227"/>
             <a:ext cx="1730320" cy="396667"/>
           </a:xfrm>
           <a:prstGeom prst="rect">
@@ -9359,7 +8850,7 @@
                   <a:srgbClr val="F8F8F8"/>
                 </a:solidFill>
               </a:rPr>
-              <a:t>interpret input</a:t>
+              <a:t>request data</a:t>
             </a:r>
             <a:endParaRPr lang="en-US" dirty="0">
               <a:solidFill>
@@ -9369,75 +8860,18 @@
           </a:p>
         </p:txBody>
       </p:sp>
-      <p:sp>
-        <p:nvSpPr>
-          <p:cNvPr id="16" name="Rectangle 15"/>
-          <p:cNvSpPr/>
-          <p:nvPr/>
-        </p:nvSpPr>
-        <p:spPr>
-          <a:xfrm>
-            <a:off x="702737" y="4014227"/>
-            <a:ext cx="1730320" cy="396667"/>
-          </a:xfrm>
-          <a:prstGeom prst="rect">
-            <a:avLst/>
-          </a:prstGeom>
-          <a:solidFill>
-            <a:schemeClr val="accent5"/>
-          </a:solidFill>
-          <a:ln w="28575" cmpd="sng">
-            <a:solidFill>
-              <a:schemeClr val="accent1"/>
-            </a:solidFill>
-          </a:ln>
-          <a:effectLst/>
-        </p:spPr>
-        <p:style>
-          <a:lnRef idx="1">
-            <a:schemeClr val="accent1"/>
-          </a:lnRef>
-          <a:fillRef idx="3">
-            <a:schemeClr val="accent1"/>
-          </a:fillRef>
-          <a:effectRef idx="2">
-            <a:schemeClr val="accent1"/>
-          </a:effectRef>
-          <a:fontRef idx="minor">
-            <a:schemeClr val="lt1"/>
-          </a:fontRef>
-        </p:style>
-        <p:txBody>
-          <a:bodyPr rtlCol="0" anchor="ctr"/>
-          <a:lstStyle/>
-          <a:p>
-            <a:pPr algn="ctr"/>
-            <a:r>
-              <a:rPr lang="en-US" dirty="0" smtClean="0">
-                <a:solidFill>
-                  <a:srgbClr val="F8F8F8"/>
-                </a:solidFill>
-              </a:rPr>
-              <a:t>gather data</a:t>
-            </a:r>
-            <a:endParaRPr lang="en-US" dirty="0">
-              <a:solidFill>
-                <a:srgbClr val="F8F8F8"/>
-              </a:solidFill>
-            </a:endParaRPr>
-          </a:p>
-        </p:txBody>
-      </p:sp>
       <p:cxnSp>
         <p:nvCxnSpPr>
-          <p:cNvPr id="17" name="Straight Arrow Connector 16"/>
-          <p:cNvCxnSpPr/>
+          <p:cNvPr id="15" name="Straight Arrow Connector 14"/>
+          <p:cNvCxnSpPr>
+            <a:stCxn id="13" idx="2"/>
+          </p:cNvCxnSpPr>
           <p:nvPr/>
         </p:nvCxnSpPr>
         <p:spPr>
-          <a:xfrm flipH="1">
-            <a:off x="2557730" y="4237794"/>
-            <a:ext cx="1218407" cy="0"/>
+          <a:xfrm>
+            <a:off x="4565097" y="3331227"/>
+            <a:ext cx="0" cy="614240"/>
           </a:xfrm>
           <a:prstGeom prst="straightConnector1">
             <a:avLst/>
@@ -9468,13 +8902,13 @@
       </p:cxnSp>
       <p:sp>
         <p:nvSpPr>
-          <p:cNvPr id="14" name="Rectangle 13"/>
+          <p:cNvPr id="13" name="Rectangle 12"/>
           <p:cNvSpPr/>
           <p:nvPr/>
         </p:nvSpPr>
         <p:spPr>
           <a:xfrm>
-            <a:off x="3699937" y="4014227"/>
+            <a:off x="3699937" y="2934560"/>
             <a:ext cx="1730320" cy="396667"/>
           </a:xfrm>
           <a:prstGeom prst="rect">
@@ -9515,7 +8949,7 @@
                   <a:srgbClr val="F8F8F8"/>
                 </a:solidFill>
               </a:rPr>
-              <a:t>request data</a:t>
+              <a:t>interpret input</a:t>
             </a:r>
             <a:endParaRPr lang="en-US" dirty="0">
               <a:solidFill>
@@ -9528,7 +8962,7 @@
     </p:spTree>
     <p:extLst>
       <p:ext uri="{BB962C8B-B14F-4D97-AF65-F5344CB8AC3E}">
-        <p14:creationId xmlns:p14="http://schemas.microsoft.com/office/powerpoint/2010/main" val="200400826"/>
+        <p14:creationId xmlns:p14="http://schemas.microsoft.com/office/powerpoint/2010/main" val="2922615046"/>
       </p:ext>
     </p:extLst>
   </p:cSld>
@@ -10069,6 +9503,65 @@
           </a:p>
         </p:txBody>
       </p:sp>
+      <p:sp>
+        <p:nvSpPr>
+          <p:cNvPr id="16" name="Rectangle 15"/>
+          <p:cNvSpPr/>
+          <p:nvPr/>
+        </p:nvSpPr>
+        <p:spPr>
+          <a:xfrm>
+            <a:off x="702737" y="4014227"/>
+            <a:ext cx="1730320" cy="396667"/>
+          </a:xfrm>
+          <a:prstGeom prst="rect">
+            <a:avLst/>
+          </a:prstGeom>
+          <a:solidFill>
+            <a:schemeClr val="accent5"/>
+          </a:solidFill>
+          <a:ln w="28575" cmpd="sng">
+            <a:solidFill>
+              <a:schemeClr val="accent1"/>
+            </a:solidFill>
+          </a:ln>
+          <a:effectLst/>
+        </p:spPr>
+        <p:style>
+          <a:lnRef idx="1">
+            <a:schemeClr val="accent1"/>
+          </a:lnRef>
+          <a:fillRef idx="3">
+            <a:schemeClr val="accent1"/>
+          </a:fillRef>
+          <a:effectRef idx="2">
+            <a:schemeClr val="accent1"/>
+          </a:effectRef>
+          <a:fontRef idx="minor">
+            <a:schemeClr val="lt1"/>
+          </a:fontRef>
+        </p:style>
+        <p:txBody>
+          <a:bodyPr rtlCol="0" anchor="ctr"/>
+          <a:lstStyle/>
+          <a:p>
+            <a:pPr algn="ctr"/>
+            <a:r>
+              <a:rPr lang="en-US" dirty="0" smtClean="0">
+                <a:solidFill>
+                  <a:srgbClr val="F8F8F8"/>
+                </a:solidFill>
+              </a:rPr>
+              <a:t>gather data</a:t>
+            </a:r>
+            <a:endParaRPr lang="en-US" dirty="0">
+              <a:solidFill>
+                <a:srgbClr val="F8F8F8"/>
+              </a:solidFill>
+            </a:endParaRPr>
+          </a:p>
+        </p:txBody>
+      </p:sp>
       <p:cxnSp>
         <p:nvCxnSpPr>
           <p:cNvPr id="17" name="Straight Arrow Connector 16"/>
@@ -10166,166 +9659,10 @@
           </a:p>
         </p:txBody>
       </p:sp>
-      <p:sp>
-        <p:nvSpPr>
-          <p:cNvPr id="18" name="Rectangle 17"/>
-          <p:cNvSpPr/>
-          <p:nvPr/>
-        </p:nvSpPr>
-        <p:spPr>
-          <a:xfrm>
-            <a:off x="702737" y="5093893"/>
-            <a:ext cx="1730320" cy="396667"/>
-          </a:xfrm>
-          <a:prstGeom prst="rect">
-            <a:avLst/>
-          </a:prstGeom>
-          <a:solidFill>
-            <a:schemeClr val="accent5"/>
-          </a:solidFill>
-          <a:ln w="28575" cmpd="sng">
-            <a:solidFill>
-              <a:schemeClr val="accent1"/>
-            </a:solidFill>
-          </a:ln>
-          <a:effectLst/>
-        </p:spPr>
-        <p:style>
-          <a:lnRef idx="1">
-            <a:schemeClr val="accent1"/>
-          </a:lnRef>
-          <a:fillRef idx="3">
-            <a:schemeClr val="accent1"/>
-          </a:fillRef>
-          <a:effectRef idx="2">
-            <a:schemeClr val="accent1"/>
-          </a:effectRef>
-          <a:fontRef idx="minor">
-            <a:schemeClr val="lt1"/>
-          </a:fontRef>
-        </p:style>
-        <p:txBody>
-          <a:bodyPr rtlCol="0" anchor="ctr"/>
-          <a:lstStyle/>
-          <a:p>
-            <a:pPr algn="ctr"/>
-            <a:r>
-              <a:rPr lang="en-US" dirty="0" smtClean="0">
-                <a:solidFill>
-                  <a:srgbClr val="F8F8F8"/>
-                </a:solidFill>
-              </a:rPr>
-              <a:t>return data</a:t>
-            </a:r>
-            <a:endParaRPr lang="en-US" dirty="0">
-              <a:solidFill>
-                <a:srgbClr val="F8F8F8"/>
-              </a:solidFill>
-            </a:endParaRPr>
-          </a:p>
-        </p:txBody>
-      </p:sp>
-      <p:cxnSp>
-        <p:nvCxnSpPr>
-          <p:cNvPr id="19" name="Straight Arrow Connector 18"/>
-          <p:cNvCxnSpPr/>
-          <p:nvPr/>
-        </p:nvCxnSpPr>
-        <p:spPr>
-          <a:xfrm>
-            <a:off x="1567897" y="4410894"/>
-            <a:ext cx="0" cy="614240"/>
-          </a:xfrm>
-          <a:prstGeom prst="straightConnector1">
-            <a:avLst/>
-          </a:prstGeom>
-          <a:ln w="57150" cmpd="sng">
-            <a:solidFill>
-              <a:schemeClr val="accent2"/>
-            </a:solidFill>
-            <a:headEnd type="none"/>
-            <a:tailEnd type="triangle"/>
-          </a:ln>
-          <a:effectLst/>
-        </p:spPr>
-        <p:style>
-          <a:lnRef idx="2">
-            <a:schemeClr val="accent1"/>
-          </a:lnRef>
-          <a:fillRef idx="0">
-            <a:schemeClr val="accent1"/>
-          </a:fillRef>
-          <a:effectRef idx="1">
-            <a:schemeClr val="accent1"/>
-          </a:effectRef>
-          <a:fontRef idx="minor">
-            <a:schemeClr val="tx1"/>
-          </a:fontRef>
-        </p:style>
-      </p:cxnSp>
-      <p:sp>
-        <p:nvSpPr>
-          <p:cNvPr id="16" name="Rectangle 15"/>
-          <p:cNvSpPr/>
-          <p:nvPr/>
-        </p:nvSpPr>
-        <p:spPr>
-          <a:xfrm>
-            <a:off x="702737" y="4014227"/>
-            <a:ext cx="1730320" cy="396667"/>
-          </a:xfrm>
-          <a:prstGeom prst="rect">
-            <a:avLst/>
-          </a:prstGeom>
-          <a:solidFill>
-            <a:schemeClr val="accent5"/>
-          </a:solidFill>
-          <a:ln w="28575" cmpd="sng">
-            <a:solidFill>
-              <a:schemeClr val="accent1"/>
-            </a:solidFill>
-          </a:ln>
-          <a:effectLst/>
-        </p:spPr>
-        <p:style>
-          <a:lnRef idx="1">
-            <a:schemeClr val="accent1"/>
-          </a:lnRef>
-          <a:fillRef idx="3">
-            <a:schemeClr val="accent1"/>
-          </a:fillRef>
-          <a:effectRef idx="2">
-            <a:schemeClr val="accent1"/>
-          </a:effectRef>
-          <a:fontRef idx="minor">
-            <a:schemeClr val="lt1"/>
-          </a:fontRef>
-        </p:style>
-        <p:txBody>
-          <a:bodyPr rtlCol="0" anchor="ctr"/>
-          <a:lstStyle/>
-          <a:p>
-            <a:pPr algn="ctr"/>
-            <a:r>
-              <a:rPr lang="en-US" dirty="0" smtClean="0">
-                <a:solidFill>
-                  <a:srgbClr val="F8F8F8"/>
-                </a:solidFill>
-              </a:rPr>
-              <a:t>gather data</a:t>
-            </a:r>
-            <a:endParaRPr lang="en-US" dirty="0">
-              <a:solidFill>
-                <a:srgbClr val="F8F8F8"/>
-              </a:solidFill>
-            </a:endParaRPr>
-          </a:p>
-        </p:txBody>
-      </p:sp>
     </p:spTree>
     <p:extLst>
       <p:ext uri="{BB962C8B-B14F-4D97-AF65-F5344CB8AC3E}">
-        <p14:creationId xmlns:p14="http://schemas.microsoft.com/office/powerpoint/2010/main" val="96029311"/>
+        <p14:creationId xmlns:p14="http://schemas.microsoft.com/office/powerpoint/2010/main" val="200400826"/>
       </p:ext>
     </p:extLst>
   </p:cSld>
@@ -10874,6 +10211,803 @@
         </p:nvCxnSpPr>
         <p:spPr>
           <a:xfrm flipH="1">
+            <a:off x="2557730" y="4237794"/>
+            <a:ext cx="1218407" cy="0"/>
+          </a:xfrm>
+          <a:prstGeom prst="straightConnector1">
+            <a:avLst/>
+          </a:prstGeom>
+          <a:ln w="57150" cmpd="sng">
+            <a:solidFill>
+              <a:schemeClr val="accent2"/>
+            </a:solidFill>
+            <a:headEnd type="none"/>
+            <a:tailEnd type="triangle"/>
+          </a:ln>
+          <a:effectLst/>
+        </p:spPr>
+        <p:style>
+          <a:lnRef idx="2">
+            <a:schemeClr val="accent1"/>
+          </a:lnRef>
+          <a:fillRef idx="0">
+            <a:schemeClr val="accent1"/>
+          </a:fillRef>
+          <a:effectRef idx="1">
+            <a:schemeClr val="accent1"/>
+          </a:effectRef>
+          <a:fontRef idx="minor">
+            <a:schemeClr val="tx1"/>
+          </a:fontRef>
+        </p:style>
+      </p:cxnSp>
+      <p:sp>
+        <p:nvSpPr>
+          <p:cNvPr id="14" name="Rectangle 13"/>
+          <p:cNvSpPr/>
+          <p:nvPr/>
+        </p:nvSpPr>
+        <p:spPr>
+          <a:xfrm>
+            <a:off x="3699937" y="4014227"/>
+            <a:ext cx="1730320" cy="396667"/>
+          </a:xfrm>
+          <a:prstGeom prst="rect">
+            <a:avLst/>
+          </a:prstGeom>
+          <a:solidFill>
+            <a:schemeClr val="accent4"/>
+          </a:solidFill>
+          <a:ln w="28575" cmpd="sng">
+            <a:solidFill>
+              <a:schemeClr val="accent1"/>
+            </a:solidFill>
+          </a:ln>
+          <a:effectLst/>
+        </p:spPr>
+        <p:style>
+          <a:lnRef idx="1">
+            <a:schemeClr val="accent1"/>
+          </a:lnRef>
+          <a:fillRef idx="3">
+            <a:schemeClr val="accent1"/>
+          </a:fillRef>
+          <a:effectRef idx="2">
+            <a:schemeClr val="accent1"/>
+          </a:effectRef>
+          <a:fontRef idx="minor">
+            <a:schemeClr val="lt1"/>
+          </a:fontRef>
+        </p:style>
+        <p:txBody>
+          <a:bodyPr rtlCol="0" anchor="ctr"/>
+          <a:lstStyle/>
+          <a:p>
+            <a:pPr algn="ctr"/>
+            <a:r>
+              <a:rPr lang="en-US" dirty="0" smtClean="0">
+                <a:solidFill>
+                  <a:srgbClr val="F8F8F8"/>
+                </a:solidFill>
+              </a:rPr>
+              <a:t>request data</a:t>
+            </a:r>
+            <a:endParaRPr lang="en-US" dirty="0">
+              <a:solidFill>
+                <a:srgbClr val="F8F8F8"/>
+              </a:solidFill>
+            </a:endParaRPr>
+          </a:p>
+        </p:txBody>
+      </p:sp>
+      <p:sp>
+        <p:nvSpPr>
+          <p:cNvPr id="18" name="Rectangle 17"/>
+          <p:cNvSpPr/>
+          <p:nvPr/>
+        </p:nvSpPr>
+        <p:spPr>
+          <a:xfrm>
+            <a:off x="702737" y="5093893"/>
+            <a:ext cx="1730320" cy="396667"/>
+          </a:xfrm>
+          <a:prstGeom prst="rect">
+            <a:avLst/>
+          </a:prstGeom>
+          <a:solidFill>
+            <a:schemeClr val="accent5"/>
+          </a:solidFill>
+          <a:ln w="28575" cmpd="sng">
+            <a:solidFill>
+              <a:schemeClr val="accent1"/>
+            </a:solidFill>
+          </a:ln>
+          <a:effectLst/>
+        </p:spPr>
+        <p:style>
+          <a:lnRef idx="1">
+            <a:schemeClr val="accent1"/>
+          </a:lnRef>
+          <a:fillRef idx="3">
+            <a:schemeClr val="accent1"/>
+          </a:fillRef>
+          <a:effectRef idx="2">
+            <a:schemeClr val="accent1"/>
+          </a:effectRef>
+          <a:fontRef idx="minor">
+            <a:schemeClr val="lt1"/>
+          </a:fontRef>
+        </p:style>
+        <p:txBody>
+          <a:bodyPr rtlCol="0" anchor="ctr"/>
+          <a:lstStyle/>
+          <a:p>
+            <a:pPr algn="ctr"/>
+            <a:r>
+              <a:rPr lang="en-US" dirty="0" smtClean="0">
+                <a:solidFill>
+                  <a:srgbClr val="F8F8F8"/>
+                </a:solidFill>
+              </a:rPr>
+              <a:t>return data</a:t>
+            </a:r>
+            <a:endParaRPr lang="en-US" dirty="0">
+              <a:solidFill>
+                <a:srgbClr val="F8F8F8"/>
+              </a:solidFill>
+            </a:endParaRPr>
+          </a:p>
+        </p:txBody>
+      </p:sp>
+      <p:cxnSp>
+        <p:nvCxnSpPr>
+          <p:cNvPr id="19" name="Straight Arrow Connector 18"/>
+          <p:cNvCxnSpPr/>
+          <p:nvPr/>
+        </p:nvCxnSpPr>
+        <p:spPr>
+          <a:xfrm>
+            <a:off x="1567897" y="4410894"/>
+            <a:ext cx="0" cy="614240"/>
+          </a:xfrm>
+          <a:prstGeom prst="straightConnector1">
+            <a:avLst/>
+          </a:prstGeom>
+          <a:ln w="57150" cmpd="sng">
+            <a:solidFill>
+              <a:schemeClr val="accent2"/>
+            </a:solidFill>
+            <a:headEnd type="none"/>
+            <a:tailEnd type="triangle"/>
+          </a:ln>
+          <a:effectLst/>
+        </p:spPr>
+        <p:style>
+          <a:lnRef idx="2">
+            <a:schemeClr val="accent1"/>
+          </a:lnRef>
+          <a:fillRef idx="0">
+            <a:schemeClr val="accent1"/>
+          </a:fillRef>
+          <a:effectRef idx="1">
+            <a:schemeClr val="accent1"/>
+          </a:effectRef>
+          <a:fontRef idx="minor">
+            <a:schemeClr val="tx1"/>
+          </a:fontRef>
+        </p:style>
+      </p:cxnSp>
+      <p:sp>
+        <p:nvSpPr>
+          <p:cNvPr id="16" name="Rectangle 15"/>
+          <p:cNvSpPr/>
+          <p:nvPr/>
+        </p:nvSpPr>
+        <p:spPr>
+          <a:xfrm>
+            <a:off x="702737" y="4014227"/>
+            <a:ext cx="1730320" cy="396667"/>
+          </a:xfrm>
+          <a:prstGeom prst="rect">
+            <a:avLst/>
+          </a:prstGeom>
+          <a:solidFill>
+            <a:schemeClr val="accent5"/>
+          </a:solidFill>
+          <a:ln w="28575" cmpd="sng">
+            <a:solidFill>
+              <a:schemeClr val="accent1"/>
+            </a:solidFill>
+          </a:ln>
+          <a:effectLst/>
+        </p:spPr>
+        <p:style>
+          <a:lnRef idx="1">
+            <a:schemeClr val="accent1"/>
+          </a:lnRef>
+          <a:fillRef idx="3">
+            <a:schemeClr val="accent1"/>
+          </a:fillRef>
+          <a:effectRef idx="2">
+            <a:schemeClr val="accent1"/>
+          </a:effectRef>
+          <a:fontRef idx="minor">
+            <a:schemeClr val="lt1"/>
+          </a:fontRef>
+        </p:style>
+        <p:txBody>
+          <a:bodyPr rtlCol="0" anchor="ctr"/>
+          <a:lstStyle/>
+          <a:p>
+            <a:pPr algn="ctr"/>
+            <a:r>
+              <a:rPr lang="en-US" dirty="0" smtClean="0">
+                <a:solidFill>
+                  <a:srgbClr val="F8F8F8"/>
+                </a:solidFill>
+              </a:rPr>
+              <a:t>gather data</a:t>
+            </a:r>
+            <a:endParaRPr lang="en-US" dirty="0">
+              <a:solidFill>
+                <a:srgbClr val="F8F8F8"/>
+              </a:solidFill>
+            </a:endParaRPr>
+          </a:p>
+        </p:txBody>
+      </p:sp>
+    </p:spTree>
+    <p:extLst>
+      <p:ext uri="{BB962C8B-B14F-4D97-AF65-F5344CB8AC3E}">
+        <p14:creationId xmlns:p14="http://schemas.microsoft.com/office/powerpoint/2010/main" val="96029311"/>
+      </p:ext>
+    </p:extLst>
+  </p:cSld>
+  <p:clrMapOvr>
+    <a:masterClrMapping/>
+  </p:clrMapOvr>
+  <p:timing>
+    <p:tnLst>
+      <p:par>
+        <p:cTn xmlns:p14="http://schemas.microsoft.com/office/powerpoint/2010/main" id="1" dur="indefinite" restart="never" nodeType="tmRoot"/>
+      </p:par>
+    </p:tnLst>
+  </p:timing>
+</p:sld>
+</file>
+
+<file path=ppt/slides/slide28.xml><?xml version="1.0" encoding="utf-8"?>
+<p:sld xmlns:a="http://schemas.openxmlformats.org/drawingml/2006/main" xmlns:r="http://schemas.openxmlformats.org/officeDocument/2006/relationships" xmlns:p="http://schemas.openxmlformats.org/presentationml/2006/main">
+  <p:cSld>
+    <p:spTree>
+      <p:nvGrpSpPr>
+        <p:cNvPr id="1" name=""/>
+        <p:cNvGrpSpPr/>
+        <p:nvPr/>
+      </p:nvGrpSpPr>
+      <p:grpSpPr>
+        <a:xfrm>
+          <a:off x="0" y="0"/>
+          <a:ext cx="0" cy="0"/>
+          <a:chOff x="0" y="0"/>
+          <a:chExt cx="0" cy="0"/>
+        </a:xfrm>
+      </p:grpSpPr>
+      <p:sp>
+        <p:nvSpPr>
+          <p:cNvPr id="2" name="Title 1"/>
+          <p:cNvSpPr>
+            <a:spLocks noGrp="1"/>
+          </p:cNvSpPr>
+          <p:nvPr>
+            <p:ph type="title"/>
+          </p:nvPr>
+        </p:nvSpPr>
+        <p:spPr/>
+        <p:txBody>
+          <a:bodyPr/>
+          <a:lstStyle/>
+          <a:p>
+            <a:r>
+              <a:rPr lang="en-US" dirty="0" smtClean="0"/>
+              <a:t>Bernie’s Bistro: List</a:t>
+            </a:r>
+            <a:endParaRPr lang="en-US" dirty="0"/>
+          </a:p>
+        </p:txBody>
+      </p:sp>
+      <p:sp>
+        <p:nvSpPr>
+          <p:cNvPr id="3" name="Footer Placeholder 2"/>
+          <p:cNvSpPr>
+            <a:spLocks noGrp="1"/>
+          </p:cNvSpPr>
+          <p:nvPr>
+            <p:ph type="ftr" sz="quarter" idx="3"/>
+          </p:nvPr>
+        </p:nvSpPr>
+        <p:spPr/>
+        <p:txBody>
+          <a:bodyPr/>
+          <a:lstStyle/>
+          <a:p>
+            <a:r>
+              <a:rPr lang="en-US" smtClean="0"/>
+              <a:t>Model – View – Controller: A Design Pattern</a:t>
+            </a:r>
+            <a:endParaRPr lang="en-US" dirty="0"/>
+          </a:p>
+        </p:txBody>
+      </p:sp>
+      <p:sp>
+        <p:nvSpPr>
+          <p:cNvPr id="4" name="Rectangle 3"/>
+          <p:cNvSpPr/>
+          <p:nvPr/>
+        </p:nvSpPr>
+        <p:spPr>
+          <a:xfrm>
+            <a:off x="512064" y="2723877"/>
+            <a:ext cx="2150017" cy="3058909"/>
+          </a:xfrm>
+          <a:prstGeom prst="rect">
+            <a:avLst/>
+          </a:prstGeom>
+          <a:solidFill>
+            <a:srgbClr val="00A9B9"/>
+          </a:solidFill>
+          <a:ln>
+            <a:noFill/>
+          </a:ln>
+          <a:effectLst/>
+        </p:spPr>
+        <p:style>
+          <a:lnRef idx="1">
+            <a:schemeClr val="accent1"/>
+          </a:lnRef>
+          <a:fillRef idx="3">
+            <a:schemeClr val="accent1"/>
+          </a:fillRef>
+          <a:effectRef idx="2">
+            <a:schemeClr val="accent1"/>
+          </a:effectRef>
+          <a:fontRef idx="minor">
+            <a:schemeClr val="lt1"/>
+          </a:fontRef>
+        </p:style>
+        <p:txBody>
+          <a:bodyPr rtlCol="0" anchor="t"/>
+          <a:lstStyle/>
+          <a:p>
+            <a:endParaRPr lang="en-US" sz="2200" dirty="0">
+              <a:solidFill>
+                <a:schemeClr val="accent1"/>
+              </a:solidFill>
+            </a:endParaRPr>
+          </a:p>
+          <a:p>
+            <a:pPr marL="111125"/>
+            <a:endParaRPr lang="en-US" sz="2200" dirty="0" smtClean="0">
+              <a:solidFill>
+                <a:schemeClr val="accent1"/>
+              </a:solidFill>
+            </a:endParaRPr>
+          </a:p>
+        </p:txBody>
+      </p:sp>
+      <p:sp>
+        <p:nvSpPr>
+          <p:cNvPr id="5" name="Rectangle 4"/>
+          <p:cNvSpPr/>
+          <p:nvPr/>
+        </p:nvSpPr>
+        <p:spPr>
+          <a:xfrm>
+            <a:off x="3493911" y="2668662"/>
+            <a:ext cx="2150017" cy="3058909"/>
+          </a:xfrm>
+          <a:prstGeom prst="rect">
+            <a:avLst/>
+          </a:prstGeom>
+          <a:solidFill>
+            <a:srgbClr val="EA4A3C"/>
+          </a:solidFill>
+          <a:ln>
+            <a:noFill/>
+          </a:ln>
+          <a:effectLst/>
+        </p:spPr>
+        <p:style>
+          <a:lnRef idx="1">
+            <a:schemeClr val="accent1"/>
+          </a:lnRef>
+          <a:fillRef idx="3">
+            <a:schemeClr val="accent1"/>
+          </a:fillRef>
+          <a:effectRef idx="2">
+            <a:schemeClr val="accent1"/>
+          </a:effectRef>
+          <a:fontRef idx="minor">
+            <a:schemeClr val="lt1"/>
+          </a:fontRef>
+        </p:style>
+        <p:txBody>
+          <a:bodyPr rtlCol="0" anchor="t"/>
+          <a:lstStyle/>
+          <a:p>
+            <a:pPr marL="111125"/>
+            <a:endParaRPr lang="en-US" sz="2200" dirty="0" smtClean="0">
+              <a:solidFill>
+                <a:srgbClr val="F8F8F8"/>
+              </a:solidFill>
+            </a:endParaRPr>
+          </a:p>
+          <a:p>
+            <a:pPr marL="111125"/>
+            <a:endParaRPr lang="en-US" sz="2200" dirty="0" smtClean="0">
+              <a:solidFill>
+                <a:srgbClr val="F8F8F8"/>
+              </a:solidFill>
+            </a:endParaRPr>
+          </a:p>
+        </p:txBody>
+      </p:sp>
+      <p:sp>
+        <p:nvSpPr>
+          <p:cNvPr id="6" name="Rectangle 5"/>
+          <p:cNvSpPr/>
+          <p:nvPr/>
+        </p:nvSpPr>
+        <p:spPr>
+          <a:xfrm>
+            <a:off x="6536783" y="2723877"/>
+            <a:ext cx="2150017" cy="3058909"/>
+          </a:xfrm>
+          <a:prstGeom prst="rect">
+            <a:avLst/>
+          </a:prstGeom>
+          <a:solidFill>
+            <a:schemeClr val="accent6"/>
+          </a:solidFill>
+          <a:ln>
+            <a:noFill/>
+          </a:ln>
+          <a:effectLst/>
+        </p:spPr>
+        <p:style>
+          <a:lnRef idx="1">
+            <a:schemeClr val="accent1"/>
+          </a:lnRef>
+          <a:fillRef idx="3">
+            <a:schemeClr val="accent1"/>
+          </a:fillRef>
+          <a:effectRef idx="2">
+            <a:schemeClr val="accent1"/>
+          </a:effectRef>
+          <a:fontRef idx="minor">
+            <a:schemeClr val="lt1"/>
+          </a:fontRef>
+        </p:style>
+        <p:txBody>
+          <a:bodyPr rtlCol="0" anchor="t"/>
+          <a:lstStyle/>
+          <a:p>
+            <a:pPr marL="111125"/>
+            <a:endParaRPr lang="en-US" sz="2200" dirty="0" smtClean="0">
+              <a:solidFill>
+                <a:srgbClr val="F8F8F8"/>
+              </a:solidFill>
+            </a:endParaRPr>
+          </a:p>
+          <a:p>
+            <a:pPr marL="111125"/>
+            <a:endParaRPr lang="en-US" sz="2200" dirty="0" smtClean="0">
+              <a:solidFill>
+                <a:srgbClr val="F8F8F8"/>
+              </a:solidFill>
+            </a:endParaRPr>
+          </a:p>
+        </p:txBody>
+      </p:sp>
+      <p:sp>
+        <p:nvSpPr>
+          <p:cNvPr id="8" name="TextBox 7"/>
+          <p:cNvSpPr txBox="1"/>
+          <p:nvPr/>
+        </p:nvSpPr>
+        <p:spPr>
+          <a:xfrm>
+            <a:off x="457200" y="1865376"/>
+            <a:ext cx="2204881" cy="584776"/>
+          </a:xfrm>
+          <a:prstGeom prst="rect">
+            <a:avLst/>
+          </a:prstGeom>
+          <a:noFill/>
+        </p:spPr>
+        <p:txBody>
+          <a:bodyPr wrap="square" rtlCol="0">
+            <a:spAutoFit/>
+          </a:bodyPr>
+          <a:lstStyle/>
+          <a:p>
+            <a:pPr algn="ctr"/>
+            <a:r>
+              <a:rPr lang="en-US" sz="3200" dirty="0" smtClean="0"/>
+              <a:t>Model</a:t>
+            </a:r>
+            <a:endParaRPr lang="en-US" sz="3200" dirty="0"/>
+          </a:p>
+        </p:txBody>
+      </p:sp>
+      <p:sp>
+        <p:nvSpPr>
+          <p:cNvPr id="10" name="TextBox 9"/>
+          <p:cNvSpPr txBox="1"/>
+          <p:nvPr/>
+        </p:nvSpPr>
+        <p:spPr>
+          <a:xfrm>
+            <a:off x="3493911" y="1865376"/>
+            <a:ext cx="2204881" cy="584776"/>
+          </a:xfrm>
+          <a:prstGeom prst="rect">
+            <a:avLst/>
+          </a:prstGeom>
+          <a:noFill/>
+        </p:spPr>
+        <p:txBody>
+          <a:bodyPr wrap="square" rtlCol="0">
+            <a:spAutoFit/>
+          </a:bodyPr>
+          <a:lstStyle/>
+          <a:p>
+            <a:pPr algn="ctr"/>
+            <a:r>
+              <a:rPr lang="en-US" sz="3200" dirty="0" smtClean="0"/>
+              <a:t>Controller</a:t>
+            </a:r>
+            <a:endParaRPr lang="en-US" sz="3200" dirty="0"/>
+          </a:p>
+        </p:txBody>
+      </p:sp>
+      <p:sp>
+        <p:nvSpPr>
+          <p:cNvPr id="11" name="TextBox 10"/>
+          <p:cNvSpPr txBox="1"/>
+          <p:nvPr/>
+        </p:nvSpPr>
+        <p:spPr>
+          <a:xfrm>
+            <a:off x="6536783" y="1865376"/>
+            <a:ext cx="2204881" cy="584776"/>
+          </a:xfrm>
+          <a:prstGeom prst="rect">
+            <a:avLst/>
+          </a:prstGeom>
+          <a:noFill/>
+        </p:spPr>
+        <p:txBody>
+          <a:bodyPr wrap="square" rtlCol="0">
+            <a:spAutoFit/>
+          </a:bodyPr>
+          <a:lstStyle/>
+          <a:p>
+            <a:pPr algn="ctr"/>
+            <a:r>
+              <a:rPr lang="en-US" sz="3200" dirty="0" smtClean="0"/>
+              <a:t>View</a:t>
+            </a:r>
+            <a:endParaRPr lang="en-US" sz="3200" dirty="0"/>
+          </a:p>
+        </p:txBody>
+      </p:sp>
+      <p:cxnSp>
+        <p:nvCxnSpPr>
+          <p:cNvPr id="12" name="Straight Arrow Connector 11"/>
+          <p:cNvCxnSpPr>
+            <a:stCxn id="7" idx="1"/>
+          </p:cNvCxnSpPr>
+          <p:nvPr/>
+        </p:nvCxnSpPr>
+        <p:spPr>
+          <a:xfrm flipH="1">
+            <a:off x="5537200" y="3132894"/>
+            <a:ext cx="1218407" cy="0"/>
+          </a:xfrm>
+          <a:prstGeom prst="straightConnector1">
+            <a:avLst/>
+          </a:prstGeom>
+          <a:ln w="57150" cmpd="sng">
+            <a:solidFill>
+              <a:schemeClr val="accent2"/>
+            </a:solidFill>
+            <a:headEnd type="none"/>
+            <a:tailEnd type="triangle"/>
+          </a:ln>
+          <a:effectLst/>
+        </p:spPr>
+        <p:style>
+          <a:lnRef idx="2">
+            <a:schemeClr val="accent1"/>
+          </a:lnRef>
+          <a:fillRef idx="0">
+            <a:schemeClr val="accent1"/>
+          </a:fillRef>
+          <a:effectRef idx="1">
+            <a:schemeClr val="accent1"/>
+          </a:effectRef>
+          <a:fontRef idx="minor">
+            <a:schemeClr val="tx1"/>
+          </a:fontRef>
+        </p:style>
+      </p:cxnSp>
+      <p:sp>
+        <p:nvSpPr>
+          <p:cNvPr id="7" name="Rectangle 6"/>
+          <p:cNvSpPr/>
+          <p:nvPr/>
+        </p:nvSpPr>
+        <p:spPr>
+          <a:xfrm>
+            <a:off x="6755607" y="2934560"/>
+            <a:ext cx="1730320" cy="396667"/>
+          </a:xfrm>
+          <a:prstGeom prst="rect">
+            <a:avLst/>
+          </a:prstGeom>
+          <a:solidFill>
+            <a:schemeClr val="accent6"/>
+          </a:solidFill>
+          <a:ln w="28575" cmpd="sng">
+            <a:solidFill>
+              <a:schemeClr val="accent1"/>
+            </a:solidFill>
+          </a:ln>
+          <a:effectLst/>
+        </p:spPr>
+        <p:style>
+          <a:lnRef idx="1">
+            <a:schemeClr val="accent1"/>
+          </a:lnRef>
+          <a:fillRef idx="3">
+            <a:schemeClr val="accent1"/>
+          </a:fillRef>
+          <a:effectRef idx="2">
+            <a:schemeClr val="accent1"/>
+          </a:effectRef>
+          <a:fontRef idx="minor">
+            <a:schemeClr val="lt1"/>
+          </a:fontRef>
+        </p:style>
+        <p:txBody>
+          <a:bodyPr rtlCol="0" anchor="ctr"/>
+          <a:lstStyle/>
+          <a:p>
+            <a:pPr algn="ctr"/>
+            <a:r>
+              <a:rPr lang="en-US" dirty="0" smtClean="0">
+                <a:solidFill>
+                  <a:srgbClr val="F8F8F8"/>
+                </a:solidFill>
+              </a:rPr>
+              <a:t>send input</a:t>
+            </a:r>
+            <a:endParaRPr lang="en-US" dirty="0">
+              <a:solidFill>
+                <a:srgbClr val="F8F8F8"/>
+              </a:solidFill>
+            </a:endParaRPr>
+          </a:p>
+        </p:txBody>
+      </p:sp>
+      <p:cxnSp>
+        <p:nvCxnSpPr>
+          <p:cNvPr id="15" name="Straight Arrow Connector 14"/>
+          <p:cNvCxnSpPr>
+            <a:stCxn id="13" idx="2"/>
+          </p:cNvCxnSpPr>
+          <p:nvPr/>
+        </p:nvCxnSpPr>
+        <p:spPr>
+          <a:xfrm>
+            <a:off x="4565097" y="3331227"/>
+            <a:ext cx="0" cy="614240"/>
+          </a:xfrm>
+          <a:prstGeom prst="straightConnector1">
+            <a:avLst/>
+          </a:prstGeom>
+          <a:ln w="57150" cmpd="sng">
+            <a:solidFill>
+              <a:schemeClr val="accent2"/>
+            </a:solidFill>
+            <a:headEnd type="none"/>
+            <a:tailEnd type="triangle"/>
+          </a:ln>
+          <a:effectLst/>
+        </p:spPr>
+        <p:style>
+          <a:lnRef idx="2">
+            <a:schemeClr val="accent1"/>
+          </a:lnRef>
+          <a:fillRef idx="0">
+            <a:schemeClr val="accent1"/>
+          </a:fillRef>
+          <a:effectRef idx="1">
+            <a:schemeClr val="accent1"/>
+          </a:effectRef>
+          <a:fontRef idx="minor">
+            <a:schemeClr val="tx1"/>
+          </a:fontRef>
+        </p:style>
+      </p:cxnSp>
+      <p:sp>
+        <p:nvSpPr>
+          <p:cNvPr id="13" name="Rectangle 12"/>
+          <p:cNvSpPr/>
+          <p:nvPr/>
+        </p:nvSpPr>
+        <p:spPr>
+          <a:xfrm>
+            <a:off x="3699937" y="2934560"/>
+            <a:ext cx="1730320" cy="396667"/>
+          </a:xfrm>
+          <a:prstGeom prst="rect">
+            <a:avLst/>
+          </a:prstGeom>
+          <a:solidFill>
+            <a:schemeClr val="accent4"/>
+          </a:solidFill>
+          <a:ln w="28575" cmpd="sng">
+            <a:solidFill>
+              <a:schemeClr val="accent1"/>
+            </a:solidFill>
+          </a:ln>
+          <a:effectLst/>
+        </p:spPr>
+        <p:style>
+          <a:lnRef idx="1">
+            <a:schemeClr val="accent1"/>
+          </a:lnRef>
+          <a:fillRef idx="3">
+            <a:schemeClr val="accent1"/>
+          </a:fillRef>
+          <a:effectRef idx="2">
+            <a:schemeClr val="accent1"/>
+          </a:effectRef>
+          <a:fontRef idx="minor">
+            <a:schemeClr val="lt1"/>
+          </a:fontRef>
+        </p:style>
+        <p:txBody>
+          <a:bodyPr rtlCol="0" anchor="ctr"/>
+          <a:lstStyle/>
+          <a:p>
+            <a:pPr algn="ctr"/>
+            <a:r>
+              <a:rPr lang="en-US" dirty="0" smtClean="0">
+                <a:solidFill>
+                  <a:srgbClr val="F8F8F8"/>
+                </a:solidFill>
+              </a:rPr>
+              <a:t>interpret input</a:t>
+            </a:r>
+            <a:endParaRPr lang="en-US" dirty="0">
+              <a:solidFill>
+                <a:srgbClr val="F8F8F8"/>
+              </a:solidFill>
+            </a:endParaRPr>
+          </a:p>
+        </p:txBody>
+      </p:sp>
+      <p:cxnSp>
+        <p:nvCxnSpPr>
+          <p:cNvPr id="17" name="Straight Arrow Connector 16"/>
+          <p:cNvCxnSpPr/>
+          <p:nvPr/>
+        </p:nvCxnSpPr>
+        <p:spPr>
+          <a:xfrm flipH="1">
             <a:off x="2545030" y="4237794"/>
             <a:ext cx="1218407" cy="0"/>
           </a:xfrm>
@@ -11236,7 +11370,7 @@
 </p:sld>
 </file>
 
-<file path=ppt/slides/slide28.xml><?xml version="1.0" encoding="utf-8"?>
+<file path=ppt/slides/slide29.xml><?xml version="1.0" encoding="utf-8"?>
 <p:sld xmlns:a="http://schemas.openxmlformats.org/drawingml/2006/main" xmlns:r="http://schemas.openxmlformats.org/officeDocument/2006/relationships" xmlns:p="http://schemas.openxmlformats.org/presentationml/2006/main">
   <p:cSld>
     <p:spTree>
@@ -12749,36 +12883,38 @@
         </p:nvSpPr>
         <p:spPr/>
         <p:txBody>
-          <a:bodyPr/>
-          <a:lstStyle/>
-          <a:p>
-            <a:r>
-              <a:rPr lang="en-US" sz="2500" dirty="0" smtClean="0"/>
+          <a:bodyPr>
+            <a:normAutofit/>
+          </a:bodyPr>
+          <a:lstStyle/>
+          <a:p>
+            <a:r>
+              <a:rPr lang="en-US" sz="3400" dirty="0" smtClean="0"/>
               <a:t>MVC is not much different than th</a:t>
             </a:r>
             <a:r>
-              <a:rPr lang="en-US" sz="2500" dirty="0" smtClean="0"/>
+              <a:rPr lang="en-US" sz="3400" dirty="0" smtClean="0"/>
               <a:t>e code you are already writing. </a:t>
             </a:r>
-            <a:endParaRPr lang="en-US" sz="2500" dirty="0" smtClean="0"/>
-          </a:p>
-          <a:p>
-            <a:r>
-              <a:rPr lang="en-US" sz="2500" dirty="0" smtClean="0"/>
+            <a:endParaRPr lang="en-US" sz="3400" dirty="0" smtClean="0"/>
+          </a:p>
+          <a:p>
+            <a:r>
+              <a:rPr lang="en-US" sz="3400" dirty="0" smtClean="0"/>
               <a:t>These </a:t>
             </a:r>
             <a:r>
-              <a:rPr lang="en-US" sz="2500" dirty="0" smtClean="0"/>
+              <a:rPr lang="en-US" sz="3400" dirty="0" smtClean="0"/>
               <a:t>are all just classes!</a:t>
             </a:r>
           </a:p>
           <a:p>
             <a:r>
-              <a:rPr lang="en-US" sz="2500" smtClean="0"/>
+              <a:rPr lang="en-US" sz="3400" dirty="0" smtClean="0"/>
               <a:t>They’re </a:t>
             </a:r>
             <a:r>
-              <a:rPr lang="en-US" sz="2500" dirty="0" smtClean="0"/>
+              <a:rPr lang="en-US" sz="3400" dirty="0" smtClean="0"/>
               <a:t>just organized in a different way</a:t>
             </a:r>
           </a:p>
@@ -12786,25 +12922,7 @@
             <a:pPr marL="45720" indent="0">
               <a:buNone/>
             </a:pPr>
-            <a:endParaRPr lang="en-US" sz="2500" dirty="0"/>
-          </a:p>
-          <a:p>
-            <a:pPr marL="45720" indent="0">
-              <a:buNone/>
-            </a:pPr>
-            <a:endParaRPr lang="en-US" sz="2500" dirty="0" smtClean="0"/>
-          </a:p>
-          <a:p>
-            <a:pPr marL="45720" indent="0" algn="ctr">
-              <a:buNone/>
-            </a:pPr>
-            <a:r>
-              <a:rPr lang="en-US" sz="2500" dirty="0" smtClean="0"/>
-              <a:t>LET’S TRY IT OUT.</a:t>
-            </a:r>
-          </a:p>
-          <a:p>
-            <a:endParaRPr lang="en-US" dirty="0"/>
+            <a:endParaRPr lang="en-US" sz="3400" dirty="0"/>
           </a:p>
         </p:txBody>
       </p:sp>
@@ -12825,7 +12943,7 @@
           <a:p>
             <a:r>
               <a:rPr lang="en-US" dirty="0" smtClean="0"/>
-              <a:t>GOOD NEWS…</a:t>
+              <a:t>Quick Review	 </a:t>
             </a:r>
             <a:endParaRPr lang="en-US" dirty="0"/>
           </a:p>
@@ -12903,20 +13021,44 @@
         </p:nvSpPr>
         <p:spPr/>
         <p:txBody>
-          <a:bodyPr/>
+          <a:bodyPr>
+            <a:normAutofit/>
+          </a:bodyPr>
           <a:lstStyle/>
           <a:p>
             <a:r>
               <a:rPr lang="en-US" dirty="0" smtClean="0"/>
-              <a:t>What is it?</a:t>
-            </a:r>
-          </a:p>
-          <a:p>
+              <a:t>What is it</a:t>
+            </a:r>
             <a:r>
               <a:rPr lang="en-US" dirty="0" smtClean="0"/>
-              <a:t>What does it look like?</a:t>
-            </a:r>
-            <a:endParaRPr lang="en-US" dirty="0"/>
+              <a:t>?</a:t>
+            </a:r>
+          </a:p>
+          <a:p>
+            <a:r>
+              <a:rPr lang="en-US" dirty="0" smtClean="0"/>
+              <a:t>In short: MVC is a design pattern.</a:t>
+            </a:r>
+          </a:p>
+          <a:p>
+            <a:r>
+              <a:rPr lang="en-US" dirty="0" smtClean="0"/>
+              <a:t>In not so short</a:t>
+            </a:r>
+            <a:r>
+              <a:rPr lang="en-US" dirty="0"/>
+              <a:t>: </a:t>
+            </a:r>
+            <a:r>
+              <a:rPr lang="en-US" sz="2200" dirty="0" smtClean="0"/>
+              <a:t>MVC is </a:t>
+            </a:r>
+            <a:r>
+              <a:rPr lang="en-US" sz="2200" dirty="0"/>
+              <a:t>a software architectural pattern for implementing user interfaces. It divides a given software application into three interconnected parts, so as to separate internal representations of information from the ways that information is presented to or accepted from the user.</a:t>
+            </a:r>
+            <a:endParaRPr lang="en-US" sz="2200" dirty="0" smtClean="0"/>
           </a:p>
         </p:txBody>
       </p:sp>

</xml_diff>

<commit_message>
replace bistro with todos
</commit_message>
<xml_diff>
--- a/1phase/ruby-mvc-single-res/HT-MVC.pptx
+++ b/1phase/ruby-mvc-single-res/HT-MVC.pptx
@@ -704,7 +704,15 @@
           <a:p>
             <a:r>
               <a:rPr lang="en-US" dirty="0" smtClean="0"/>
-              <a:t>Walk through Bernie’s Bistro MVC code.</a:t>
+              <a:t>Walk through </a:t>
+            </a:r>
+            <a:r>
+              <a:rPr lang="en-US" dirty="0" smtClean="0"/>
+              <a:t>TODO's </a:t>
+            </a:r>
+            <a:r>
+              <a:rPr lang="en-US" dirty="0" smtClean="0"/>
+              <a:t>MVC code.</a:t>
             </a:r>
             <a:endParaRPr lang="en-US" dirty="0"/>
           </a:p>
@@ -5370,7 +5378,11 @@
           <a:p>
             <a:r>
               <a:rPr lang="en-US" dirty="0" smtClean="0"/>
-              <a:t>M-V-C Bernie’s Bistro</a:t>
+              <a:t>M-V-C </a:t>
+            </a:r>
+            <a:r>
+              <a:rPr lang="en-US" dirty="0" smtClean="0"/>
+              <a:t>TODO's</a:t>
             </a:r>
             <a:endParaRPr lang="en-US" dirty="0"/>
           </a:p>
@@ -5393,7 +5405,15 @@
           <a:p>
             <a:r>
               <a:rPr lang="en-US" dirty="0" smtClean="0"/>
-              <a:t>How would Bernie’s Bistro look following the M-V-C pattern?</a:t>
+              <a:t>How would </a:t>
+            </a:r>
+            <a:r>
+              <a:rPr lang="en-US" dirty="0" smtClean="0"/>
+              <a:t>TODO's </a:t>
+            </a:r>
+            <a:r>
+              <a:rPr lang="en-US" dirty="0" smtClean="0"/>
+              <a:t>look following the M-V-C pattern?</a:t>
             </a:r>
             <a:endParaRPr lang="en-US" dirty="0"/>
           </a:p>
@@ -5476,8 +5496,13 @@
           <a:p>
             <a:r>
               <a:rPr lang="en-US" dirty="0"/>
-              <a:t>M-V-C Bernie’s Bistro</a:t>
-            </a:r>
+              <a:t>M-V-C </a:t>
+            </a:r>
+            <a:r>
+              <a:rPr lang="en-US" dirty="0" smtClean="0"/>
+              <a:t>TODO's</a:t>
+            </a:r>
+            <a:endParaRPr lang="en-US" dirty="0"/>
           </a:p>
         </p:txBody>
       </p:sp>
@@ -6034,8 +6059,13 @@
           <a:p>
             <a:r>
               <a:rPr lang="en-US" dirty="0"/>
-              <a:t>M-V-C Bernie’s Bistro</a:t>
-            </a:r>
+              <a:t>M-V-C </a:t>
+            </a:r>
+            <a:r>
+              <a:rPr lang="en-US" dirty="0" smtClean="0"/>
+              <a:t>TODO's</a:t>
+            </a:r>
+            <a:endParaRPr lang="en-US" dirty="0"/>
           </a:p>
         </p:txBody>
       </p:sp>
@@ -6494,8 +6524,13 @@
           <a:p>
             <a:r>
               <a:rPr lang="en-US" dirty="0"/>
-              <a:t>M-V-C Bernie’s Bistro</a:t>
-            </a:r>
+              <a:t>M-V-C </a:t>
+            </a:r>
+            <a:r>
+              <a:rPr lang="en-US" dirty="0" smtClean="0"/>
+              <a:t>TODO's</a:t>
+            </a:r>
+            <a:endParaRPr lang="en-US" dirty="0"/>
           </a:p>
         </p:txBody>
       </p:sp>
@@ -6960,8 +6995,13 @@
           <a:p>
             <a:r>
               <a:rPr lang="en-US" dirty="0"/>
-              <a:t>M-V-C Bernie’s Bistro</a:t>
-            </a:r>
+              <a:t>M-V-C </a:t>
+            </a:r>
+            <a:r>
+              <a:rPr lang="en-US" dirty="0" smtClean="0"/>
+              <a:t>TODO's</a:t>
+            </a:r>
+            <a:endParaRPr lang="en-US" dirty="0"/>
           </a:p>
         </p:txBody>
       </p:sp>
@@ -7503,7 +7543,11 @@
           <a:p>
             <a:r>
               <a:rPr lang="en-US" dirty="0" smtClean="0"/>
-              <a:t>Bernie’s Bistro: List</a:t>
+              <a:t>TODO's: </a:t>
+            </a:r>
+            <a:r>
+              <a:rPr lang="en-US" dirty="0" smtClean="0"/>
+              <a:t>List</a:t>
             </a:r>
             <a:endParaRPr lang="en-US" dirty="0"/>
           </a:p>
@@ -7908,7 +7952,11 @@
           <a:p>
             <a:r>
               <a:rPr lang="en-US" dirty="0" smtClean="0"/>
-              <a:t>Bernie’s Bistro: List</a:t>
+              <a:t>TODO's: </a:t>
+            </a:r>
+            <a:r>
+              <a:rPr lang="en-US" dirty="0" smtClean="0"/>
+              <a:t>List</a:t>
             </a:r>
             <a:endParaRPr lang="en-US" dirty="0"/>
           </a:p>
@@ -8410,7 +8458,11 @@
           <a:p>
             <a:r>
               <a:rPr lang="en-US" dirty="0" smtClean="0"/>
-              <a:t>Bernie’s Bistro: List</a:t>
+              <a:t>TODO's: </a:t>
+            </a:r>
+            <a:r>
+              <a:rPr lang="en-US" dirty="0" smtClean="0"/>
+              <a:t>List</a:t>
             </a:r>
             <a:endParaRPr lang="en-US" dirty="0"/>
           </a:p>
@@ -9013,7 +9065,11 @@
           <a:p>
             <a:r>
               <a:rPr lang="en-US" dirty="0" smtClean="0"/>
-              <a:t>Bernie’s Bistro: List</a:t>
+              <a:t>TODO's: </a:t>
+            </a:r>
+            <a:r>
+              <a:rPr lang="en-US" dirty="0" smtClean="0"/>
+              <a:t>List</a:t>
             </a:r>
             <a:endParaRPr lang="en-US" dirty="0"/>
           </a:p>
@@ -9713,7 +9769,11 @@
           <a:p>
             <a:r>
               <a:rPr lang="en-US" dirty="0" smtClean="0"/>
-              <a:t>Bernie’s Bistro: List</a:t>
+              <a:t>TODO's: </a:t>
+            </a:r>
+            <a:r>
+              <a:rPr lang="en-US" dirty="0" smtClean="0"/>
+              <a:t>List</a:t>
             </a:r>
             <a:endParaRPr lang="en-US" dirty="0"/>
           </a:p>
@@ -10510,7 +10570,11 @@
           <a:p>
             <a:r>
               <a:rPr lang="en-US" dirty="0" smtClean="0"/>
-              <a:t>Bernie’s Bistro: List</a:t>
+              <a:t>TODO's: </a:t>
+            </a:r>
+            <a:r>
+              <a:rPr lang="en-US" dirty="0" smtClean="0"/>
+              <a:t>List</a:t>
             </a:r>
             <a:endParaRPr lang="en-US" dirty="0"/>
           </a:p>
@@ -11404,7 +11468,11 @@
           <a:p>
             <a:r>
               <a:rPr lang="en-US" dirty="0" smtClean="0"/>
-              <a:t>Bernie’s Bistro: List</a:t>
+              <a:t>TODO's: </a:t>
+            </a:r>
+            <a:r>
+              <a:rPr lang="en-US" dirty="0" smtClean="0"/>
+              <a:t>List</a:t>
             </a:r>
             <a:endParaRPr lang="en-US" dirty="0"/>
           </a:p>

</xml_diff>

<commit_message>
add slide for mvc patterns
</commit_message>
<xml_diff>
--- a/1phase/ruby-mvc-single-res/HT-MVC.pptx
+++ b/1phase/ruby-mvc-single-res/HT-MVC.pptx
@@ -5,10 +5,10 @@
     <p:sldMasterId id="2147483660" r:id="rId1"/>
   </p:sldMasterIdLst>
   <p:notesMasterIdLst>
-    <p:notesMasterId r:id="rId32"/>
+    <p:notesMasterId r:id="rId33"/>
   </p:notesMasterIdLst>
   <p:handoutMasterIdLst>
-    <p:handoutMasterId r:id="rId33"/>
+    <p:handoutMasterId r:id="rId34"/>
   </p:handoutMasterIdLst>
   <p:sldIdLst>
     <p:sldId id="256" r:id="rId2"/>
@@ -34,13 +34,14 @@
     <p:sldId id="281" r:id="rId22"/>
     <p:sldId id="282" r:id="rId23"/>
     <p:sldId id="280" r:id="rId24"/>
-    <p:sldId id="270" r:id="rId25"/>
-    <p:sldId id="272" r:id="rId26"/>
-    <p:sldId id="273" r:id="rId27"/>
-    <p:sldId id="275" r:id="rId28"/>
-    <p:sldId id="276" r:id="rId29"/>
-    <p:sldId id="277" r:id="rId30"/>
-    <p:sldId id="278" r:id="rId31"/>
+    <p:sldId id="291" r:id="rId25"/>
+    <p:sldId id="270" r:id="rId26"/>
+    <p:sldId id="272" r:id="rId27"/>
+    <p:sldId id="273" r:id="rId28"/>
+    <p:sldId id="275" r:id="rId29"/>
+    <p:sldId id="276" r:id="rId30"/>
+    <p:sldId id="277" r:id="rId31"/>
+    <p:sldId id="278" r:id="rId32"/>
   </p:sldIdLst>
   <p:sldSz cx="9144000" cy="6858000" type="screen4x3"/>
   <p:notesSz cx="6858000" cy="9144000"/>
@@ -224,7 +225,7 @@
           <a:p>
             <a:fld id="{CAA47771-BE1A-0F41-A2AB-502D986D5C71}" type="datetimeFigureOut">
               <a:rPr lang="en-US" smtClean="0"/>
-              <a:t>8/6/15</a:t>
+              <a:t>8/28/15</a:t>
             </a:fld>
             <a:endParaRPr lang="en-US"/>
           </a:p>
@@ -390,7 +391,7 @@
           <a:p>
             <a:fld id="{4083CDE4-3FA1-6A4B-862D-E61F193A4941}" type="datetimeFigureOut">
               <a:rPr lang="en-US" smtClean="0"/>
-              <a:t>8/6/15</a:t>
+              <a:t>8/28/15</a:t>
             </a:fld>
             <a:endParaRPr lang="en-US"/>
           </a:p>
@@ -705,15 +706,7 @@
           <a:p>
             <a:r>
               <a:rPr lang="en-US" dirty="0" smtClean="0"/>
-              <a:t>Walk through </a:t>
-            </a:r>
-            <a:r>
-              <a:rPr lang="en-US" dirty="0" smtClean="0"/>
-              <a:t>TODO's </a:t>
-            </a:r>
-            <a:r>
-              <a:rPr lang="en-US" dirty="0" smtClean="0"/>
-              <a:t>MVC code.</a:t>
+              <a:t>Walk through TODO's MVC code.</a:t>
             </a:r>
             <a:endParaRPr lang="en-US" dirty="0"/>
           </a:p>
@@ -2223,15 +2216,7 @@
                   <a:schemeClr val="accent3"/>
                 </a:solidFill>
               </a:rPr>
-              <a:t>Author:  </a:t>
-            </a:r>
-            <a:r>
-              <a:rPr lang="en-US" dirty="0" smtClean="0">
-                <a:solidFill>
-                  <a:schemeClr val="accent3"/>
-                </a:solidFill>
-              </a:rPr>
-              <a:t>Hunter Chapman</a:t>
+              <a:t>Author:  Hunter Chapman</a:t>
             </a:r>
             <a:endParaRPr lang="en-US" dirty="0">
               <a:solidFill>
@@ -5496,11 +5481,7 @@
           <a:p>
             <a:r>
               <a:rPr lang="en-US" dirty="0" smtClean="0"/>
-              <a:t>M-V-C </a:t>
-            </a:r>
-            <a:r>
-              <a:rPr lang="en-US" dirty="0" smtClean="0"/>
-              <a:t>TODO's</a:t>
+              <a:t>M-V-C TODO's</a:t>
             </a:r>
             <a:endParaRPr lang="en-US" dirty="0"/>
           </a:p>
@@ -5523,15 +5504,7 @@
           <a:p>
             <a:r>
               <a:rPr lang="en-US" dirty="0" smtClean="0"/>
-              <a:t>How would </a:t>
-            </a:r>
-            <a:r>
-              <a:rPr lang="en-US" dirty="0" smtClean="0"/>
-              <a:t>TODO's </a:t>
-            </a:r>
-            <a:r>
-              <a:rPr lang="en-US" dirty="0" smtClean="0"/>
-              <a:t>look following the M-V-C pattern?</a:t>
+              <a:t>How would TODO's look following the M-V-C pattern?</a:t>
             </a:r>
             <a:endParaRPr lang="en-US" dirty="0"/>
           </a:p>
@@ -5632,7 +5605,6 @@
               <a:rPr lang="en-US" sz="3400" dirty="0" smtClean="0"/>
               <a:t> code.</a:t>
             </a:r>
-            <a:endParaRPr lang="en-US" sz="3400" dirty="0" smtClean="0"/>
           </a:p>
           <a:p>
             <a:pPr marL="45720" indent="0">
@@ -6267,11 +6239,6 @@
               </a:rPr>
               <a:t>List</a:t>
             </a:r>
-            <a:endParaRPr lang="en-US" sz="2200" dirty="0" smtClean="0">
-              <a:solidFill>
-                <a:schemeClr val="accent1"/>
-              </a:solidFill>
-            </a:endParaRPr>
           </a:p>
           <a:p>
             <a:pPr marL="349250" indent="-238125">
@@ -6286,11 +6253,6 @@
               </a:rPr>
               <a:t>Task</a:t>
             </a:r>
-            <a:endParaRPr lang="en-US" sz="2200" dirty="0" smtClean="0">
-              <a:solidFill>
-                <a:schemeClr val="accent1"/>
-              </a:solidFill>
-            </a:endParaRPr>
           </a:p>
           <a:p>
             <a:pPr marL="349250" indent="-238125">
@@ -6742,11 +6704,6 @@
               </a:rPr>
               <a:t>List</a:t>
             </a:r>
-            <a:endParaRPr lang="en-US" sz="2200" dirty="0" smtClean="0">
-              <a:solidFill>
-                <a:schemeClr val="accent1"/>
-              </a:solidFill>
-            </a:endParaRPr>
           </a:p>
           <a:p>
             <a:pPr marL="349250" indent="-238125">
@@ -6761,11 +6718,6 @@
               </a:rPr>
               <a:t>Task</a:t>
             </a:r>
-            <a:endParaRPr lang="en-US" sz="2200" dirty="0" smtClean="0">
-              <a:solidFill>
-                <a:schemeClr val="accent1"/>
-              </a:solidFill>
-            </a:endParaRPr>
           </a:p>
           <a:p>
             <a:pPr marL="349250" indent="-238125">
@@ -6873,15 +6825,7 @@
                   <a:srgbClr val="F8F8F8"/>
                 </a:solidFill>
               </a:rPr>
-              <a:t>TODO-</a:t>
-            </a:r>
-            <a:r>
-              <a:rPr lang="en-US" sz="2200" dirty="0" smtClean="0">
-                <a:solidFill>
-                  <a:srgbClr val="F8F8F8"/>
-                </a:solidFill>
-              </a:rPr>
-              <a:t>Controller</a:t>
+              <a:t>TODO-Controller</a:t>
             </a:r>
           </a:p>
           <a:p>
@@ -7231,11 +7175,6 @@
               </a:rPr>
               <a:t>List</a:t>
             </a:r>
-            <a:endParaRPr lang="en-US" sz="2200" dirty="0" smtClean="0">
-              <a:solidFill>
-                <a:schemeClr val="accent1"/>
-              </a:solidFill>
-            </a:endParaRPr>
           </a:p>
           <a:p>
             <a:pPr marL="349250" indent="-238125">
@@ -7250,11 +7189,6 @@
               </a:rPr>
               <a:t>Task</a:t>
             </a:r>
-            <a:endParaRPr lang="en-US" sz="2200" dirty="0" smtClean="0">
-              <a:solidFill>
-                <a:schemeClr val="accent1"/>
-              </a:solidFill>
-            </a:endParaRPr>
           </a:p>
           <a:p>
             <a:pPr marL="349250" indent="-238125">
@@ -7362,15 +7296,7 @@
                   <a:srgbClr val="F8F8F8"/>
                 </a:solidFill>
               </a:rPr>
-              <a:t>TODO-</a:t>
-            </a:r>
-            <a:r>
-              <a:rPr lang="en-US" sz="2200" dirty="0" smtClean="0">
-                <a:solidFill>
-                  <a:srgbClr val="F8F8F8"/>
-                </a:solidFill>
-              </a:rPr>
-              <a:t>Controller</a:t>
+              <a:t>TODO-Controller</a:t>
             </a:r>
           </a:p>
           <a:p>
@@ -7512,11 +7438,6 @@
               </a:rPr>
               <a:t>Task View</a:t>
             </a:r>
-            <a:endParaRPr lang="en-US" sz="2200" dirty="0" smtClean="0">
-              <a:solidFill>
-                <a:srgbClr val="F8F8F8"/>
-              </a:solidFill>
-            </a:endParaRPr>
           </a:p>
         </p:txBody>
       </p:sp>
@@ -7667,11 +7588,7 @@
           <a:p>
             <a:r>
               <a:rPr lang="en-US" dirty="0" smtClean="0"/>
-              <a:t>TODO's: </a:t>
-            </a:r>
-            <a:r>
-              <a:rPr lang="en-US" dirty="0" smtClean="0"/>
-              <a:t>List</a:t>
+              <a:t>Message Pattern</a:t>
             </a:r>
             <a:endParaRPr lang="en-US" dirty="0"/>
           </a:p>
@@ -7702,184 +7619,14 @@
       </p:sp>
       <p:sp>
         <p:nvSpPr>
-          <p:cNvPr id="4" name="Rectangle 3"/>
-          <p:cNvSpPr/>
-          <p:nvPr/>
-        </p:nvSpPr>
-        <p:spPr>
-          <a:xfrm>
-            <a:off x="512064" y="2723877"/>
-            <a:ext cx="2150017" cy="3058909"/>
-          </a:xfrm>
-          <a:prstGeom prst="rect">
-            <a:avLst/>
-          </a:prstGeom>
-          <a:solidFill>
-            <a:srgbClr val="00A9B9"/>
-          </a:solidFill>
-          <a:ln>
-            <a:noFill/>
-          </a:ln>
-          <a:effectLst/>
-        </p:spPr>
-        <p:style>
-          <a:lnRef idx="1">
-            <a:schemeClr val="accent1"/>
-          </a:lnRef>
-          <a:fillRef idx="3">
-            <a:schemeClr val="accent1"/>
-          </a:fillRef>
-          <a:effectRef idx="2">
-            <a:schemeClr val="accent1"/>
-          </a:effectRef>
-          <a:fontRef idx="minor">
-            <a:schemeClr val="lt1"/>
-          </a:fontRef>
-        </p:style>
-        <p:txBody>
-          <a:bodyPr rtlCol="0" anchor="t"/>
-          <a:lstStyle/>
-          <a:p>
-            <a:endParaRPr lang="en-US" sz="2200" dirty="0">
-              <a:solidFill>
-                <a:schemeClr val="accent1"/>
-              </a:solidFill>
-            </a:endParaRPr>
-          </a:p>
-          <a:p>
-            <a:pPr marL="111125"/>
-            <a:endParaRPr lang="en-US" sz="2200" dirty="0" smtClean="0">
-              <a:solidFill>
-                <a:schemeClr val="accent1"/>
-              </a:solidFill>
-            </a:endParaRPr>
-          </a:p>
-        </p:txBody>
-      </p:sp>
-      <p:sp>
-        <p:nvSpPr>
-          <p:cNvPr id="5" name="Rectangle 4"/>
-          <p:cNvSpPr/>
-          <p:nvPr/>
-        </p:nvSpPr>
-        <p:spPr>
-          <a:xfrm>
-            <a:off x="3493911" y="2668662"/>
-            <a:ext cx="2150017" cy="3058909"/>
-          </a:xfrm>
-          <a:prstGeom prst="rect">
-            <a:avLst/>
-          </a:prstGeom>
-          <a:solidFill>
-            <a:srgbClr val="EA4A3C"/>
-          </a:solidFill>
-          <a:ln>
-            <a:noFill/>
-          </a:ln>
-          <a:effectLst/>
-        </p:spPr>
-        <p:style>
-          <a:lnRef idx="1">
-            <a:schemeClr val="accent1"/>
-          </a:lnRef>
-          <a:fillRef idx="3">
-            <a:schemeClr val="accent1"/>
-          </a:fillRef>
-          <a:effectRef idx="2">
-            <a:schemeClr val="accent1"/>
-          </a:effectRef>
-          <a:fontRef idx="minor">
-            <a:schemeClr val="lt1"/>
-          </a:fontRef>
-        </p:style>
-        <p:txBody>
-          <a:bodyPr rtlCol="0" anchor="t"/>
-          <a:lstStyle/>
-          <a:p>
-            <a:pPr marL="111125"/>
-            <a:endParaRPr lang="en-US" sz="2200" dirty="0" smtClean="0">
-              <a:solidFill>
-                <a:srgbClr val="F8F8F8"/>
-              </a:solidFill>
-            </a:endParaRPr>
-          </a:p>
-          <a:p>
-            <a:pPr marL="111125"/>
-            <a:endParaRPr lang="en-US" sz="2200" dirty="0" smtClean="0">
-              <a:solidFill>
-                <a:srgbClr val="F8F8F8"/>
-              </a:solidFill>
-            </a:endParaRPr>
-          </a:p>
-        </p:txBody>
-      </p:sp>
-      <p:sp>
-        <p:nvSpPr>
-          <p:cNvPr id="6" name="Rectangle 5"/>
-          <p:cNvSpPr/>
-          <p:nvPr/>
-        </p:nvSpPr>
-        <p:spPr>
-          <a:xfrm>
-            <a:off x="6536783" y="2723877"/>
-            <a:ext cx="2150017" cy="3058909"/>
-          </a:xfrm>
-          <a:prstGeom prst="rect">
-            <a:avLst/>
-          </a:prstGeom>
-          <a:solidFill>
-            <a:schemeClr val="accent6"/>
-          </a:solidFill>
-          <a:ln>
-            <a:noFill/>
-          </a:ln>
-          <a:effectLst/>
-        </p:spPr>
-        <p:style>
-          <a:lnRef idx="1">
-            <a:schemeClr val="accent1"/>
-          </a:lnRef>
-          <a:fillRef idx="3">
-            <a:schemeClr val="accent1"/>
-          </a:fillRef>
-          <a:effectRef idx="2">
-            <a:schemeClr val="accent1"/>
-          </a:effectRef>
-          <a:fontRef idx="minor">
-            <a:schemeClr val="lt1"/>
-          </a:fontRef>
-        </p:style>
-        <p:txBody>
-          <a:bodyPr rtlCol="0" anchor="t"/>
-          <a:lstStyle/>
-          <a:p>
-            <a:pPr marL="111125"/>
-            <a:endParaRPr lang="en-US" sz="2200" dirty="0" smtClean="0">
-              <a:solidFill>
-                <a:srgbClr val="F8F8F8"/>
-              </a:solidFill>
-            </a:endParaRPr>
-          </a:p>
-          <a:p>
-            <a:pPr marL="111125"/>
-            <a:endParaRPr lang="en-US" sz="2200" dirty="0" smtClean="0">
-              <a:solidFill>
-                <a:srgbClr val="F8F8F8"/>
-              </a:solidFill>
-            </a:endParaRPr>
-          </a:p>
-        </p:txBody>
-      </p:sp>
-      <p:sp>
-        <p:nvSpPr>
-          <p:cNvPr id="8" name="TextBox 7"/>
+          <p:cNvPr id="7" name="TextBox 6"/>
           <p:cNvSpPr txBox="1"/>
           <p:nvPr/>
         </p:nvSpPr>
         <p:spPr>
           <a:xfrm>
-            <a:off x="457200" y="1865376"/>
-            <a:ext cx="2204881" cy="584776"/>
+            <a:off x="512064" y="1954842"/>
+            <a:ext cx="8174737" cy="4031873"/>
           </a:xfrm>
           <a:prstGeom prst="rect">
             <a:avLst/>
@@ -7892,140 +7639,61 @@
           </a:bodyPr>
           <a:lstStyle/>
           <a:p>
-            <a:pPr algn="ctr"/>
+            <a:pPr marL="457200" indent="-457200">
+              <a:buFont typeface="Arial"/>
+              <a:buChar char="•"/>
+            </a:pPr>
             <a:r>
               <a:rPr lang="en-US" sz="3200" dirty="0" smtClean="0"/>
-              <a:t>Model</a:t>
+              <a:t>All of programming is essentially passing messages between all the things. </a:t>
+            </a:r>
+          </a:p>
+          <a:p>
+            <a:pPr marL="457200" indent="-457200">
+              <a:buFont typeface="Arial"/>
+              <a:buChar char="•"/>
+            </a:pPr>
+            <a:endParaRPr lang="en-US" sz="3200" dirty="0" smtClean="0"/>
+          </a:p>
+          <a:p>
+            <a:pPr marL="457200" indent="-457200">
+              <a:buFont typeface="Arial"/>
+              <a:buChar char="•"/>
+            </a:pPr>
+            <a:r>
+              <a:rPr lang="en-US" sz="3200" dirty="0" smtClean="0"/>
+              <a:t>Start thinking of your methods/classes as a means of passing a message to </a:t>
+            </a:r>
+            <a:r>
+              <a:rPr lang="en-US" sz="3200" smtClean="0"/>
+              <a:t>a place.</a:t>
+            </a:r>
+            <a:endParaRPr lang="en-US" sz="3200" dirty="0" smtClean="0"/>
+          </a:p>
+          <a:p>
+            <a:pPr marL="457200" indent="-457200">
+              <a:buFont typeface="Arial"/>
+              <a:buChar char="•"/>
+            </a:pPr>
+            <a:endParaRPr lang="en-US" sz="3200" dirty="0" smtClean="0"/>
+          </a:p>
+          <a:p>
+            <a:pPr marL="457200" indent="-457200">
+              <a:buFont typeface="Arial"/>
+              <a:buChar char="•"/>
+            </a:pPr>
+            <a:r>
+              <a:rPr lang="en-US" sz="3200" dirty="0" smtClean="0"/>
+              <a:t>That place does a thing and passes some message back. </a:t>
             </a:r>
             <a:endParaRPr lang="en-US" sz="3200" dirty="0"/>
-          </a:p>
-        </p:txBody>
-      </p:sp>
-      <p:sp>
-        <p:nvSpPr>
-          <p:cNvPr id="10" name="TextBox 9"/>
-          <p:cNvSpPr txBox="1"/>
-          <p:nvPr/>
-        </p:nvSpPr>
-        <p:spPr>
-          <a:xfrm>
-            <a:off x="3493911" y="1865376"/>
-            <a:ext cx="2204881" cy="584776"/>
-          </a:xfrm>
-          <a:prstGeom prst="rect">
-            <a:avLst/>
-          </a:prstGeom>
-          <a:noFill/>
-        </p:spPr>
-        <p:txBody>
-          <a:bodyPr wrap="square" rtlCol="0">
-            <a:spAutoFit/>
-          </a:bodyPr>
-          <a:lstStyle/>
-          <a:p>
-            <a:pPr algn="ctr"/>
-            <a:r>
-              <a:rPr lang="en-US" sz="3200" dirty="0" smtClean="0"/>
-              <a:t>Controller</a:t>
-            </a:r>
-            <a:endParaRPr lang="en-US" sz="3200" dirty="0"/>
-          </a:p>
-        </p:txBody>
-      </p:sp>
-      <p:sp>
-        <p:nvSpPr>
-          <p:cNvPr id="11" name="TextBox 10"/>
-          <p:cNvSpPr txBox="1"/>
-          <p:nvPr/>
-        </p:nvSpPr>
-        <p:spPr>
-          <a:xfrm>
-            <a:off x="6536783" y="1865376"/>
-            <a:ext cx="2204881" cy="584776"/>
-          </a:xfrm>
-          <a:prstGeom prst="rect">
-            <a:avLst/>
-          </a:prstGeom>
-          <a:noFill/>
-        </p:spPr>
-        <p:txBody>
-          <a:bodyPr wrap="square" rtlCol="0">
-            <a:spAutoFit/>
-          </a:bodyPr>
-          <a:lstStyle/>
-          <a:p>
-            <a:pPr algn="ctr"/>
-            <a:r>
-              <a:rPr lang="en-US" sz="3200" dirty="0" smtClean="0"/>
-              <a:t>View</a:t>
-            </a:r>
-            <a:endParaRPr lang="en-US" sz="3200" dirty="0"/>
-          </a:p>
-        </p:txBody>
-      </p:sp>
-      <p:sp>
-        <p:nvSpPr>
-          <p:cNvPr id="7" name="Rectangle 6"/>
-          <p:cNvSpPr/>
-          <p:nvPr/>
-        </p:nvSpPr>
-        <p:spPr>
-          <a:xfrm>
-            <a:off x="6755607" y="2934560"/>
-            <a:ext cx="1730320" cy="396667"/>
-          </a:xfrm>
-          <a:prstGeom prst="rect">
-            <a:avLst/>
-          </a:prstGeom>
-          <a:solidFill>
-            <a:schemeClr val="accent6"/>
-          </a:solidFill>
-          <a:ln w="28575" cmpd="sng">
-            <a:solidFill>
-              <a:schemeClr val="accent1"/>
-            </a:solidFill>
-          </a:ln>
-          <a:effectLst/>
-        </p:spPr>
-        <p:style>
-          <a:lnRef idx="1">
-            <a:schemeClr val="accent1"/>
-          </a:lnRef>
-          <a:fillRef idx="3">
-            <a:schemeClr val="accent1"/>
-          </a:fillRef>
-          <a:effectRef idx="2">
-            <a:schemeClr val="accent1"/>
-          </a:effectRef>
-          <a:fontRef idx="minor">
-            <a:schemeClr val="lt1"/>
-          </a:fontRef>
-        </p:style>
-        <p:txBody>
-          <a:bodyPr rtlCol="0" anchor="ctr"/>
-          <a:lstStyle/>
-          <a:p>
-            <a:pPr algn="ctr"/>
-            <a:r>
-              <a:rPr lang="en-US" dirty="0" smtClean="0">
-                <a:solidFill>
-                  <a:srgbClr val="F8F8F8"/>
-                </a:solidFill>
-              </a:rPr>
-              <a:t>send input</a:t>
-            </a:r>
-            <a:endParaRPr lang="en-US" dirty="0">
-              <a:solidFill>
-                <a:srgbClr val="F8F8F8"/>
-              </a:solidFill>
-            </a:endParaRPr>
           </a:p>
         </p:txBody>
       </p:sp>
     </p:spTree>
     <p:extLst>
       <p:ext uri="{BB962C8B-B14F-4D97-AF65-F5344CB8AC3E}">
-        <p14:creationId xmlns:p14="http://schemas.microsoft.com/office/powerpoint/2010/main" val="2744471277"/>
+        <p14:creationId xmlns:p14="http://schemas.microsoft.com/office/powerpoint/2010/main" val="200250533"/>
       </p:ext>
     </p:extLst>
   </p:cSld>
@@ -8076,11 +7744,7 @@
           <a:p>
             <a:r>
               <a:rPr lang="en-US" dirty="0" smtClean="0"/>
-              <a:t>TODO's: </a:t>
-            </a:r>
-            <a:r>
-              <a:rPr lang="en-US" dirty="0" smtClean="0"/>
-              <a:t>List</a:t>
+              <a:t>TODO's: List</a:t>
             </a:r>
             <a:endParaRPr lang="en-US" dirty="0"/>
           </a:p>
@@ -8372,103 +8036,6 @@
           </a:p>
         </p:txBody>
       </p:sp>
-      <p:sp>
-        <p:nvSpPr>
-          <p:cNvPr id="15" name="Rectangle 14"/>
-          <p:cNvSpPr/>
-          <p:nvPr/>
-        </p:nvSpPr>
-        <p:spPr>
-          <a:xfrm>
-            <a:off x="3699937" y="2934560"/>
-            <a:ext cx="1730320" cy="396667"/>
-          </a:xfrm>
-          <a:prstGeom prst="rect">
-            <a:avLst/>
-          </a:prstGeom>
-          <a:solidFill>
-            <a:schemeClr val="accent4"/>
-          </a:solidFill>
-          <a:ln w="28575" cmpd="sng">
-            <a:solidFill>
-              <a:schemeClr val="accent1"/>
-            </a:solidFill>
-          </a:ln>
-          <a:effectLst/>
-        </p:spPr>
-        <p:style>
-          <a:lnRef idx="1">
-            <a:schemeClr val="accent1"/>
-          </a:lnRef>
-          <a:fillRef idx="3">
-            <a:schemeClr val="accent1"/>
-          </a:fillRef>
-          <a:effectRef idx="2">
-            <a:schemeClr val="accent1"/>
-          </a:effectRef>
-          <a:fontRef idx="minor">
-            <a:schemeClr val="lt1"/>
-          </a:fontRef>
-        </p:style>
-        <p:txBody>
-          <a:bodyPr rtlCol="0" anchor="ctr"/>
-          <a:lstStyle/>
-          <a:p>
-            <a:pPr algn="ctr"/>
-            <a:r>
-              <a:rPr lang="en-US" dirty="0" smtClean="0">
-                <a:solidFill>
-                  <a:srgbClr val="F8F8F8"/>
-                </a:solidFill>
-              </a:rPr>
-              <a:t>interpret input</a:t>
-            </a:r>
-            <a:endParaRPr lang="en-US" dirty="0">
-              <a:solidFill>
-                <a:srgbClr val="F8F8F8"/>
-              </a:solidFill>
-            </a:endParaRPr>
-          </a:p>
-        </p:txBody>
-      </p:sp>
-      <p:cxnSp>
-        <p:nvCxnSpPr>
-          <p:cNvPr id="16" name="Straight Arrow Connector 15"/>
-          <p:cNvCxnSpPr/>
-          <p:nvPr/>
-        </p:nvCxnSpPr>
-        <p:spPr>
-          <a:xfrm flipH="1">
-            <a:off x="5537200" y="3132894"/>
-            <a:ext cx="1218407" cy="0"/>
-          </a:xfrm>
-          <a:prstGeom prst="straightConnector1">
-            <a:avLst/>
-          </a:prstGeom>
-          <a:ln w="57150" cmpd="sng">
-            <a:solidFill>
-              <a:schemeClr val="accent2"/>
-            </a:solidFill>
-            <a:headEnd type="none"/>
-            <a:tailEnd type="triangle"/>
-          </a:ln>
-          <a:effectLst/>
-        </p:spPr>
-        <p:style>
-          <a:lnRef idx="2">
-            <a:schemeClr val="accent1"/>
-          </a:lnRef>
-          <a:fillRef idx="0">
-            <a:schemeClr val="accent1"/>
-          </a:fillRef>
-          <a:effectRef idx="1">
-            <a:schemeClr val="accent1"/>
-          </a:effectRef>
-          <a:fontRef idx="minor">
-            <a:schemeClr val="tx1"/>
-          </a:fontRef>
-        </p:style>
-      </p:cxnSp>
       <p:sp>
         <p:nvSpPr>
           <p:cNvPr id="7" name="Rectangle 6"/>
@@ -8531,7 +8098,7 @@
     </p:spTree>
     <p:extLst>
       <p:ext uri="{BB962C8B-B14F-4D97-AF65-F5344CB8AC3E}">
-        <p14:creationId xmlns:p14="http://schemas.microsoft.com/office/powerpoint/2010/main" val="2992209754"/>
+        <p14:creationId xmlns:p14="http://schemas.microsoft.com/office/powerpoint/2010/main" val="2744471277"/>
       </p:ext>
     </p:extLst>
   </p:cSld>
@@ -8582,11 +8149,7 @@
           <a:p>
             <a:r>
               <a:rPr lang="en-US" dirty="0" smtClean="0"/>
-              <a:t>TODO's: </a:t>
-            </a:r>
-            <a:r>
-              <a:rPr lang="en-US" dirty="0" smtClean="0"/>
-              <a:t>List</a:t>
+              <a:t>TODO's: List</a:t>
             </a:r>
             <a:endParaRPr lang="en-US" dirty="0"/>
           </a:p>
@@ -8878,12 +8441,69 @@
           </a:p>
         </p:txBody>
       </p:sp>
+      <p:sp>
+        <p:nvSpPr>
+          <p:cNvPr id="15" name="Rectangle 14"/>
+          <p:cNvSpPr/>
+          <p:nvPr/>
+        </p:nvSpPr>
+        <p:spPr>
+          <a:xfrm>
+            <a:off x="3699937" y="2934560"/>
+            <a:ext cx="1730320" cy="396667"/>
+          </a:xfrm>
+          <a:prstGeom prst="rect">
+            <a:avLst/>
+          </a:prstGeom>
+          <a:solidFill>
+            <a:schemeClr val="accent4"/>
+          </a:solidFill>
+          <a:ln w="28575" cmpd="sng">
+            <a:solidFill>
+              <a:schemeClr val="accent1"/>
+            </a:solidFill>
+          </a:ln>
+          <a:effectLst/>
+        </p:spPr>
+        <p:style>
+          <a:lnRef idx="1">
+            <a:schemeClr val="accent1"/>
+          </a:lnRef>
+          <a:fillRef idx="3">
+            <a:schemeClr val="accent1"/>
+          </a:fillRef>
+          <a:effectRef idx="2">
+            <a:schemeClr val="accent1"/>
+          </a:effectRef>
+          <a:fontRef idx="minor">
+            <a:schemeClr val="lt1"/>
+          </a:fontRef>
+        </p:style>
+        <p:txBody>
+          <a:bodyPr rtlCol="0" anchor="ctr"/>
+          <a:lstStyle/>
+          <a:p>
+            <a:pPr algn="ctr"/>
+            <a:r>
+              <a:rPr lang="en-US" dirty="0" smtClean="0">
+                <a:solidFill>
+                  <a:srgbClr val="F8F8F8"/>
+                </a:solidFill>
+              </a:rPr>
+              <a:t>interpret input</a:t>
+            </a:r>
+            <a:endParaRPr lang="en-US" dirty="0">
+              <a:solidFill>
+                <a:srgbClr val="F8F8F8"/>
+              </a:solidFill>
+            </a:endParaRPr>
+          </a:p>
+        </p:txBody>
+      </p:sp>
       <p:cxnSp>
         <p:nvCxnSpPr>
-          <p:cNvPr id="12" name="Straight Arrow Connector 11"/>
-          <p:cNvCxnSpPr>
-            <a:stCxn id="7" idx="1"/>
-          </p:cNvCxnSpPr>
+          <p:cNvPr id="16" name="Straight Arrow Connector 15"/>
+          <p:cNvCxnSpPr/>
           <p:nvPr/>
         </p:nvCxnSpPr>
         <p:spPr>
@@ -8977,168 +8597,10 @@
           </a:p>
         </p:txBody>
       </p:sp>
-      <p:sp>
-        <p:nvSpPr>
-          <p:cNvPr id="14" name="Rectangle 13"/>
-          <p:cNvSpPr/>
-          <p:nvPr/>
-        </p:nvSpPr>
-        <p:spPr>
-          <a:xfrm>
-            <a:off x="3699937" y="4014227"/>
-            <a:ext cx="1730320" cy="396667"/>
-          </a:xfrm>
-          <a:prstGeom prst="rect">
-            <a:avLst/>
-          </a:prstGeom>
-          <a:solidFill>
-            <a:schemeClr val="accent4"/>
-          </a:solidFill>
-          <a:ln w="28575" cmpd="sng">
-            <a:solidFill>
-              <a:schemeClr val="accent1"/>
-            </a:solidFill>
-          </a:ln>
-          <a:effectLst/>
-        </p:spPr>
-        <p:style>
-          <a:lnRef idx="1">
-            <a:schemeClr val="accent1"/>
-          </a:lnRef>
-          <a:fillRef idx="3">
-            <a:schemeClr val="accent1"/>
-          </a:fillRef>
-          <a:effectRef idx="2">
-            <a:schemeClr val="accent1"/>
-          </a:effectRef>
-          <a:fontRef idx="minor">
-            <a:schemeClr val="lt1"/>
-          </a:fontRef>
-        </p:style>
-        <p:txBody>
-          <a:bodyPr rtlCol="0" anchor="ctr"/>
-          <a:lstStyle/>
-          <a:p>
-            <a:pPr algn="ctr"/>
-            <a:r>
-              <a:rPr lang="en-US" dirty="0" smtClean="0">
-                <a:solidFill>
-                  <a:srgbClr val="F8F8F8"/>
-                </a:solidFill>
-              </a:rPr>
-              <a:t>request data</a:t>
-            </a:r>
-            <a:endParaRPr lang="en-US" dirty="0">
-              <a:solidFill>
-                <a:srgbClr val="F8F8F8"/>
-              </a:solidFill>
-            </a:endParaRPr>
-          </a:p>
-        </p:txBody>
-      </p:sp>
-      <p:cxnSp>
-        <p:nvCxnSpPr>
-          <p:cNvPr id="15" name="Straight Arrow Connector 14"/>
-          <p:cNvCxnSpPr>
-            <a:stCxn id="13" idx="2"/>
-          </p:cNvCxnSpPr>
-          <p:nvPr/>
-        </p:nvCxnSpPr>
-        <p:spPr>
-          <a:xfrm>
-            <a:off x="4565097" y="3331227"/>
-            <a:ext cx="0" cy="614240"/>
-          </a:xfrm>
-          <a:prstGeom prst="straightConnector1">
-            <a:avLst/>
-          </a:prstGeom>
-          <a:ln w="57150" cmpd="sng">
-            <a:solidFill>
-              <a:schemeClr val="accent2"/>
-            </a:solidFill>
-            <a:headEnd type="none"/>
-            <a:tailEnd type="triangle"/>
-          </a:ln>
-          <a:effectLst/>
-        </p:spPr>
-        <p:style>
-          <a:lnRef idx="2">
-            <a:schemeClr val="accent1"/>
-          </a:lnRef>
-          <a:fillRef idx="0">
-            <a:schemeClr val="accent1"/>
-          </a:fillRef>
-          <a:effectRef idx="1">
-            <a:schemeClr val="accent1"/>
-          </a:effectRef>
-          <a:fontRef idx="minor">
-            <a:schemeClr val="tx1"/>
-          </a:fontRef>
-        </p:style>
-      </p:cxnSp>
-      <p:sp>
-        <p:nvSpPr>
-          <p:cNvPr id="13" name="Rectangle 12"/>
-          <p:cNvSpPr/>
-          <p:nvPr/>
-        </p:nvSpPr>
-        <p:spPr>
-          <a:xfrm>
-            <a:off x="3699937" y="2934560"/>
-            <a:ext cx="1730320" cy="396667"/>
-          </a:xfrm>
-          <a:prstGeom prst="rect">
-            <a:avLst/>
-          </a:prstGeom>
-          <a:solidFill>
-            <a:schemeClr val="accent4"/>
-          </a:solidFill>
-          <a:ln w="28575" cmpd="sng">
-            <a:solidFill>
-              <a:schemeClr val="accent1"/>
-            </a:solidFill>
-          </a:ln>
-          <a:effectLst/>
-        </p:spPr>
-        <p:style>
-          <a:lnRef idx="1">
-            <a:schemeClr val="accent1"/>
-          </a:lnRef>
-          <a:fillRef idx="3">
-            <a:schemeClr val="accent1"/>
-          </a:fillRef>
-          <a:effectRef idx="2">
-            <a:schemeClr val="accent1"/>
-          </a:effectRef>
-          <a:fontRef idx="minor">
-            <a:schemeClr val="lt1"/>
-          </a:fontRef>
-        </p:style>
-        <p:txBody>
-          <a:bodyPr rtlCol="0" anchor="ctr"/>
-          <a:lstStyle/>
-          <a:p>
-            <a:pPr algn="ctr"/>
-            <a:r>
-              <a:rPr lang="en-US" dirty="0" smtClean="0">
-                <a:solidFill>
-                  <a:srgbClr val="F8F8F8"/>
-                </a:solidFill>
-              </a:rPr>
-              <a:t>interpret input</a:t>
-            </a:r>
-            <a:endParaRPr lang="en-US" dirty="0">
-              <a:solidFill>
-                <a:srgbClr val="F8F8F8"/>
-              </a:solidFill>
-            </a:endParaRPr>
-          </a:p>
-        </p:txBody>
-      </p:sp>
     </p:spTree>
     <p:extLst>
       <p:ext uri="{BB962C8B-B14F-4D97-AF65-F5344CB8AC3E}">
-        <p14:creationId xmlns:p14="http://schemas.microsoft.com/office/powerpoint/2010/main" val="2922615046"/>
+        <p14:creationId xmlns:p14="http://schemas.microsoft.com/office/powerpoint/2010/main" val="2992209754"/>
       </p:ext>
     </p:extLst>
   </p:cSld>
@@ -9189,11 +8651,7 @@
           <a:p>
             <a:r>
               <a:rPr lang="en-US" dirty="0" smtClean="0"/>
-              <a:t>TODO's: </a:t>
-            </a:r>
-            <a:r>
-              <a:rPr lang="en-US" dirty="0" smtClean="0"/>
-              <a:t>List</a:t>
+              <a:t>TODO's: List</a:t>
             </a:r>
             <a:endParaRPr lang="en-US" dirty="0"/>
           </a:p>
@@ -9584,55 +9042,15 @@
           </a:p>
         </p:txBody>
       </p:sp>
-      <p:cxnSp>
-        <p:nvCxnSpPr>
-          <p:cNvPr id="15" name="Straight Arrow Connector 14"/>
-          <p:cNvCxnSpPr>
-            <a:stCxn id="13" idx="2"/>
-          </p:cNvCxnSpPr>
-          <p:nvPr/>
-        </p:nvCxnSpPr>
-        <p:spPr>
-          <a:xfrm>
-            <a:off x="4565097" y="3331227"/>
-            <a:ext cx="0" cy="614240"/>
-          </a:xfrm>
-          <a:prstGeom prst="straightConnector1">
-            <a:avLst/>
-          </a:prstGeom>
-          <a:ln w="57150" cmpd="sng">
-            <a:solidFill>
-              <a:schemeClr val="accent2"/>
-            </a:solidFill>
-            <a:headEnd type="none"/>
-            <a:tailEnd type="triangle"/>
-          </a:ln>
-          <a:effectLst/>
-        </p:spPr>
-        <p:style>
-          <a:lnRef idx="2">
-            <a:schemeClr val="accent1"/>
-          </a:lnRef>
-          <a:fillRef idx="0">
-            <a:schemeClr val="accent1"/>
-          </a:fillRef>
-          <a:effectRef idx="1">
-            <a:schemeClr val="accent1"/>
-          </a:effectRef>
-          <a:fontRef idx="minor">
-            <a:schemeClr val="tx1"/>
-          </a:fontRef>
-        </p:style>
-      </p:cxnSp>
-      <p:sp>
-        <p:nvSpPr>
-          <p:cNvPr id="13" name="Rectangle 12"/>
+      <p:sp>
+        <p:nvSpPr>
+          <p:cNvPr id="14" name="Rectangle 13"/>
           <p:cNvSpPr/>
           <p:nvPr/>
         </p:nvSpPr>
         <p:spPr>
           <a:xfrm>
-            <a:off x="3699937" y="2934560"/>
+            <a:off x="3699937" y="4014227"/>
             <a:ext cx="1730320" cy="396667"/>
           </a:xfrm>
           <a:prstGeom prst="rect">
@@ -9673,7 +9091,7 @@
                   <a:srgbClr val="F8F8F8"/>
                 </a:solidFill>
               </a:rPr>
-              <a:t>interpret input</a:t>
+              <a:t>request data</a:t>
             </a:r>
             <a:endParaRPr lang="en-US" dirty="0">
               <a:solidFill>
@@ -9683,75 +9101,18 @@
           </a:p>
         </p:txBody>
       </p:sp>
-      <p:sp>
-        <p:nvSpPr>
-          <p:cNvPr id="16" name="Rectangle 15"/>
-          <p:cNvSpPr/>
-          <p:nvPr/>
-        </p:nvSpPr>
-        <p:spPr>
-          <a:xfrm>
-            <a:off x="702737" y="4014227"/>
-            <a:ext cx="1730320" cy="396667"/>
-          </a:xfrm>
-          <a:prstGeom prst="rect">
-            <a:avLst/>
-          </a:prstGeom>
-          <a:solidFill>
-            <a:schemeClr val="accent5"/>
-          </a:solidFill>
-          <a:ln w="28575" cmpd="sng">
-            <a:solidFill>
-              <a:schemeClr val="accent1"/>
-            </a:solidFill>
-          </a:ln>
-          <a:effectLst/>
-        </p:spPr>
-        <p:style>
-          <a:lnRef idx="1">
-            <a:schemeClr val="accent1"/>
-          </a:lnRef>
-          <a:fillRef idx="3">
-            <a:schemeClr val="accent1"/>
-          </a:fillRef>
-          <a:effectRef idx="2">
-            <a:schemeClr val="accent1"/>
-          </a:effectRef>
-          <a:fontRef idx="minor">
-            <a:schemeClr val="lt1"/>
-          </a:fontRef>
-        </p:style>
-        <p:txBody>
-          <a:bodyPr rtlCol="0" anchor="ctr"/>
-          <a:lstStyle/>
-          <a:p>
-            <a:pPr algn="ctr"/>
-            <a:r>
-              <a:rPr lang="en-US" dirty="0" smtClean="0">
-                <a:solidFill>
-                  <a:srgbClr val="F8F8F8"/>
-                </a:solidFill>
-              </a:rPr>
-              <a:t>gather data</a:t>
-            </a:r>
-            <a:endParaRPr lang="en-US" dirty="0">
-              <a:solidFill>
-                <a:srgbClr val="F8F8F8"/>
-              </a:solidFill>
-            </a:endParaRPr>
-          </a:p>
-        </p:txBody>
-      </p:sp>
       <p:cxnSp>
         <p:nvCxnSpPr>
-          <p:cNvPr id="17" name="Straight Arrow Connector 16"/>
-          <p:cNvCxnSpPr/>
+          <p:cNvPr id="15" name="Straight Arrow Connector 14"/>
+          <p:cNvCxnSpPr>
+            <a:stCxn id="13" idx="2"/>
+          </p:cNvCxnSpPr>
           <p:nvPr/>
         </p:nvCxnSpPr>
         <p:spPr>
-          <a:xfrm flipH="1">
-            <a:off x="2557730" y="4237794"/>
-            <a:ext cx="1218407" cy="0"/>
+          <a:xfrm>
+            <a:off x="4565097" y="3331227"/>
+            <a:ext cx="0" cy="614240"/>
           </a:xfrm>
           <a:prstGeom prst="straightConnector1">
             <a:avLst/>
@@ -9782,13 +9143,13 @@
       </p:cxnSp>
       <p:sp>
         <p:nvSpPr>
-          <p:cNvPr id="14" name="Rectangle 13"/>
+          <p:cNvPr id="13" name="Rectangle 12"/>
           <p:cNvSpPr/>
           <p:nvPr/>
         </p:nvSpPr>
         <p:spPr>
           <a:xfrm>
-            <a:off x="3699937" y="4014227"/>
+            <a:off x="3699937" y="2934560"/>
             <a:ext cx="1730320" cy="396667"/>
           </a:xfrm>
           <a:prstGeom prst="rect">
@@ -9829,7 +9190,7 @@
                   <a:srgbClr val="F8F8F8"/>
                 </a:solidFill>
               </a:rPr>
-              <a:t>request data</a:t>
+              <a:t>interpret input</a:t>
             </a:r>
             <a:endParaRPr lang="en-US" dirty="0">
               <a:solidFill>
@@ -9842,7 +9203,7 @@
     </p:spTree>
     <p:extLst>
       <p:ext uri="{BB962C8B-B14F-4D97-AF65-F5344CB8AC3E}">
-        <p14:creationId xmlns:p14="http://schemas.microsoft.com/office/powerpoint/2010/main" val="200400826"/>
+        <p14:creationId xmlns:p14="http://schemas.microsoft.com/office/powerpoint/2010/main" val="2922615046"/>
       </p:ext>
     </p:extLst>
   </p:cSld>
@@ -9893,11 +9254,7 @@
           <a:p>
             <a:r>
               <a:rPr lang="en-US" dirty="0" smtClean="0"/>
-              <a:t>TODO's: </a:t>
-            </a:r>
-            <a:r>
-              <a:rPr lang="en-US" dirty="0" smtClean="0"/>
-              <a:t>List</a:t>
+              <a:t>TODO's: List</a:t>
             </a:r>
             <a:endParaRPr lang="en-US" dirty="0"/>
           </a:p>
@@ -10387,6 +9744,65 @@
           </a:p>
         </p:txBody>
       </p:sp>
+      <p:sp>
+        <p:nvSpPr>
+          <p:cNvPr id="16" name="Rectangle 15"/>
+          <p:cNvSpPr/>
+          <p:nvPr/>
+        </p:nvSpPr>
+        <p:spPr>
+          <a:xfrm>
+            <a:off x="702737" y="4014227"/>
+            <a:ext cx="1730320" cy="396667"/>
+          </a:xfrm>
+          <a:prstGeom prst="rect">
+            <a:avLst/>
+          </a:prstGeom>
+          <a:solidFill>
+            <a:schemeClr val="accent5"/>
+          </a:solidFill>
+          <a:ln w="28575" cmpd="sng">
+            <a:solidFill>
+              <a:schemeClr val="accent1"/>
+            </a:solidFill>
+          </a:ln>
+          <a:effectLst/>
+        </p:spPr>
+        <p:style>
+          <a:lnRef idx="1">
+            <a:schemeClr val="accent1"/>
+          </a:lnRef>
+          <a:fillRef idx="3">
+            <a:schemeClr val="accent1"/>
+          </a:fillRef>
+          <a:effectRef idx="2">
+            <a:schemeClr val="accent1"/>
+          </a:effectRef>
+          <a:fontRef idx="minor">
+            <a:schemeClr val="lt1"/>
+          </a:fontRef>
+        </p:style>
+        <p:txBody>
+          <a:bodyPr rtlCol="0" anchor="ctr"/>
+          <a:lstStyle/>
+          <a:p>
+            <a:pPr algn="ctr"/>
+            <a:r>
+              <a:rPr lang="en-US" dirty="0" smtClean="0">
+                <a:solidFill>
+                  <a:srgbClr val="F8F8F8"/>
+                </a:solidFill>
+              </a:rPr>
+              <a:t>gather data</a:t>
+            </a:r>
+            <a:endParaRPr lang="en-US" dirty="0">
+              <a:solidFill>
+                <a:srgbClr val="F8F8F8"/>
+              </a:solidFill>
+            </a:endParaRPr>
+          </a:p>
+        </p:txBody>
+      </p:sp>
       <p:cxnSp>
         <p:nvCxnSpPr>
           <p:cNvPr id="17" name="Straight Arrow Connector 16"/>
@@ -10484,166 +9900,10 @@
           </a:p>
         </p:txBody>
       </p:sp>
-      <p:sp>
-        <p:nvSpPr>
-          <p:cNvPr id="18" name="Rectangle 17"/>
-          <p:cNvSpPr/>
-          <p:nvPr/>
-        </p:nvSpPr>
-        <p:spPr>
-          <a:xfrm>
-            <a:off x="702737" y="5093893"/>
-            <a:ext cx="1730320" cy="396667"/>
-          </a:xfrm>
-          <a:prstGeom prst="rect">
-            <a:avLst/>
-          </a:prstGeom>
-          <a:solidFill>
-            <a:schemeClr val="accent5"/>
-          </a:solidFill>
-          <a:ln w="28575" cmpd="sng">
-            <a:solidFill>
-              <a:schemeClr val="accent1"/>
-            </a:solidFill>
-          </a:ln>
-          <a:effectLst/>
-        </p:spPr>
-        <p:style>
-          <a:lnRef idx="1">
-            <a:schemeClr val="accent1"/>
-          </a:lnRef>
-          <a:fillRef idx="3">
-            <a:schemeClr val="accent1"/>
-          </a:fillRef>
-          <a:effectRef idx="2">
-            <a:schemeClr val="accent1"/>
-          </a:effectRef>
-          <a:fontRef idx="minor">
-            <a:schemeClr val="lt1"/>
-          </a:fontRef>
-        </p:style>
-        <p:txBody>
-          <a:bodyPr rtlCol="0" anchor="ctr"/>
-          <a:lstStyle/>
-          <a:p>
-            <a:pPr algn="ctr"/>
-            <a:r>
-              <a:rPr lang="en-US" dirty="0" smtClean="0">
-                <a:solidFill>
-                  <a:srgbClr val="F8F8F8"/>
-                </a:solidFill>
-              </a:rPr>
-              <a:t>return data</a:t>
-            </a:r>
-            <a:endParaRPr lang="en-US" dirty="0">
-              <a:solidFill>
-                <a:srgbClr val="F8F8F8"/>
-              </a:solidFill>
-            </a:endParaRPr>
-          </a:p>
-        </p:txBody>
-      </p:sp>
-      <p:cxnSp>
-        <p:nvCxnSpPr>
-          <p:cNvPr id="19" name="Straight Arrow Connector 18"/>
-          <p:cNvCxnSpPr/>
-          <p:nvPr/>
-        </p:nvCxnSpPr>
-        <p:spPr>
-          <a:xfrm>
-            <a:off x="1567897" y="4410894"/>
-            <a:ext cx="0" cy="614240"/>
-          </a:xfrm>
-          <a:prstGeom prst="straightConnector1">
-            <a:avLst/>
-          </a:prstGeom>
-          <a:ln w="57150" cmpd="sng">
-            <a:solidFill>
-              <a:schemeClr val="accent2"/>
-            </a:solidFill>
-            <a:headEnd type="none"/>
-            <a:tailEnd type="triangle"/>
-          </a:ln>
-          <a:effectLst/>
-        </p:spPr>
-        <p:style>
-          <a:lnRef idx="2">
-            <a:schemeClr val="accent1"/>
-          </a:lnRef>
-          <a:fillRef idx="0">
-            <a:schemeClr val="accent1"/>
-          </a:fillRef>
-          <a:effectRef idx="1">
-            <a:schemeClr val="accent1"/>
-          </a:effectRef>
-          <a:fontRef idx="minor">
-            <a:schemeClr val="tx1"/>
-          </a:fontRef>
-        </p:style>
-      </p:cxnSp>
-      <p:sp>
-        <p:nvSpPr>
-          <p:cNvPr id="16" name="Rectangle 15"/>
-          <p:cNvSpPr/>
-          <p:nvPr/>
-        </p:nvSpPr>
-        <p:spPr>
-          <a:xfrm>
-            <a:off x="702737" y="4014227"/>
-            <a:ext cx="1730320" cy="396667"/>
-          </a:xfrm>
-          <a:prstGeom prst="rect">
-            <a:avLst/>
-          </a:prstGeom>
-          <a:solidFill>
-            <a:schemeClr val="accent5"/>
-          </a:solidFill>
-          <a:ln w="28575" cmpd="sng">
-            <a:solidFill>
-              <a:schemeClr val="accent1"/>
-            </a:solidFill>
-          </a:ln>
-          <a:effectLst/>
-        </p:spPr>
-        <p:style>
-          <a:lnRef idx="1">
-            <a:schemeClr val="accent1"/>
-          </a:lnRef>
-          <a:fillRef idx="3">
-            <a:schemeClr val="accent1"/>
-          </a:fillRef>
-          <a:effectRef idx="2">
-            <a:schemeClr val="accent1"/>
-          </a:effectRef>
-          <a:fontRef idx="minor">
-            <a:schemeClr val="lt1"/>
-          </a:fontRef>
-        </p:style>
-        <p:txBody>
-          <a:bodyPr rtlCol="0" anchor="ctr"/>
-          <a:lstStyle/>
-          <a:p>
-            <a:pPr algn="ctr"/>
-            <a:r>
-              <a:rPr lang="en-US" dirty="0" smtClean="0">
-                <a:solidFill>
-                  <a:srgbClr val="F8F8F8"/>
-                </a:solidFill>
-              </a:rPr>
-              <a:t>gather data</a:t>
-            </a:r>
-            <a:endParaRPr lang="en-US" dirty="0">
-              <a:solidFill>
-                <a:srgbClr val="F8F8F8"/>
-              </a:solidFill>
-            </a:endParaRPr>
-          </a:p>
-        </p:txBody>
-      </p:sp>
     </p:spTree>
     <p:extLst>
       <p:ext uri="{BB962C8B-B14F-4D97-AF65-F5344CB8AC3E}">
-        <p14:creationId xmlns:p14="http://schemas.microsoft.com/office/powerpoint/2010/main" val="96029311"/>
+        <p14:creationId xmlns:p14="http://schemas.microsoft.com/office/powerpoint/2010/main" val="200400826"/>
       </p:ext>
     </p:extLst>
   </p:cSld>
@@ -10694,11 +9954,7 @@
           <a:p>
             <a:r>
               <a:rPr lang="en-US" dirty="0" smtClean="0"/>
-              <a:t>TODO's: </a:t>
-            </a:r>
-            <a:r>
-              <a:rPr lang="en-US" dirty="0" smtClean="0"/>
-              <a:t>List</a:t>
+              <a:t>TODO's: List</a:t>
             </a:r>
             <a:endParaRPr lang="en-US" dirty="0"/>
           </a:p>
@@ -11196,7 +10452,7 @@
         </p:nvCxnSpPr>
         <p:spPr>
           <a:xfrm flipH="1">
-            <a:off x="2545030" y="4237794"/>
+            <a:off x="2557730" y="4237794"/>
             <a:ext cx="1218407" cy="0"/>
           </a:xfrm>
           <a:prstGeom prst="straightConnector1">
@@ -11285,53 +10541,15 @@
           </a:p>
         </p:txBody>
       </p:sp>
-      <p:cxnSp>
-        <p:nvCxnSpPr>
-          <p:cNvPr id="19" name="Straight Arrow Connector 18"/>
-          <p:cNvCxnSpPr/>
-          <p:nvPr/>
-        </p:nvCxnSpPr>
-        <p:spPr>
-          <a:xfrm>
-            <a:off x="1567897" y="4410894"/>
-            <a:ext cx="0" cy="614240"/>
-          </a:xfrm>
-          <a:prstGeom prst="straightConnector1">
-            <a:avLst/>
-          </a:prstGeom>
-          <a:ln w="57150" cmpd="sng">
-            <a:solidFill>
-              <a:schemeClr val="accent2"/>
-            </a:solidFill>
-            <a:headEnd type="none"/>
-            <a:tailEnd type="triangle"/>
-          </a:ln>
-          <a:effectLst/>
-        </p:spPr>
-        <p:style>
-          <a:lnRef idx="2">
-            <a:schemeClr val="accent1"/>
-          </a:lnRef>
-          <a:fillRef idx="0">
-            <a:schemeClr val="accent1"/>
-          </a:fillRef>
-          <a:effectRef idx="1">
-            <a:schemeClr val="accent1"/>
-          </a:effectRef>
-          <a:fontRef idx="minor">
-            <a:schemeClr val="tx1"/>
-          </a:fontRef>
-        </p:style>
-      </p:cxnSp>
-      <p:sp>
-        <p:nvSpPr>
-          <p:cNvPr id="16" name="Rectangle 15"/>
+      <p:sp>
+        <p:nvSpPr>
+          <p:cNvPr id="18" name="Rectangle 17"/>
           <p:cNvSpPr/>
           <p:nvPr/>
         </p:nvSpPr>
         <p:spPr>
           <a:xfrm>
-            <a:off x="702737" y="4014227"/>
+            <a:off x="702737" y="5093893"/>
             <a:ext cx="1730320" cy="396667"/>
           </a:xfrm>
           <a:prstGeom prst="rect">
@@ -11372,7 +10590,7 @@
                   <a:srgbClr val="F8F8F8"/>
                 </a:solidFill>
               </a:rPr>
-              <a:t>gather data</a:t>
+              <a:t>return data</a:t>
             </a:r>
             <a:endParaRPr lang="en-US" dirty="0">
               <a:solidFill>
@@ -11382,75 +10600,16 @@
           </a:p>
         </p:txBody>
       </p:sp>
-      <p:sp>
-        <p:nvSpPr>
-          <p:cNvPr id="20" name="Rectangle 19"/>
-          <p:cNvSpPr/>
-          <p:nvPr/>
-        </p:nvSpPr>
-        <p:spPr>
-          <a:xfrm>
-            <a:off x="3699937" y="5093893"/>
-            <a:ext cx="1730320" cy="396667"/>
-          </a:xfrm>
-          <a:prstGeom prst="rect">
-            <a:avLst/>
-          </a:prstGeom>
-          <a:solidFill>
-            <a:schemeClr val="accent4"/>
-          </a:solidFill>
-          <a:ln w="28575" cmpd="sng">
-            <a:solidFill>
-              <a:schemeClr val="accent1"/>
-            </a:solidFill>
-          </a:ln>
-          <a:effectLst/>
-        </p:spPr>
-        <p:style>
-          <a:lnRef idx="1">
-            <a:schemeClr val="accent1"/>
-          </a:lnRef>
-          <a:fillRef idx="3">
-            <a:schemeClr val="accent1"/>
-          </a:fillRef>
-          <a:effectRef idx="2">
-            <a:schemeClr val="accent1"/>
-          </a:effectRef>
-          <a:fontRef idx="minor">
-            <a:schemeClr val="lt1"/>
-          </a:fontRef>
-        </p:style>
-        <p:txBody>
-          <a:bodyPr rtlCol="0" anchor="ctr"/>
-          <a:lstStyle/>
-          <a:p>
-            <a:pPr algn="ctr"/>
-            <a:r>
-              <a:rPr lang="en-US" dirty="0" smtClean="0">
-                <a:solidFill>
-                  <a:srgbClr val="F8F8F8"/>
-                </a:solidFill>
-              </a:rPr>
-              <a:t>forward data</a:t>
-            </a:r>
-            <a:endParaRPr lang="en-US" dirty="0">
-              <a:solidFill>
-                <a:srgbClr val="F8F8F8"/>
-              </a:solidFill>
-            </a:endParaRPr>
-          </a:p>
-        </p:txBody>
-      </p:sp>
       <p:cxnSp>
         <p:nvCxnSpPr>
-          <p:cNvPr id="21" name="Straight Arrow Connector 20"/>
+          <p:cNvPr id="19" name="Straight Arrow Connector 18"/>
           <p:cNvCxnSpPr/>
           <p:nvPr/>
         </p:nvCxnSpPr>
         <p:spPr>
           <a:xfrm>
-            <a:off x="2382257" y="5300588"/>
-            <a:ext cx="1218407" cy="0"/>
+            <a:off x="1567897" y="4410894"/>
+            <a:ext cx="0" cy="614240"/>
           </a:xfrm>
           <a:prstGeom prst="straightConnector1">
             <a:avLst/>
@@ -11481,13 +10640,13 @@
       </p:cxnSp>
       <p:sp>
         <p:nvSpPr>
-          <p:cNvPr id="18" name="Rectangle 17"/>
+          <p:cNvPr id="16" name="Rectangle 15"/>
           <p:cNvSpPr/>
           <p:nvPr/>
         </p:nvSpPr>
         <p:spPr>
           <a:xfrm>
-            <a:off x="702737" y="5093893"/>
+            <a:off x="702737" y="4014227"/>
             <a:ext cx="1730320" cy="396667"/>
           </a:xfrm>
           <a:prstGeom prst="rect">
@@ -11528,7 +10687,7 @@
                   <a:srgbClr val="F8F8F8"/>
                 </a:solidFill>
               </a:rPr>
-              <a:t>return data</a:t>
+              <a:t>gather data</a:t>
             </a:r>
             <a:endParaRPr lang="en-US" dirty="0">
               <a:solidFill>
@@ -11541,7 +10700,7 @@
     </p:spTree>
     <p:extLst>
       <p:ext uri="{BB962C8B-B14F-4D97-AF65-F5344CB8AC3E}">
-        <p14:creationId xmlns:p14="http://schemas.microsoft.com/office/powerpoint/2010/main" val="3441382437"/>
+        <p14:creationId xmlns:p14="http://schemas.microsoft.com/office/powerpoint/2010/main" val="96029311"/>
       </p:ext>
     </p:extLst>
   </p:cSld>
@@ -11594,32 +10753,19 @@
           <a:p>
             <a:r>
               <a:rPr lang="en-US" sz="3400" dirty="0" smtClean="0"/>
-              <a:t>MVC is not much different than th</a:t>
-            </a:r>
+              <a:t>MVC is not much different than the code you are already writing. </a:t>
+            </a:r>
+          </a:p>
+          <a:p>
             <a:r>
               <a:rPr lang="en-US" sz="3400" dirty="0" smtClean="0"/>
-              <a:t>e code you are already writing. </a:t>
-            </a:r>
-            <a:endParaRPr lang="en-US" sz="3400" dirty="0" smtClean="0"/>
+              <a:t>These are all just classes!</a:t>
+            </a:r>
           </a:p>
           <a:p>
             <a:r>
               <a:rPr lang="en-US" sz="3400" dirty="0" smtClean="0"/>
-              <a:t>These </a:t>
-            </a:r>
-            <a:r>
-              <a:rPr lang="en-US" sz="3400" dirty="0" smtClean="0"/>
-              <a:t>are all just classes!</a:t>
-            </a:r>
-          </a:p>
-          <a:p>
-            <a:r>
-              <a:rPr lang="en-US" sz="3400" dirty="0" smtClean="0"/>
-              <a:t>They’re </a:t>
-            </a:r>
-            <a:r>
-              <a:rPr lang="en-US" sz="3400" dirty="0" smtClean="0"/>
-              <a:t>just organized in a different way</a:t>
+              <a:t>They’re just organized in a different way</a:t>
             </a:r>
           </a:p>
           <a:p>
@@ -11707,11 +10853,901 @@
           <a:p>
             <a:r>
               <a:rPr lang="en-US" dirty="0" smtClean="0"/>
-              <a:t>TODO's: </a:t>
-            </a:r>
+              <a:t>TODO's: List</a:t>
+            </a:r>
+            <a:endParaRPr lang="en-US" dirty="0"/>
+          </a:p>
+        </p:txBody>
+      </p:sp>
+      <p:sp>
+        <p:nvSpPr>
+          <p:cNvPr id="3" name="Footer Placeholder 2"/>
+          <p:cNvSpPr>
+            <a:spLocks noGrp="1"/>
+          </p:cNvSpPr>
+          <p:nvPr>
+            <p:ph type="ftr" sz="quarter" idx="3"/>
+          </p:nvPr>
+        </p:nvSpPr>
+        <p:spPr/>
+        <p:txBody>
+          <a:bodyPr/>
+          <a:lstStyle/>
+          <a:p>
+            <a:r>
+              <a:rPr lang="en-US" smtClean="0"/>
+              <a:t>Model – View – Controller: A Design Pattern</a:t>
+            </a:r>
+            <a:endParaRPr lang="en-US" dirty="0"/>
+          </a:p>
+        </p:txBody>
+      </p:sp>
+      <p:sp>
+        <p:nvSpPr>
+          <p:cNvPr id="4" name="Rectangle 3"/>
+          <p:cNvSpPr/>
+          <p:nvPr/>
+        </p:nvSpPr>
+        <p:spPr>
+          <a:xfrm>
+            <a:off x="512064" y="2723877"/>
+            <a:ext cx="2150017" cy="3058909"/>
+          </a:xfrm>
+          <a:prstGeom prst="rect">
+            <a:avLst/>
+          </a:prstGeom>
+          <a:solidFill>
+            <a:srgbClr val="00A9B9"/>
+          </a:solidFill>
+          <a:ln>
+            <a:noFill/>
+          </a:ln>
+          <a:effectLst/>
+        </p:spPr>
+        <p:style>
+          <a:lnRef idx="1">
+            <a:schemeClr val="accent1"/>
+          </a:lnRef>
+          <a:fillRef idx="3">
+            <a:schemeClr val="accent1"/>
+          </a:fillRef>
+          <a:effectRef idx="2">
+            <a:schemeClr val="accent1"/>
+          </a:effectRef>
+          <a:fontRef idx="minor">
+            <a:schemeClr val="lt1"/>
+          </a:fontRef>
+        </p:style>
+        <p:txBody>
+          <a:bodyPr rtlCol="0" anchor="t"/>
+          <a:lstStyle/>
+          <a:p>
+            <a:endParaRPr lang="en-US" sz="2200" dirty="0">
+              <a:solidFill>
+                <a:schemeClr val="accent1"/>
+              </a:solidFill>
+            </a:endParaRPr>
+          </a:p>
+          <a:p>
+            <a:pPr marL="111125"/>
+            <a:endParaRPr lang="en-US" sz="2200" dirty="0" smtClean="0">
+              <a:solidFill>
+                <a:schemeClr val="accent1"/>
+              </a:solidFill>
+            </a:endParaRPr>
+          </a:p>
+        </p:txBody>
+      </p:sp>
+      <p:sp>
+        <p:nvSpPr>
+          <p:cNvPr id="5" name="Rectangle 4"/>
+          <p:cNvSpPr/>
+          <p:nvPr/>
+        </p:nvSpPr>
+        <p:spPr>
+          <a:xfrm>
+            <a:off x="3493911" y="2668662"/>
+            <a:ext cx="2150017" cy="3058909"/>
+          </a:xfrm>
+          <a:prstGeom prst="rect">
+            <a:avLst/>
+          </a:prstGeom>
+          <a:solidFill>
+            <a:srgbClr val="EA4A3C"/>
+          </a:solidFill>
+          <a:ln>
+            <a:noFill/>
+          </a:ln>
+          <a:effectLst/>
+        </p:spPr>
+        <p:style>
+          <a:lnRef idx="1">
+            <a:schemeClr val="accent1"/>
+          </a:lnRef>
+          <a:fillRef idx="3">
+            <a:schemeClr val="accent1"/>
+          </a:fillRef>
+          <a:effectRef idx="2">
+            <a:schemeClr val="accent1"/>
+          </a:effectRef>
+          <a:fontRef idx="minor">
+            <a:schemeClr val="lt1"/>
+          </a:fontRef>
+        </p:style>
+        <p:txBody>
+          <a:bodyPr rtlCol="0" anchor="t"/>
+          <a:lstStyle/>
+          <a:p>
+            <a:pPr marL="111125"/>
+            <a:endParaRPr lang="en-US" sz="2200" dirty="0" smtClean="0">
+              <a:solidFill>
+                <a:srgbClr val="F8F8F8"/>
+              </a:solidFill>
+            </a:endParaRPr>
+          </a:p>
+          <a:p>
+            <a:pPr marL="111125"/>
+            <a:endParaRPr lang="en-US" sz="2200" dirty="0" smtClean="0">
+              <a:solidFill>
+                <a:srgbClr val="F8F8F8"/>
+              </a:solidFill>
+            </a:endParaRPr>
+          </a:p>
+        </p:txBody>
+      </p:sp>
+      <p:sp>
+        <p:nvSpPr>
+          <p:cNvPr id="6" name="Rectangle 5"/>
+          <p:cNvSpPr/>
+          <p:nvPr/>
+        </p:nvSpPr>
+        <p:spPr>
+          <a:xfrm>
+            <a:off x="6536783" y="2723877"/>
+            <a:ext cx="2150017" cy="3058909"/>
+          </a:xfrm>
+          <a:prstGeom prst="rect">
+            <a:avLst/>
+          </a:prstGeom>
+          <a:solidFill>
+            <a:schemeClr val="accent6"/>
+          </a:solidFill>
+          <a:ln>
+            <a:noFill/>
+          </a:ln>
+          <a:effectLst/>
+        </p:spPr>
+        <p:style>
+          <a:lnRef idx="1">
+            <a:schemeClr val="accent1"/>
+          </a:lnRef>
+          <a:fillRef idx="3">
+            <a:schemeClr val="accent1"/>
+          </a:fillRef>
+          <a:effectRef idx="2">
+            <a:schemeClr val="accent1"/>
+          </a:effectRef>
+          <a:fontRef idx="minor">
+            <a:schemeClr val="lt1"/>
+          </a:fontRef>
+        </p:style>
+        <p:txBody>
+          <a:bodyPr rtlCol="0" anchor="t"/>
+          <a:lstStyle/>
+          <a:p>
+            <a:pPr marL="111125"/>
+            <a:endParaRPr lang="en-US" sz="2200" dirty="0" smtClean="0">
+              <a:solidFill>
+                <a:srgbClr val="F8F8F8"/>
+              </a:solidFill>
+            </a:endParaRPr>
+          </a:p>
+          <a:p>
+            <a:pPr marL="111125"/>
+            <a:endParaRPr lang="en-US" sz="2200" dirty="0" smtClean="0">
+              <a:solidFill>
+                <a:srgbClr val="F8F8F8"/>
+              </a:solidFill>
+            </a:endParaRPr>
+          </a:p>
+        </p:txBody>
+      </p:sp>
+      <p:sp>
+        <p:nvSpPr>
+          <p:cNvPr id="8" name="TextBox 7"/>
+          <p:cNvSpPr txBox="1"/>
+          <p:nvPr/>
+        </p:nvSpPr>
+        <p:spPr>
+          <a:xfrm>
+            <a:off x="457200" y="1865376"/>
+            <a:ext cx="2204881" cy="584776"/>
+          </a:xfrm>
+          <a:prstGeom prst="rect">
+            <a:avLst/>
+          </a:prstGeom>
+          <a:noFill/>
+        </p:spPr>
+        <p:txBody>
+          <a:bodyPr wrap="square" rtlCol="0">
+            <a:spAutoFit/>
+          </a:bodyPr>
+          <a:lstStyle/>
+          <a:p>
+            <a:pPr algn="ctr"/>
+            <a:r>
+              <a:rPr lang="en-US" sz="3200" dirty="0" smtClean="0"/>
+              <a:t>Model</a:t>
+            </a:r>
+            <a:endParaRPr lang="en-US" sz="3200" dirty="0"/>
+          </a:p>
+        </p:txBody>
+      </p:sp>
+      <p:sp>
+        <p:nvSpPr>
+          <p:cNvPr id="10" name="TextBox 9"/>
+          <p:cNvSpPr txBox="1"/>
+          <p:nvPr/>
+        </p:nvSpPr>
+        <p:spPr>
+          <a:xfrm>
+            <a:off x="3493911" y="1865376"/>
+            <a:ext cx="2204881" cy="584776"/>
+          </a:xfrm>
+          <a:prstGeom prst="rect">
+            <a:avLst/>
+          </a:prstGeom>
+          <a:noFill/>
+        </p:spPr>
+        <p:txBody>
+          <a:bodyPr wrap="square" rtlCol="0">
+            <a:spAutoFit/>
+          </a:bodyPr>
+          <a:lstStyle/>
+          <a:p>
+            <a:pPr algn="ctr"/>
+            <a:r>
+              <a:rPr lang="en-US" sz="3200" dirty="0" smtClean="0"/>
+              <a:t>Controller</a:t>
+            </a:r>
+            <a:endParaRPr lang="en-US" sz="3200" dirty="0"/>
+          </a:p>
+        </p:txBody>
+      </p:sp>
+      <p:sp>
+        <p:nvSpPr>
+          <p:cNvPr id="11" name="TextBox 10"/>
+          <p:cNvSpPr txBox="1"/>
+          <p:nvPr/>
+        </p:nvSpPr>
+        <p:spPr>
+          <a:xfrm>
+            <a:off x="6536783" y="1865376"/>
+            <a:ext cx="2204881" cy="584776"/>
+          </a:xfrm>
+          <a:prstGeom prst="rect">
+            <a:avLst/>
+          </a:prstGeom>
+          <a:noFill/>
+        </p:spPr>
+        <p:txBody>
+          <a:bodyPr wrap="square" rtlCol="0">
+            <a:spAutoFit/>
+          </a:bodyPr>
+          <a:lstStyle/>
+          <a:p>
+            <a:pPr algn="ctr"/>
+            <a:r>
+              <a:rPr lang="en-US" sz="3200" dirty="0" smtClean="0"/>
+              <a:t>View</a:t>
+            </a:r>
+            <a:endParaRPr lang="en-US" sz="3200" dirty="0"/>
+          </a:p>
+        </p:txBody>
+      </p:sp>
+      <p:cxnSp>
+        <p:nvCxnSpPr>
+          <p:cNvPr id="12" name="Straight Arrow Connector 11"/>
+          <p:cNvCxnSpPr>
+            <a:stCxn id="7" idx="1"/>
+          </p:cNvCxnSpPr>
+          <p:nvPr/>
+        </p:nvCxnSpPr>
+        <p:spPr>
+          <a:xfrm flipH="1">
+            <a:off x="5537200" y="3132894"/>
+            <a:ext cx="1218407" cy="0"/>
+          </a:xfrm>
+          <a:prstGeom prst="straightConnector1">
+            <a:avLst/>
+          </a:prstGeom>
+          <a:ln w="57150" cmpd="sng">
+            <a:solidFill>
+              <a:schemeClr val="accent2"/>
+            </a:solidFill>
+            <a:headEnd type="none"/>
+            <a:tailEnd type="triangle"/>
+          </a:ln>
+          <a:effectLst/>
+        </p:spPr>
+        <p:style>
+          <a:lnRef idx="2">
+            <a:schemeClr val="accent1"/>
+          </a:lnRef>
+          <a:fillRef idx="0">
+            <a:schemeClr val="accent1"/>
+          </a:fillRef>
+          <a:effectRef idx="1">
+            <a:schemeClr val="accent1"/>
+          </a:effectRef>
+          <a:fontRef idx="minor">
+            <a:schemeClr val="tx1"/>
+          </a:fontRef>
+        </p:style>
+      </p:cxnSp>
+      <p:sp>
+        <p:nvSpPr>
+          <p:cNvPr id="7" name="Rectangle 6"/>
+          <p:cNvSpPr/>
+          <p:nvPr/>
+        </p:nvSpPr>
+        <p:spPr>
+          <a:xfrm>
+            <a:off x="6755607" y="2934560"/>
+            <a:ext cx="1730320" cy="396667"/>
+          </a:xfrm>
+          <a:prstGeom prst="rect">
+            <a:avLst/>
+          </a:prstGeom>
+          <a:solidFill>
+            <a:schemeClr val="accent6"/>
+          </a:solidFill>
+          <a:ln w="28575" cmpd="sng">
+            <a:solidFill>
+              <a:schemeClr val="accent1"/>
+            </a:solidFill>
+          </a:ln>
+          <a:effectLst/>
+        </p:spPr>
+        <p:style>
+          <a:lnRef idx="1">
+            <a:schemeClr val="accent1"/>
+          </a:lnRef>
+          <a:fillRef idx="3">
+            <a:schemeClr val="accent1"/>
+          </a:fillRef>
+          <a:effectRef idx="2">
+            <a:schemeClr val="accent1"/>
+          </a:effectRef>
+          <a:fontRef idx="minor">
+            <a:schemeClr val="lt1"/>
+          </a:fontRef>
+        </p:style>
+        <p:txBody>
+          <a:bodyPr rtlCol="0" anchor="ctr"/>
+          <a:lstStyle/>
+          <a:p>
+            <a:pPr algn="ctr"/>
+            <a:r>
+              <a:rPr lang="en-US" dirty="0" smtClean="0">
+                <a:solidFill>
+                  <a:srgbClr val="F8F8F8"/>
+                </a:solidFill>
+              </a:rPr>
+              <a:t>send input</a:t>
+            </a:r>
+            <a:endParaRPr lang="en-US" dirty="0">
+              <a:solidFill>
+                <a:srgbClr val="F8F8F8"/>
+              </a:solidFill>
+            </a:endParaRPr>
+          </a:p>
+        </p:txBody>
+      </p:sp>
+      <p:cxnSp>
+        <p:nvCxnSpPr>
+          <p:cNvPr id="15" name="Straight Arrow Connector 14"/>
+          <p:cNvCxnSpPr>
+            <a:stCxn id="13" idx="2"/>
+          </p:cNvCxnSpPr>
+          <p:nvPr/>
+        </p:nvCxnSpPr>
+        <p:spPr>
+          <a:xfrm>
+            <a:off x="4565097" y="3331227"/>
+            <a:ext cx="0" cy="614240"/>
+          </a:xfrm>
+          <a:prstGeom prst="straightConnector1">
+            <a:avLst/>
+          </a:prstGeom>
+          <a:ln w="57150" cmpd="sng">
+            <a:solidFill>
+              <a:schemeClr val="accent2"/>
+            </a:solidFill>
+            <a:headEnd type="none"/>
+            <a:tailEnd type="triangle"/>
+          </a:ln>
+          <a:effectLst/>
+        </p:spPr>
+        <p:style>
+          <a:lnRef idx="2">
+            <a:schemeClr val="accent1"/>
+          </a:lnRef>
+          <a:fillRef idx="0">
+            <a:schemeClr val="accent1"/>
+          </a:fillRef>
+          <a:effectRef idx="1">
+            <a:schemeClr val="accent1"/>
+          </a:effectRef>
+          <a:fontRef idx="minor">
+            <a:schemeClr val="tx1"/>
+          </a:fontRef>
+        </p:style>
+      </p:cxnSp>
+      <p:sp>
+        <p:nvSpPr>
+          <p:cNvPr id="13" name="Rectangle 12"/>
+          <p:cNvSpPr/>
+          <p:nvPr/>
+        </p:nvSpPr>
+        <p:spPr>
+          <a:xfrm>
+            <a:off x="3699937" y="2934560"/>
+            <a:ext cx="1730320" cy="396667"/>
+          </a:xfrm>
+          <a:prstGeom prst="rect">
+            <a:avLst/>
+          </a:prstGeom>
+          <a:solidFill>
+            <a:schemeClr val="accent4"/>
+          </a:solidFill>
+          <a:ln w="28575" cmpd="sng">
+            <a:solidFill>
+              <a:schemeClr val="accent1"/>
+            </a:solidFill>
+          </a:ln>
+          <a:effectLst/>
+        </p:spPr>
+        <p:style>
+          <a:lnRef idx="1">
+            <a:schemeClr val="accent1"/>
+          </a:lnRef>
+          <a:fillRef idx="3">
+            <a:schemeClr val="accent1"/>
+          </a:fillRef>
+          <a:effectRef idx="2">
+            <a:schemeClr val="accent1"/>
+          </a:effectRef>
+          <a:fontRef idx="minor">
+            <a:schemeClr val="lt1"/>
+          </a:fontRef>
+        </p:style>
+        <p:txBody>
+          <a:bodyPr rtlCol="0" anchor="ctr"/>
+          <a:lstStyle/>
+          <a:p>
+            <a:pPr algn="ctr"/>
+            <a:r>
+              <a:rPr lang="en-US" dirty="0" smtClean="0">
+                <a:solidFill>
+                  <a:srgbClr val="F8F8F8"/>
+                </a:solidFill>
+              </a:rPr>
+              <a:t>interpret input</a:t>
+            </a:r>
+            <a:endParaRPr lang="en-US" dirty="0">
+              <a:solidFill>
+                <a:srgbClr val="F8F8F8"/>
+              </a:solidFill>
+            </a:endParaRPr>
+          </a:p>
+        </p:txBody>
+      </p:sp>
+      <p:cxnSp>
+        <p:nvCxnSpPr>
+          <p:cNvPr id="17" name="Straight Arrow Connector 16"/>
+          <p:cNvCxnSpPr/>
+          <p:nvPr/>
+        </p:nvCxnSpPr>
+        <p:spPr>
+          <a:xfrm flipH="1">
+            <a:off x="2545030" y="4237794"/>
+            <a:ext cx="1218407" cy="0"/>
+          </a:xfrm>
+          <a:prstGeom prst="straightConnector1">
+            <a:avLst/>
+          </a:prstGeom>
+          <a:ln w="57150" cmpd="sng">
+            <a:solidFill>
+              <a:schemeClr val="accent2"/>
+            </a:solidFill>
+            <a:headEnd type="none"/>
+            <a:tailEnd type="triangle"/>
+          </a:ln>
+          <a:effectLst/>
+        </p:spPr>
+        <p:style>
+          <a:lnRef idx="2">
+            <a:schemeClr val="accent1"/>
+          </a:lnRef>
+          <a:fillRef idx="0">
+            <a:schemeClr val="accent1"/>
+          </a:fillRef>
+          <a:effectRef idx="1">
+            <a:schemeClr val="accent1"/>
+          </a:effectRef>
+          <a:fontRef idx="minor">
+            <a:schemeClr val="tx1"/>
+          </a:fontRef>
+        </p:style>
+      </p:cxnSp>
+      <p:sp>
+        <p:nvSpPr>
+          <p:cNvPr id="14" name="Rectangle 13"/>
+          <p:cNvSpPr/>
+          <p:nvPr/>
+        </p:nvSpPr>
+        <p:spPr>
+          <a:xfrm>
+            <a:off x="3699937" y="4014227"/>
+            <a:ext cx="1730320" cy="396667"/>
+          </a:xfrm>
+          <a:prstGeom prst="rect">
+            <a:avLst/>
+          </a:prstGeom>
+          <a:solidFill>
+            <a:schemeClr val="accent4"/>
+          </a:solidFill>
+          <a:ln w="28575" cmpd="sng">
+            <a:solidFill>
+              <a:schemeClr val="accent1"/>
+            </a:solidFill>
+          </a:ln>
+          <a:effectLst/>
+        </p:spPr>
+        <p:style>
+          <a:lnRef idx="1">
+            <a:schemeClr val="accent1"/>
+          </a:lnRef>
+          <a:fillRef idx="3">
+            <a:schemeClr val="accent1"/>
+          </a:fillRef>
+          <a:effectRef idx="2">
+            <a:schemeClr val="accent1"/>
+          </a:effectRef>
+          <a:fontRef idx="minor">
+            <a:schemeClr val="lt1"/>
+          </a:fontRef>
+        </p:style>
+        <p:txBody>
+          <a:bodyPr rtlCol="0" anchor="ctr"/>
+          <a:lstStyle/>
+          <a:p>
+            <a:pPr algn="ctr"/>
+            <a:r>
+              <a:rPr lang="en-US" dirty="0" smtClean="0">
+                <a:solidFill>
+                  <a:srgbClr val="F8F8F8"/>
+                </a:solidFill>
+              </a:rPr>
+              <a:t>request data</a:t>
+            </a:r>
+            <a:endParaRPr lang="en-US" dirty="0">
+              <a:solidFill>
+                <a:srgbClr val="F8F8F8"/>
+              </a:solidFill>
+            </a:endParaRPr>
+          </a:p>
+        </p:txBody>
+      </p:sp>
+      <p:cxnSp>
+        <p:nvCxnSpPr>
+          <p:cNvPr id="19" name="Straight Arrow Connector 18"/>
+          <p:cNvCxnSpPr/>
+          <p:nvPr/>
+        </p:nvCxnSpPr>
+        <p:spPr>
+          <a:xfrm>
+            <a:off x="1567897" y="4410894"/>
+            <a:ext cx="0" cy="614240"/>
+          </a:xfrm>
+          <a:prstGeom prst="straightConnector1">
+            <a:avLst/>
+          </a:prstGeom>
+          <a:ln w="57150" cmpd="sng">
+            <a:solidFill>
+              <a:schemeClr val="accent2"/>
+            </a:solidFill>
+            <a:headEnd type="none"/>
+            <a:tailEnd type="triangle"/>
+          </a:ln>
+          <a:effectLst/>
+        </p:spPr>
+        <p:style>
+          <a:lnRef idx="2">
+            <a:schemeClr val="accent1"/>
+          </a:lnRef>
+          <a:fillRef idx="0">
+            <a:schemeClr val="accent1"/>
+          </a:fillRef>
+          <a:effectRef idx="1">
+            <a:schemeClr val="accent1"/>
+          </a:effectRef>
+          <a:fontRef idx="minor">
+            <a:schemeClr val="tx1"/>
+          </a:fontRef>
+        </p:style>
+      </p:cxnSp>
+      <p:sp>
+        <p:nvSpPr>
+          <p:cNvPr id="16" name="Rectangle 15"/>
+          <p:cNvSpPr/>
+          <p:nvPr/>
+        </p:nvSpPr>
+        <p:spPr>
+          <a:xfrm>
+            <a:off x="702737" y="4014227"/>
+            <a:ext cx="1730320" cy="396667"/>
+          </a:xfrm>
+          <a:prstGeom prst="rect">
+            <a:avLst/>
+          </a:prstGeom>
+          <a:solidFill>
+            <a:schemeClr val="accent5"/>
+          </a:solidFill>
+          <a:ln w="28575" cmpd="sng">
+            <a:solidFill>
+              <a:schemeClr val="accent1"/>
+            </a:solidFill>
+          </a:ln>
+          <a:effectLst/>
+        </p:spPr>
+        <p:style>
+          <a:lnRef idx="1">
+            <a:schemeClr val="accent1"/>
+          </a:lnRef>
+          <a:fillRef idx="3">
+            <a:schemeClr val="accent1"/>
+          </a:fillRef>
+          <a:effectRef idx="2">
+            <a:schemeClr val="accent1"/>
+          </a:effectRef>
+          <a:fontRef idx="minor">
+            <a:schemeClr val="lt1"/>
+          </a:fontRef>
+        </p:style>
+        <p:txBody>
+          <a:bodyPr rtlCol="0" anchor="ctr"/>
+          <a:lstStyle/>
+          <a:p>
+            <a:pPr algn="ctr"/>
+            <a:r>
+              <a:rPr lang="en-US" dirty="0" smtClean="0">
+                <a:solidFill>
+                  <a:srgbClr val="F8F8F8"/>
+                </a:solidFill>
+              </a:rPr>
+              <a:t>gather data</a:t>
+            </a:r>
+            <a:endParaRPr lang="en-US" dirty="0">
+              <a:solidFill>
+                <a:srgbClr val="F8F8F8"/>
+              </a:solidFill>
+            </a:endParaRPr>
+          </a:p>
+        </p:txBody>
+      </p:sp>
+      <p:sp>
+        <p:nvSpPr>
+          <p:cNvPr id="20" name="Rectangle 19"/>
+          <p:cNvSpPr/>
+          <p:nvPr/>
+        </p:nvSpPr>
+        <p:spPr>
+          <a:xfrm>
+            <a:off x="3699937" y="5093893"/>
+            <a:ext cx="1730320" cy="396667"/>
+          </a:xfrm>
+          <a:prstGeom prst="rect">
+            <a:avLst/>
+          </a:prstGeom>
+          <a:solidFill>
+            <a:schemeClr val="accent4"/>
+          </a:solidFill>
+          <a:ln w="28575" cmpd="sng">
+            <a:solidFill>
+              <a:schemeClr val="accent1"/>
+            </a:solidFill>
+          </a:ln>
+          <a:effectLst/>
+        </p:spPr>
+        <p:style>
+          <a:lnRef idx="1">
+            <a:schemeClr val="accent1"/>
+          </a:lnRef>
+          <a:fillRef idx="3">
+            <a:schemeClr val="accent1"/>
+          </a:fillRef>
+          <a:effectRef idx="2">
+            <a:schemeClr val="accent1"/>
+          </a:effectRef>
+          <a:fontRef idx="minor">
+            <a:schemeClr val="lt1"/>
+          </a:fontRef>
+        </p:style>
+        <p:txBody>
+          <a:bodyPr rtlCol="0" anchor="ctr"/>
+          <a:lstStyle/>
+          <a:p>
+            <a:pPr algn="ctr"/>
+            <a:r>
+              <a:rPr lang="en-US" dirty="0" smtClean="0">
+                <a:solidFill>
+                  <a:srgbClr val="F8F8F8"/>
+                </a:solidFill>
+              </a:rPr>
+              <a:t>forward data</a:t>
+            </a:r>
+            <a:endParaRPr lang="en-US" dirty="0">
+              <a:solidFill>
+                <a:srgbClr val="F8F8F8"/>
+              </a:solidFill>
+            </a:endParaRPr>
+          </a:p>
+        </p:txBody>
+      </p:sp>
+      <p:cxnSp>
+        <p:nvCxnSpPr>
+          <p:cNvPr id="21" name="Straight Arrow Connector 20"/>
+          <p:cNvCxnSpPr/>
+          <p:nvPr/>
+        </p:nvCxnSpPr>
+        <p:spPr>
+          <a:xfrm>
+            <a:off x="2382257" y="5300588"/>
+            <a:ext cx="1218407" cy="0"/>
+          </a:xfrm>
+          <a:prstGeom prst="straightConnector1">
+            <a:avLst/>
+          </a:prstGeom>
+          <a:ln w="57150" cmpd="sng">
+            <a:solidFill>
+              <a:schemeClr val="accent2"/>
+            </a:solidFill>
+            <a:headEnd type="none"/>
+            <a:tailEnd type="triangle"/>
+          </a:ln>
+          <a:effectLst/>
+        </p:spPr>
+        <p:style>
+          <a:lnRef idx="2">
+            <a:schemeClr val="accent1"/>
+          </a:lnRef>
+          <a:fillRef idx="0">
+            <a:schemeClr val="accent1"/>
+          </a:fillRef>
+          <a:effectRef idx="1">
+            <a:schemeClr val="accent1"/>
+          </a:effectRef>
+          <a:fontRef idx="minor">
+            <a:schemeClr val="tx1"/>
+          </a:fontRef>
+        </p:style>
+      </p:cxnSp>
+      <p:sp>
+        <p:nvSpPr>
+          <p:cNvPr id="18" name="Rectangle 17"/>
+          <p:cNvSpPr/>
+          <p:nvPr/>
+        </p:nvSpPr>
+        <p:spPr>
+          <a:xfrm>
+            <a:off x="702737" y="5093893"/>
+            <a:ext cx="1730320" cy="396667"/>
+          </a:xfrm>
+          <a:prstGeom prst="rect">
+            <a:avLst/>
+          </a:prstGeom>
+          <a:solidFill>
+            <a:schemeClr val="accent5"/>
+          </a:solidFill>
+          <a:ln w="28575" cmpd="sng">
+            <a:solidFill>
+              <a:schemeClr val="accent1"/>
+            </a:solidFill>
+          </a:ln>
+          <a:effectLst/>
+        </p:spPr>
+        <p:style>
+          <a:lnRef idx="1">
+            <a:schemeClr val="accent1"/>
+          </a:lnRef>
+          <a:fillRef idx="3">
+            <a:schemeClr val="accent1"/>
+          </a:fillRef>
+          <a:effectRef idx="2">
+            <a:schemeClr val="accent1"/>
+          </a:effectRef>
+          <a:fontRef idx="minor">
+            <a:schemeClr val="lt1"/>
+          </a:fontRef>
+        </p:style>
+        <p:txBody>
+          <a:bodyPr rtlCol="0" anchor="ctr"/>
+          <a:lstStyle/>
+          <a:p>
+            <a:pPr algn="ctr"/>
+            <a:r>
+              <a:rPr lang="en-US" dirty="0" smtClean="0">
+                <a:solidFill>
+                  <a:srgbClr val="F8F8F8"/>
+                </a:solidFill>
+              </a:rPr>
+              <a:t>return data</a:t>
+            </a:r>
+            <a:endParaRPr lang="en-US" dirty="0">
+              <a:solidFill>
+                <a:srgbClr val="F8F8F8"/>
+              </a:solidFill>
+            </a:endParaRPr>
+          </a:p>
+        </p:txBody>
+      </p:sp>
+    </p:spTree>
+    <p:extLst>
+      <p:ext uri="{BB962C8B-B14F-4D97-AF65-F5344CB8AC3E}">
+        <p14:creationId xmlns:p14="http://schemas.microsoft.com/office/powerpoint/2010/main" val="3441382437"/>
+      </p:ext>
+    </p:extLst>
+  </p:cSld>
+  <p:clrMapOvr>
+    <a:masterClrMapping/>
+  </p:clrMapOvr>
+  <p:timing>
+    <p:tnLst>
+      <p:par>
+        <p:cTn xmlns:p14="http://schemas.microsoft.com/office/powerpoint/2010/main" id="1" dur="indefinite" restart="never" nodeType="tmRoot"/>
+      </p:par>
+    </p:tnLst>
+  </p:timing>
+</p:sld>
+</file>
+
+<file path=ppt/slides/slide31.xml><?xml version="1.0" encoding="utf-8"?>
+<p:sld xmlns:a="http://schemas.openxmlformats.org/drawingml/2006/main" xmlns:r="http://schemas.openxmlformats.org/officeDocument/2006/relationships" xmlns:p="http://schemas.openxmlformats.org/presentationml/2006/main">
+  <p:cSld>
+    <p:spTree>
+      <p:nvGrpSpPr>
+        <p:cNvPr id="1" name=""/>
+        <p:cNvGrpSpPr/>
+        <p:nvPr/>
+      </p:nvGrpSpPr>
+      <p:grpSpPr>
+        <a:xfrm>
+          <a:off x="0" y="0"/>
+          <a:ext cx="0" cy="0"/>
+          <a:chOff x="0" y="0"/>
+          <a:chExt cx="0" cy="0"/>
+        </a:xfrm>
+      </p:grpSpPr>
+      <p:sp>
+        <p:nvSpPr>
+          <p:cNvPr id="2" name="Title 1"/>
+          <p:cNvSpPr>
+            <a:spLocks noGrp="1"/>
+          </p:cNvSpPr>
+          <p:nvPr>
+            <p:ph type="title"/>
+          </p:nvPr>
+        </p:nvSpPr>
+        <p:spPr/>
+        <p:txBody>
+          <a:bodyPr/>
+          <a:lstStyle/>
+          <a:p>
             <a:r>
               <a:rPr lang="en-US" dirty="0" smtClean="0"/>
-              <a:t>List</a:t>
+              <a:t>TODO's: List</a:t>
             </a:r>
             <a:endParaRPr lang="en-US" dirty="0"/>
           </a:p>
@@ -12727,11 +12763,7 @@
           <a:p>
             <a:r>
               <a:rPr lang="en-US" dirty="0" smtClean="0"/>
-              <a:t>What is it</a:t>
-            </a:r>
-            <a:r>
-              <a:rPr lang="en-US" dirty="0" smtClean="0"/>
-              <a:t>?</a:t>
+              <a:t>What is it?</a:t>
             </a:r>
           </a:p>
           <a:p>
@@ -12968,40 +13000,19 @@
           <a:p>
             <a:r>
               <a:rPr lang="en-US" sz="2500" dirty="0" smtClean="0"/>
-              <a:t>Whose </a:t>
-            </a:r>
+              <a:t>Whose business is it to talk to users?</a:t>
+            </a:r>
+          </a:p>
+          <a:p>
             <a:r>
               <a:rPr lang="en-US" sz="2500" dirty="0" smtClean="0"/>
-              <a:t>business is it </a:t>
-            </a:r>
+              <a:t>What about displaying output?</a:t>
+            </a:r>
+          </a:p>
+          <a:p>
             <a:r>
               <a:rPr lang="en-US" sz="2500" dirty="0" smtClean="0"/>
-              <a:t>to talk </a:t>
-            </a:r>
-            <a:r>
-              <a:rPr lang="en-US" sz="2500" dirty="0" smtClean="0"/>
-              <a:t>to users?</a:t>
-            </a:r>
-          </a:p>
-          <a:p>
-            <a:r>
-              <a:rPr lang="en-US" sz="2500" dirty="0" smtClean="0"/>
-              <a:t>What about </a:t>
-            </a:r>
-            <a:r>
-              <a:rPr lang="en-US" sz="2500" dirty="0" smtClean="0"/>
-              <a:t>displaying output?</a:t>
-            </a:r>
-            <a:endParaRPr lang="en-US" sz="2500" dirty="0" smtClean="0"/>
-          </a:p>
-          <a:p>
-            <a:r>
-              <a:rPr lang="en-US" sz="2500" dirty="0" smtClean="0"/>
-              <a:t>Should your classes all know how to parse user input</a:t>
-            </a:r>
-            <a:r>
-              <a:rPr lang="en-US" sz="2500" dirty="0" smtClean="0"/>
-              <a:t>?</a:t>
+              <a:t>Should your classes all know how to parse user input?</a:t>
             </a:r>
           </a:p>
           <a:p>
@@ -13015,7 +13026,6 @@
               <a:rPr lang="en-US" sz="2500" dirty="0" smtClean="0"/>
               <a:t>How do you separate 10,000 lines of code into a manageable structure?</a:t>
             </a:r>
-            <a:endParaRPr lang="en-US" sz="2500" dirty="0" smtClean="0"/>
           </a:p>
         </p:txBody>
       </p:sp>
@@ -13287,11 +13297,7 @@
             </a:r>
             <a:r>
               <a:rPr lang="en-US" sz="2500" dirty="0" smtClean="0"/>
-              <a:t> combines ingredients to make </a:t>
-            </a:r>
-            <a:r>
-              <a:rPr lang="en-US" sz="2500" dirty="0" smtClean="0"/>
-              <a:t>the food</a:t>
+              <a:t> combines ingredients to make the food</a:t>
             </a:r>
           </a:p>
           <a:p>
@@ -13324,7 +13330,15 @@
           <a:p>
             <a:r>
               <a:rPr lang="en-US" sz="2500" dirty="0" smtClean="0"/>
-              <a:t>They manage the orders coming in, tell the cooks what they need to make, and make sure everything’s in working order.</a:t>
+              <a:t>They manage the orders coming in, tell the cooks what they need to make, </a:t>
+            </a:r>
+            <a:r>
+              <a:rPr lang="en-US" sz="2500" dirty="0" smtClean="0"/>
+              <a:t>and ensure the orders go to the servers for delivery</a:t>
+            </a:r>
+            <a:r>
+              <a:rPr lang="en-US" sz="2500" dirty="0" smtClean="0"/>
+              <a:t>. </a:t>
             </a:r>
             <a:endParaRPr lang="en-US" sz="2500" dirty="0"/>
           </a:p>
@@ -13402,7 +13416,7 @@
         </p:nvSpPr>
         <p:spPr>
           <a:xfrm>
-            <a:off x="175179" y="1424690"/>
+            <a:off x="175179" y="1310538"/>
             <a:ext cx="8968821" cy="3877733"/>
           </a:xfrm>
         </p:spPr>
@@ -13422,23 +13436,11 @@
                   <a:srgbClr val="FF0000"/>
                 </a:solidFill>
               </a:rPr>
-              <a:t>view </a:t>
-            </a:r>
-            <a:r>
-              <a:rPr lang="en-US" sz="2300" dirty="0" smtClean="0">
-                <a:solidFill>
-                  <a:srgbClr val="FF0000"/>
-                </a:solidFill>
-              </a:rPr>
-              <a:t>(waiter) </a:t>
+              <a:t>view (waiter) </a:t>
             </a:r>
             <a:r>
               <a:rPr lang="en-US" sz="2300" dirty="0" smtClean="0"/>
-              <a:t>handles </a:t>
-            </a:r>
-            <a:r>
-              <a:rPr lang="en-US" sz="2300" dirty="0" smtClean="0"/>
-              <a:t>user interaction</a:t>
+              <a:t>handles user interaction</a:t>
             </a:r>
           </a:p>
           <a:p>
@@ -13465,11 +13467,7 @@
             </a:r>
             <a:r>
               <a:rPr lang="en-US" sz="2300" dirty="0" smtClean="0"/>
-              <a:t> </a:t>
-            </a:r>
-            <a:r>
-              <a:rPr lang="en-US" sz="2300" dirty="0" smtClean="0"/>
-              <a:t>handles your data</a:t>
+              <a:t> handles your data</a:t>
             </a:r>
           </a:p>
           <a:p>
@@ -13477,7 +13475,6 @@
               <a:rPr lang="en-US" sz="2300" dirty="0" smtClean="0"/>
               <a:t>It interacts with a DB or data store of some kind, crunches the numbers and does the ‘heavy lifting’ in your application.</a:t>
             </a:r>
-            <a:endParaRPr lang="en-US" sz="2300" dirty="0" smtClean="0"/>
           </a:p>
           <a:p>
             <a:endParaRPr lang="en-US" sz="2300" dirty="0"/>
@@ -13509,11 +13506,7 @@
             </a:r>
             <a:r>
               <a:rPr lang="en-US" sz="2300" dirty="0" smtClean="0"/>
-              <a:t> manages </a:t>
-            </a:r>
-            <a:r>
-              <a:rPr lang="en-US" sz="2300" dirty="0" smtClean="0"/>
-              <a:t>communication between </a:t>
+              <a:t> manages communication between </a:t>
             </a:r>
             <a:r>
               <a:rPr lang="en-US" sz="2300" dirty="0" smtClean="0">
@@ -13525,11 +13518,7 @@
             </a:r>
             <a:r>
               <a:rPr lang="en-US" sz="2300" dirty="0" smtClean="0"/>
-              <a:t> </a:t>
-            </a:r>
-            <a:r>
-              <a:rPr lang="en-US" sz="2300" dirty="0" smtClean="0"/>
-              <a:t>and </a:t>
+              <a:t> and </a:t>
             </a:r>
             <a:r>
               <a:rPr lang="en-US" sz="2300" dirty="0" smtClean="0">
@@ -13539,11 +13528,6 @@
               </a:rPr>
               <a:t>view</a:t>
             </a:r>
-            <a:endParaRPr lang="en-US" sz="2300" dirty="0" smtClean="0">
-              <a:solidFill>
-                <a:srgbClr val="FF0000"/>
-              </a:solidFill>
-            </a:endParaRPr>
           </a:p>
           <a:p>
             <a:r>

</xml_diff>

<commit_message>
update slide with pattern desc
</commit_message>
<xml_diff>
--- a/1phase/ruby-mvc-single-res/HT-MVC.pptx
+++ b/1phase/ruby-mvc-single-res/HT-MVC.pptx
@@ -5589,8 +5589,15 @@
           <a:p>
             <a:r>
               <a:rPr lang="en-US" sz="3400" dirty="0" smtClean="0"/>
-              <a:t>MVC gives your code a solid architecture.</a:t>
-            </a:r>
+              <a:t>MVC gives your code a solid architecture</a:t>
+            </a:r>
+            <a:r>
+              <a:rPr lang="en-US" sz="3400" dirty="0" smtClean="0"/>
+              <a:t>.</a:t>
+            </a:r>
+          </a:p>
+          <a:p>
+            <a:endParaRPr lang="en-US" sz="3400" dirty="0" smtClean="0"/>
           </a:p>
           <a:p>
             <a:r>
@@ -7662,13 +7669,8 @@
             </a:pPr>
             <a:r>
               <a:rPr lang="en-US" sz="3200" dirty="0" smtClean="0"/>
-              <a:t>Start thinking of your methods/classes as a means of passing a message to </a:t>
-            </a:r>
-            <a:r>
-              <a:rPr lang="en-US" sz="3200" smtClean="0"/>
-              <a:t>a place.</a:t>
-            </a:r>
-            <a:endParaRPr lang="en-US" sz="3200" dirty="0" smtClean="0"/>
+              <a:t>Start thinking of your methods/classes as a means of passing a message to a place.</a:t>
+            </a:r>
           </a:p>
           <a:p>
             <a:pPr marL="457200" indent="-457200">
@@ -10755,12 +10757,23 @@
               <a:rPr lang="en-US" sz="3400" dirty="0" smtClean="0"/>
               <a:t>MVC is not much different than the code you are already writing. </a:t>
             </a:r>
-          </a:p>
-          <a:p>
+            <a:endParaRPr lang="en-US" sz="3400" dirty="0" smtClean="0"/>
+          </a:p>
+          <a:p>
+            <a:endParaRPr lang="en-US" sz="3400" dirty="0" smtClean="0"/>
+          </a:p>
+          <a:p>
+            <a:r>
+              <a:rPr lang="en-US" sz="3400" dirty="0"/>
+              <a:t>J</a:t>
+            </a:r>
             <a:r>
               <a:rPr lang="en-US" sz="3400" dirty="0" smtClean="0"/>
-              <a:t>These are all just classes!</a:t>
-            </a:r>
+              <a:t>ust a bunch of classes and modules!</a:t>
+            </a:r>
+          </a:p>
+          <a:p>
+            <a:endParaRPr lang="en-US" sz="3400" dirty="0" smtClean="0"/>
           </a:p>
           <a:p>
             <a:r>
@@ -12888,7 +12901,9 @@
         </p:nvSpPr>
         <p:spPr/>
         <p:txBody>
-          <a:bodyPr/>
+          <a:bodyPr>
+            <a:normAutofit fontScale="92500" lnSpcReduction="20000"/>
+          </a:bodyPr>
           <a:lstStyle/>
           <a:p>
             <a:r>
@@ -12898,6 +12913,16 @@
             <a:r>
               <a:rPr lang="en-US" dirty="0"/>
               <a:t>design pattern is a general reusable solution to a commonly occurring problem within a given context in software design. </a:t>
+            </a:r>
+            <a:endParaRPr lang="en-US" dirty="0" smtClean="0"/>
+          </a:p>
+          <a:p>
+            <a:endParaRPr lang="en-US" dirty="0"/>
+          </a:p>
+          <a:p>
+            <a:r>
+              <a:rPr lang="en-US" dirty="0" smtClean="0"/>
+              <a:t>Get used to this term. Start thinking of everything you do as implementing some pattern. You’re just following a blueprint, filling in the gaps as needed with as little distinction from the standard pattern as possible.</a:t>
             </a:r>
             <a:endParaRPr lang="en-US" dirty="0" smtClean="0"/>
           </a:p>

</xml_diff>